<commit_message>
Working on the presentation slides and notes.
</commit_message>
<xml_diff>
--- a/Final_Project/Presentation/CS235 - Team Thundercats - Final Project Presentation.pptx
+++ b/Final_Project/Presentation/CS235 - Team Thundercats - Final Project Presentation.pptx
@@ -2680,10 +2680,19 @@
           <a:p>
             <a:pPr algn="ctr" defTabSz="457200"/>
             <a:r>
+              <a:rPr lang="en-US" sz="3800" dirty="0" smtClean="0">
+                <a:solidFill>
+                  <a:srgbClr val="0070C0"/>
+                </a:solidFill>
+                <a:latin typeface="Calibri" pitchFamily="34" charset="0"/>
+              </a:rPr>
+              <a:t>Olympics History:</a:t>
+            </a:r>
+            <a:r>
               <a:rPr lang="en-US" sz="3800" dirty="0">
                 <a:latin typeface="Calibri" pitchFamily="34" charset="0"/>
               </a:rPr>
-              <a:t>Calendar Appointment and </a:t>
+              <a:t/>
             </a:r>
             <a:br>
               <a:rPr lang="en-US" sz="3800" dirty="0">
@@ -2691,16 +2700,10 @@
               </a:rPr>
             </a:br>
             <a:r>
-              <a:rPr lang="en-US" sz="3800" dirty="0">
-                <a:latin typeface="Calibri" pitchFamily="34" charset="0"/>
-              </a:rPr>
-              <a:t>To-Do List </a:t>
-            </a:r>
-            <a:r>
               <a:rPr lang="en-US" sz="3800" dirty="0" smtClean="0">
                 <a:latin typeface="Calibri" pitchFamily="34" charset="0"/>
               </a:rPr>
-              <a:t>Manager – A Mobile App</a:t>
+              <a:t>A Data Visualization Application</a:t>
             </a:r>
             <a:endParaRPr lang="en-US" sz="3800" dirty="0">
               <a:latin typeface="Calibri" pitchFamily="34" charset="0"/>
@@ -2806,6 +2809,35 @@
               </a:rPr>
               <a:t>Hammoudeh</a:t>
             </a:r>
+          </a:p>
+        </p:txBody>
+      </p:sp>
+      <p:sp>
+        <p:nvSpPr>
+          <p:cNvPr id="4" name="Slide Number Placeholder 3"/>
+          <p:cNvSpPr>
+            <a:spLocks noGrp="1"/>
+          </p:cNvSpPr>
+          <p:nvPr>
+            <p:ph type="sldNum" sz="quarter" idx="12"/>
+          </p:nvPr>
+        </p:nvSpPr>
+        <p:spPr/>
+        <p:txBody>
+          <a:bodyPr/>
+          <a:lstStyle/>
+          <a:p>
+            <a:pPr>
+              <a:defRPr/>
+            </a:pPr>
+            <a:fld id="{D5A23C53-705A-491F-A9B6-108B336645CC}" type="slidenum">
+              <a:rPr lang="en-US" smtClean="0"/>
+              <a:pPr>
+                <a:defRPr/>
+              </a:pPr>
+              <a:t>1</a:t>
+            </a:fld>
+            <a:endParaRPr lang="en-US"/>
           </a:p>
         </p:txBody>
       </p:sp>
@@ -2890,13 +2922,8 @@
             <a:pPr eaLnBrk="1" hangingPunct="1"/>
             <a:r>
               <a:rPr lang="en-US" sz="2800" dirty="0" smtClean="0"/>
-              <a:t> </a:t>
-            </a:r>
-            <a:r>
-              <a:rPr lang="en-US" sz="2800" dirty="0" smtClean="0"/>
-              <a:t>Calendar Manager &amp; To-Do List Application</a:t>
-            </a:r>
-            <a:endParaRPr lang="en-US" sz="2800" dirty="0" smtClean="0"/>
+              <a:t> Calendar Manager &amp; To-Do List Application</a:t>
+            </a:r>
           </a:p>
         </p:txBody>
       </p:sp>
@@ -2971,15 +2998,7 @@
             </a:pPr>
             <a:r>
               <a:rPr lang="en-US" sz="2200" dirty="0" smtClean="0"/>
-              <a:t>For our web application, Team Thundercats already developed a calendar manager and to-do </a:t>
-            </a:r>
-            <a:r>
-              <a:rPr lang="en-US" sz="2200" dirty="0" smtClean="0"/>
-              <a:t>l</a:t>
-            </a:r>
-            <a:r>
-              <a:rPr lang="en-US" sz="2200" dirty="0" smtClean="0"/>
-              <a:t>ist application.</a:t>
+              <a:t>For our web application, Team Thundercats already developed a calendar manager and to-do list application.</a:t>
             </a:r>
           </a:p>
           <a:p>
@@ -3064,19 +3083,7 @@
               <a:rPr lang="en-US" sz="2100" b="0" dirty="0" smtClean="0">
                 <a:latin typeface="Calibri" pitchFamily="34" charset="0"/>
               </a:rPr>
-              <a:t>users to</a:t>
-            </a:r>
-            <a:r>
-              <a:rPr lang="en-US" sz="2100" b="0" dirty="0" smtClean="0">
-                <a:latin typeface="Calibri" pitchFamily="34" charset="0"/>
-              </a:rPr>
-              <a:t> s</a:t>
-            </a:r>
-            <a:r>
-              <a:rPr lang="en-US" sz="2100" b="0" dirty="0" smtClean="0">
-                <a:latin typeface="Calibri" pitchFamily="34" charset="0"/>
-              </a:rPr>
-              <a:t>implify </a:t>
+              <a:t>users to simplify </a:t>
             </a:r>
             <a:r>
               <a:rPr lang="en-US" sz="2100" b="0" dirty="0">
@@ -3176,13 +3183,7 @@
               <a:rPr lang="en-US" sz="2000" b="0" dirty="0" smtClean="0">
                 <a:latin typeface="+mn-lt"/>
               </a:rPr>
-              <a:t>Individuals often have </a:t>
-            </a:r>
-            <a:r>
-              <a:rPr lang="en-US" sz="2000" b="0" dirty="0" smtClean="0">
-                <a:latin typeface="+mn-lt"/>
-              </a:rPr>
-              <a:t>multiple different, disjoint calendars (professional, personal, education etc.) across several platforms.</a:t>
+              <a:t>Individuals often have multiple different, disjoint calendars (professional, personal, education etc.) across several platforms.</a:t>
             </a:r>
           </a:p>
           <a:p>
@@ -3197,17 +3198,8 @@
               <a:rPr lang="en-US" sz="2000" b="0" dirty="0" smtClean="0">
                 <a:latin typeface="+mn-lt"/>
               </a:rPr>
-              <a:t>Almost all of us have routine chores and errands as well as larger tasks that make-up a formal or informal to-do list</a:t>
-            </a:r>
-            <a:r>
-              <a:rPr lang="en-US" sz="2000" b="0" dirty="0" smtClean="0">
-                <a:latin typeface="+mn-lt"/>
-              </a:rPr>
-              <a:t>.</a:t>
-            </a:r>
-            <a:endParaRPr lang="en-US" sz="2000" b="0" dirty="0" smtClean="0">
-              <a:latin typeface="+mn-lt"/>
-            </a:endParaRPr>
+              <a:t>Almost all of us have routine chores and errands as well as larger tasks that make-up a formal or informal to-do list.</a:t>
+            </a:r>
           </a:p>
         </p:txBody>
       </p:sp>
@@ -3493,7 +3485,6 @@
               <a:rPr lang="en-US" sz="4000" dirty="0" smtClean="0"/>
               <a:t>Conversion Challenges</a:t>
             </a:r>
-            <a:endParaRPr lang="en-US" sz="4000" dirty="0" smtClean="0"/>
           </a:p>
         </p:txBody>
       </p:sp>
@@ -3568,13 +3559,7 @@
               <a:rPr lang="en-US" sz="2000" b="0" dirty="0" smtClean="0">
                 <a:latin typeface="Calibri" pitchFamily="34" charset="0"/>
               </a:rPr>
-              <a:t>The user should enjoy the mobile experience at least as much as their online one</a:t>
-            </a:r>
-            <a:r>
-              <a:rPr lang="en-US" sz="2000" b="0" dirty="0" smtClean="0">
-                <a:latin typeface="Calibri" pitchFamily="34" charset="0"/>
-              </a:rPr>
-              <a:t>.</a:t>
+              <a:t>The user should enjoy the mobile experience at least as much as their online one.</a:t>
             </a:r>
           </a:p>
           <a:p>
@@ -3588,9 +3573,6 @@
               </a:rPr>
               <a:t>Users hate to relearn.  Allow for the frequency of practice on one platform to map well to the other.</a:t>
             </a:r>
-            <a:endParaRPr lang="en-US" sz="2000" b="0" dirty="0" smtClean="0">
-              <a:latin typeface="Calibri" pitchFamily="34" charset="0"/>
-            </a:endParaRPr>
           </a:p>
           <a:p>
             <a:pPr marL="914400" lvl="1" indent="-457200">
@@ -3601,19 +3583,7 @@
               <a:rPr lang="en-US" sz="2000" b="0" dirty="0" smtClean="0">
                 <a:latin typeface="Calibri" pitchFamily="34" charset="0"/>
               </a:rPr>
-              <a:t>Design should leverage </a:t>
-            </a:r>
-            <a:r>
-              <a:rPr lang="en-US" sz="2000" b="0" dirty="0" smtClean="0">
-                <a:latin typeface="Calibri" pitchFamily="34" charset="0"/>
-              </a:rPr>
-              <a:t>mobile specific capabilities (e.g. gestures</a:t>
-            </a:r>
-            <a:r>
-              <a:rPr lang="en-US" sz="2000" b="0" dirty="0" smtClean="0">
-                <a:latin typeface="Calibri" pitchFamily="34" charset="0"/>
-              </a:rPr>
-              <a:t>)</a:t>
+              <a:t>Design should leverage mobile specific capabilities (e.g. gestures)</a:t>
             </a:r>
           </a:p>
           <a:p>
@@ -3672,9 +3642,35 @@
               </a:rPr>
               <a:t>.”</a:t>
             </a:r>
-            <a:endParaRPr lang="en-US" sz="2000" b="0" dirty="0" smtClean="0">
-              <a:latin typeface="Calibri" pitchFamily="34" charset="0"/>
-            </a:endParaRPr>
+          </a:p>
+        </p:txBody>
+      </p:sp>
+      <p:sp>
+        <p:nvSpPr>
+          <p:cNvPr id="4" name="Slide Number Placeholder 3"/>
+          <p:cNvSpPr>
+            <a:spLocks noGrp="1"/>
+          </p:cNvSpPr>
+          <p:nvPr>
+            <p:ph type="sldNum" sz="quarter" idx="11"/>
+          </p:nvPr>
+        </p:nvSpPr>
+        <p:spPr/>
+        <p:txBody>
+          <a:bodyPr/>
+          <a:lstStyle/>
+          <a:p>
+            <a:pPr>
+              <a:defRPr/>
+            </a:pPr>
+            <a:fld id="{D696A8AA-6ACE-4ADB-BE5C-DDEA34821D66}" type="slidenum">
+              <a:rPr lang="en-US" smtClean="0"/>
+              <a:pPr>
+                <a:defRPr/>
+              </a:pPr>
+              <a:t>3</a:t>
+            </a:fld>
+            <a:endParaRPr lang="en-US"/>
           </a:p>
         </p:txBody>
       </p:sp>
@@ -4059,8 +4055,12 @@
           <a:lstStyle/>
           <a:p>
             <a:r>
-              <a:rPr lang="en-US" sz="2800" smtClean="0"/>
-              <a:t>Design Patterns &amp; Techniques</a:t>
+              <a:rPr lang="en-US" sz="2800" dirty="0" smtClean="0"/>
+              <a:t>Web Design </a:t>
+            </a:r>
+            <a:r>
+              <a:rPr lang="en-US" sz="2800" dirty="0" smtClean="0"/>
+              <a:t>Patterns &amp; Techniques</a:t>
             </a:r>
           </a:p>
         </p:txBody>
@@ -4075,10 +4075,15 @@
             <p:ph type="body" idx="1"/>
           </p:nvPr>
         </p:nvSpPr>
-        <p:spPr/>
+        <p:spPr>
+          <a:xfrm>
+            <a:off x="457200" y="989012"/>
+            <a:ext cx="8229600" cy="5487987"/>
+          </a:xfrm>
+        </p:spPr>
         <p:txBody>
           <a:bodyPr>
-            <a:normAutofit/>
+            <a:normAutofit fontScale="85000" lnSpcReduction="20000"/>
           </a:bodyPr>
           <a:lstStyle/>
           <a:p>
@@ -4095,7 +4100,31 @@
                   <a:srgbClr val="000066"/>
                 </a:solidFill>
               </a:rPr>
-              <a:t>Design patterns and techniques used include:</a:t>
+              <a:t>Web design </a:t>
+            </a:r>
+            <a:r>
+              <a:rPr lang="en-US" sz="2200" b="1" dirty="0" smtClean="0">
+                <a:solidFill>
+                  <a:srgbClr val="000066"/>
+                </a:solidFill>
+              </a:rPr>
+              <a:t>p</a:t>
+            </a:r>
+            <a:r>
+              <a:rPr lang="en-US" sz="2200" b="1" dirty="0" smtClean="0">
+                <a:solidFill>
+                  <a:srgbClr val="000066"/>
+                </a:solidFill>
+              </a:rPr>
+              <a:t>atterns </a:t>
+            </a:r>
+            <a:r>
+              <a:rPr lang="en-US" sz="2200" b="1" dirty="0" smtClean="0">
+                <a:solidFill>
+                  <a:srgbClr val="000066"/>
+                </a:solidFill>
+              </a:rPr>
+              <a:t>and techniques used include:</a:t>
             </a:r>
             <a:r>
               <a:rPr lang="en-US" sz="2200" dirty="0" smtClean="0"/>
@@ -4107,6 +4136,27 @@
             <a:endParaRPr lang="en-US" sz="2200" dirty="0" smtClean="0"/>
           </a:p>
           <a:p>
+            <a:pPr lvl="1"/>
+            <a:r>
+              <a:rPr lang="en-US" b="1" dirty="0" smtClean="0">
+                <a:solidFill>
+                  <a:srgbClr val="008000"/>
+                </a:solidFill>
+              </a:rPr>
+              <a:t>Feature Search Browse</a:t>
+            </a:r>
+          </a:p>
+          <a:p>
+            <a:pPr lvl="1">
+              <a:buNone/>
+            </a:pPr>
+            <a:endParaRPr lang="en-US" sz="900" b="1" dirty="0" smtClean="0">
+              <a:solidFill>
+                <a:srgbClr val="008000"/>
+              </a:solidFill>
+            </a:endParaRPr>
+          </a:p>
+          <a:p>
             <a:pPr lvl="1">
               <a:lnSpc>
                 <a:spcPct val="90000"/>
@@ -4115,10 +4165,18 @@
             <a:r>
               <a:rPr lang="en-US" sz="2000" b="1" dirty="0" smtClean="0">
                 <a:solidFill>
-                  <a:srgbClr val="003300"/>
+                  <a:srgbClr val="008000"/>
                 </a:solidFill>
               </a:rPr>
-              <a:t>Color Standardization</a:t>
+              <a:t>Visual Framework with Persistent </a:t>
+            </a:r>
+            <a:r>
+              <a:rPr lang="en-US" sz="2000" b="1" dirty="0" smtClean="0">
+                <a:solidFill>
+                  <a:srgbClr val="008000"/>
+                </a:solidFill>
+              </a:rPr>
+              <a:t>Navigation</a:t>
             </a:r>
           </a:p>
           <a:p>
@@ -4133,7 +4191,7 @@
                   <a:srgbClr val="003300"/>
                 </a:solidFill>
               </a:rPr>
-              <a:t>Concept </a:t>
+              <a:t>Bonus: Built-in images to enable </a:t>
             </a:r>
             <a:r>
               <a:rPr lang="en-US" sz="1800" dirty="0" smtClean="0">
@@ -4141,7 +4199,7 @@
                   <a:srgbClr val="003300"/>
                 </a:solidFill>
               </a:rPr>
-              <a:t>presented by guest lecturer Robert </a:t>
+              <a:t>recognition rather than recall</a:t>
             </a:r>
             <a:r>
               <a:rPr lang="en-US" sz="1800" dirty="0" smtClean="0">
@@ -4149,164 +4207,337 @@
                   <a:srgbClr val="003300"/>
                 </a:solidFill>
               </a:rPr>
-              <a:t>Nicholson</a:t>
-            </a:r>
+              <a:t>.</a:t>
+            </a:r>
+          </a:p>
+          <a:p>
+            <a:pPr lvl="1">
+              <a:buNone/>
+            </a:pPr>
+            <a:endParaRPr lang="en-US" sz="900" b="1" dirty="0" smtClean="0">
+              <a:solidFill>
+                <a:srgbClr val="008000"/>
+              </a:solidFill>
+            </a:endParaRPr>
+          </a:p>
+          <a:p>
+            <a:pPr lvl="1">
+              <a:lnSpc>
+                <a:spcPct val="90000"/>
+              </a:lnSpc>
+            </a:pPr>
+            <a:r>
+              <a:rPr lang="en-US" sz="2000" b="1" dirty="0" smtClean="0">
+                <a:solidFill>
+                  <a:srgbClr val="008000"/>
+                </a:solidFill>
+              </a:rPr>
+              <a:t>Breadcrumbs</a:t>
+            </a:r>
+            <a:endParaRPr lang="en-US" sz="2000" b="1" dirty="0" smtClean="0">
+              <a:solidFill>
+                <a:srgbClr val="008000"/>
+              </a:solidFill>
+            </a:endParaRPr>
+          </a:p>
+          <a:p>
+            <a:pPr lvl="2">
+              <a:lnSpc>
+                <a:spcPct val="90000"/>
+              </a:lnSpc>
+            </a:pPr>
+            <a:r>
+              <a:rPr lang="en-US" sz="1800" dirty="0" smtClean="0"/>
+              <a:t>“You are Here”</a:t>
+            </a:r>
+          </a:p>
+          <a:p>
+            <a:pPr lvl="1">
+              <a:buNone/>
+            </a:pPr>
+            <a:endParaRPr lang="en-US" sz="900" b="1" dirty="0" smtClean="0">
+              <a:solidFill>
+                <a:srgbClr val="008000"/>
+              </a:solidFill>
+            </a:endParaRPr>
+          </a:p>
+          <a:p>
+            <a:pPr lvl="1"/>
+            <a:r>
+              <a:rPr lang="en-US" b="1" dirty="0" smtClean="0">
+                <a:solidFill>
+                  <a:srgbClr val="008000"/>
+                </a:solidFill>
+              </a:rPr>
+              <a:t>Escape Hatch</a:t>
+            </a:r>
+          </a:p>
+          <a:p>
+            <a:pPr lvl="1">
+              <a:buNone/>
+            </a:pPr>
+            <a:endParaRPr lang="en-US" sz="900" b="1" dirty="0" smtClean="0">
+              <a:solidFill>
+                <a:srgbClr val="008000"/>
+              </a:solidFill>
+            </a:endParaRPr>
+          </a:p>
+          <a:p>
+            <a:pPr lvl="1"/>
+            <a:r>
+              <a:rPr lang="en-US" b="1" dirty="0" smtClean="0">
+                <a:solidFill>
+                  <a:srgbClr val="008000"/>
+                </a:solidFill>
+              </a:rPr>
+              <a:t>Carousel</a:t>
+            </a:r>
+            <a:endParaRPr lang="en-US" b="1" dirty="0" smtClean="0">
+              <a:solidFill>
+                <a:srgbClr val="008000"/>
+              </a:solidFill>
+            </a:endParaRPr>
+          </a:p>
+          <a:p>
+            <a:pPr lvl="2"/>
+            <a:r>
+              <a:rPr lang="en-US" sz="1800" dirty="0" smtClean="0">
+                <a:solidFill>
+                  <a:srgbClr val="003300"/>
+                </a:solidFill>
+              </a:rPr>
+              <a:t>Iconic Olympic images on the home </a:t>
+            </a:r>
+            <a:r>
+              <a:rPr lang="en-US" sz="1800" dirty="0" smtClean="0">
+                <a:solidFill>
+                  <a:srgbClr val="003300"/>
+                </a:solidFill>
+              </a:rPr>
+              <a:t>page</a:t>
+            </a:r>
+          </a:p>
+          <a:p>
+            <a:pPr lvl="1">
+              <a:buNone/>
+            </a:pPr>
+            <a:endParaRPr lang="en-US" sz="900" b="1" dirty="0" smtClean="0">
+              <a:solidFill>
+                <a:srgbClr val="008000"/>
+              </a:solidFill>
+            </a:endParaRPr>
+          </a:p>
+          <a:p>
+            <a:pPr lvl="1">
+              <a:lnSpc>
+                <a:spcPct val="90000"/>
+              </a:lnSpc>
+            </a:pPr>
+            <a:r>
+              <a:rPr lang="en-US" b="1" dirty="0" smtClean="0">
+                <a:solidFill>
+                  <a:srgbClr val="008000"/>
+                </a:solidFill>
+              </a:rPr>
+              <a:t>Taglines</a:t>
+            </a:r>
+          </a:p>
+          <a:p>
+            <a:pPr lvl="1">
+              <a:buNone/>
+            </a:pPr>
+            <a:endParaRPr lang="en-US" sz="900" b="1" dirty="0" smtClean="0">
+              <a:solidFill>
+                <a:srgbClr val="008000"/>
+              </a:solidFill>
+            </a:endParaRPr>
+          </a:p>
+          <a:p>
+            <a:pPr lvl="1">
+              <a:lnSpc>
+                <a:spcPct val="90000"/>
+              </a:lnSpc>
+            </a:pPr>
+            <a:r>
+              <a:rPr lang="en-US" b="1" dirty="0" smtClean="0">
+                <a:solidFill>
+                  <a:srgbClr val="008000"/>
+                </a:solidFill>
+              </a:rPr>
+              <a:t>Hover Tools</a:t>
+            </a:r>
+          </a:p>
+          <a:p>
+            <a:pPr lvl="2">
+              <a:lnSpc>
+                <a:spcPct val="90000"/>
+              </a:lnSpc>
+            </a:pPr>
+            <a:r>
+              <a:rPr lang="en-US" dirty="0" smtClean="0">
+                <a:solidFill>
+                  <a:srgbClr val="003300"/>
+                </a:solidFill>
+              </a:rPr>
+              <a:t>Menu selection</a:t>
+            </a:r>
+          </a:p>
+          <a:p>
+            <a:pPr lvl="2">
+              <a:lnSpc>
+                <a:spcPct val="90000"/>
+              </a:lnSpc>
+            </a:pPr>
+            <a:r>
+              <a:rPr lang="en-US" dirty="0" smtClean="0">
+                <a:solidFill>
+                  <a:srgbClr val="003300"/>
+                </a:solidFill>
+              </a:rPr>
+              <a:t>Data visualization tools</a:t>
+            </a:r>
+          </a:p>
+          <a:p>
+            <a:pPr lvl="1">
+              <a:buNone/>
+            </a:pPr>
+            <a:endParaRPr lang="en-US" sz="900" b="1" dirty="0" smtClean="0">
+              <a:solidFill>
+                <a:srgbClr val="008000"/>
+              </a:solidFill>
+            </a:endParaRPr>
+          </a:p>
+          <a:p>
+            <a:pPr lvl="1">
+              <a:lnSpc>
+                <a:spcPct val="90000"/>
+              </a:lnSpc>
+            </a:pPr>
+            <a:r>
+              <a:rPr lang="en-US" b="1" dirty="0" smtClean="0">
+                <a:solidFill>
+                  <a:srgbClr val="008000"/>
+                </a:solidFill>
+              </a:rPr>
+              <a:t>Grid of Equals</a:t>
+            </a:r>
+          </a:p>
+          <a:p>
+            <a:pPr lvl="1">
+              <a:buNone/>
+            </a:pPr>
+            <a:endParaRPr lang="en-US" sz="900" b="1" dirty="0" smtClean="0">
+              <a:solidFill>
+                <a:srgbClr val="008000"/>
+              </a:solidFill>
+            </a:endParaRPr>
+          </a:p>
+          <a:p>
+            <a:pPr lvl="1">
+              <a:lnSpc>
+                <a:spcPct val="90000"/>
+              </a:lnSpc>
+            </a:pPr>
+            <a:r>
+              <a:rPr lang="en-US" sz="2000" b="1" dirty="0" smtClean="0">
+                <a:solidFill>
+                  <a:srgbClr val="008000"/>
+                </a:solidFill>
+              </a:rPr>
+              <a:t>Color Standardization</a:t>
+            </a:r>
+          </a:p>
+          <a:p>
+            <a:pPr lvl="2">
+              <a:lnSpc>
+                <a:spcPct val="90000"/>
+              </a:lnSpc>
+            </a:pPr>
+            <a:r>
+              <a:rPr lang="en-US" sz="1800" dirty="0" smtClean="0">
+                <a:solidFill>
+                  <a:srgbClr val="003300"/>
+                </a:solidFill>
+              </a:rPr>
+              <a:t>Concept presented by guest lecturer Robert Nicholson</a:t>
+            </a:r>
+          </a:p>
+          <a:p>
+            <a:pPr lvl="1">
+              <a:lnSpc>
+                <a:spcPct val="90000"/>
+              </a:lnSpc>
+            </a:pPr>
+            <a:endParaRPr lang="en-US" b="1" dirty="0" smtClean="0">
+              <a:solidFill>
+                <a:srgbClr val="008000"/>
+              </a:solidFill>
+            </a:endParaRPr>
+          </a:p>
+          <a:p>
+            <a:pPr lvl="2">
+              <a:lnSpc>
+                <a:spcPct val="90000"/>
+              </a:lnSpc>
+            </a:pPr>
+            <a:endParaRPr lang="en-US" dirty="0" smtClean="0">
+              <a:solidFill>
+                <a:srgbClr val="003300"/>
+              </a:solidFill>
+            </a:endParaRPr>
+          </a:p>
+          <a:p>
+            <a:pPr lvl="2">
+              <a:lnSpc>
+                <a:spcPct val="90000"/>
+              </a:lnSpc>
+            </a:pPr>
+            <a:endParaRPr lang="en-US" b="1" dirty="0" smtClean="0">
+              <a:solidFill>
+                <a:srgbClr val="008000"/>
+              </a:solidFill>
+            </a:endParaRPr>
+          </a:p>
+          <a:p>
+            <a:pPr lvl="2">
+              <a:lnSpc>
+                <a:spcPct val="90000"/>
+              </a:lnSpc>
+            </a:pPr>
             <a:endParaRPr lang="en-US" sz="1800" dirty="0" smtClean="0">
               <a:solidFill>
                 <a:srgbClr val="003300"/>
               </a:solidFill>
             </a:endParaRPr>
           </a:p>
-          <a:p>
-            <a:pPr lvl="1"/>
-            <a:r>
-              <a:rPr lang="en-US" b="1" dirty="0" smtClean="0">
-                <a:solidFill>
-                  <a:srgbClr val="003300"/>
-                </a:solidFill>
-              </a:rPr>
-              <a:t>Alternate Views</a:t>
-            </a:r>
-          </a:p>
-          <a:p>
-            <a:pPr lvl="2"/>
-            <a:r>
-              <a:rPr lang="en-US" sz="1800" dirty="0" smtClean="0">
-                <a:solidFill>
-                  <a:srgbClr val="003300"/>
-                </a:solidFill>
-              </a:rPr>
-              <a:t>Mobile friendly version of day, week, and month calendar views</a:t>
-            </a:r>
-          </a:p>
-          <a:p>
-            <a:pPr lvl="1">
-              <a:lnSpc>
-                <a:spcPct val="90000"/>
-              </a:lnSpc>
-            </a:pPr>
-            <a:r>
-              <a:rPr lang="en-US" sz="2000" b="1" dirty="0" smtClean="0">
-                <a:solidFill>
-                  <a:srgbClr val="003300"/>
-                </a:solidFill>
-              </a:rPr>
-              <a:t>Persistent Navigation</a:t>
-            </a:r>
-          </a:p>
-          <a:p>
-            <a:pPr lvl="2">
-              <a:lnSpc>
-                <a:spcPct val="90000"/>
-              </a:lnSpc>
-            </a:pPr>
-            <a:r>
-              <a:rPr lang="en-US" sz="1800" dirty="0" smtClean="0">
-                <a:solidFill>
-                  <a:srgbClr val="003300"/>
-                </a:solidFill>
-              </a:rPr>
-              <a:t>Cognitive Science: Rely on recognition rather than recall.</a:t>
-            </a:r>
-            <a:endParaRPr lang="en-US" sz="2000" b="1" dirty="0" smtClean="0">
-              <a:solidFill>
-                <a:srgbClr val="003300"/>
-              </a:solidFill>
-            </a:endParaRPr>
-          </a:p>
-          <a:p>
-            <a:pPr lvl="1">
-              <a:lnSpc>
-                <a:spcPct val="90000"/>
-              </a:lnSpc>
-            </a:pPr>
-            <a:r>
-              <a:rPr lang="en-US" sz="2000" b="1" dirty="0" smtClean="0">
-                <a:solidFill>
-                  <a:srgbClr val="003300"/>
-                </a:solidFill>
-              </a:rPr>
-              <a:t>Good Defaults</a:t>
-            </a:r>
-          </a:p>
-          <a:p>
-            <a:pPr lvl="2">
-              <a:lnSpc>
-                <a:spcPct val="90000"/>
-              </a:lnSpc>
-            </a:pPr>
-            <a:r>
-              <a:rPr lang="en-US" sz="1800" dirty="0" smtClean="0"/>
-              <a:t>Prevent Form Abandonment: Pre-populate forms for users when possible</a:t>
-            </a:r>
-            <a:endParaRPr lang="en-US" sz="2000" b="1" dirty="0" smtClean="0">
-              <a:solidFill>
-                <a:srgbClr val="003300"/>
-              </a:solidFill>
-            </a:endParaRPr>
-          </a:p>
-          <a:p>
-            <a:pPr lvl="1">
-              <a:lnSpc>
-                <a:spcPct val="90000"/>
-              </a:lnSpc>
-            </a:pPr>
-            <a:r>
-              <a:rPr lang="en-US" sz="2000" b="1" dirty="0" smtClean="0">
-                <a:solidFill>
-                  <a:srgbClr val="003300"/>
-                </a:solidFill>
-              </a:rPr>
-              <a:t>Dropdown Chooser</a:t>
-            </a:r>
-          </a:p>
-          <a:p>
-            <a:pPr lvl="2">
-              <a:lnSpc>
-                <a:spcPct val="90000"/>
-              </a:lnSpc>
-            </a:pPr>
-            <a:r>
-              <a:rPr lang="en-US" sz="1800" dirty="0" smtClean="0"/>
-              <a:t>Date Chooser</a:t>
-            </a:r>
-          </a:p>
-          <a:p>
-            <a:pPr lvl="2">
-              <a:lnSpc>
-                <a:spcPct val="90000"/>
-              </a:lnSpc>
-            </a:pPr>
-            <a:r>
-              <a:rPr lang="en-US" sz="1800" dirty="0" smtClean="0"/>
-              <a:t>Time Chooser</a:t>
-            </a:r>
-          </a:p>
-          <a:p>
-            <a:pPr lvl="1">
-              <a:lnSpc>
-                <a:spcPct val="90000"/>
-              </a:lnSpc>
-            </a:pPr>
-            <a:r>
-              <a:rPr lang="en-US" sz="2000" b="1" dirty="0" smtClean="0">
-                <a:solidFill>
-                  <a:srgbClr val="003300"/>
-                </a:solidFill>
-              </a:rPr>
-              <a:t>Inlay List</a:t>
-            </a:r>
-          </a:p>
-          <a:p>
-            <a:pPr lvl="2">
-              <a:lnSpc>
-                <a:spcPct val="90000"/>
-              </a:lnSpc>
-            </a:pPr>
-            <a:r>
-              <a:rPr lang="en-US" sz="1800" dirty="0" smtClean="0"/>
-              <a:t>Reduce the visual cognitive load in a to-do list</a:t>
-            </a:r>
+        </p:txBody>
+      </p:sp>
+      <p:sp>
+        <p:nvSpPr>
+          <p:cNvPr id="4" name="Slide Number Placeholder 3"/>
+          <p:cNvSpPr>
+            <a:spLocks noGrp="1"/>
+          </p:cNvSpPr>
+          <p:nvPr>
+            <p:ph type="sldNum" sz="quarter" idx="11"/>
+          </p:nvPr>
+        </p:nvSpPr>
+        <p:spPr/>
+        <p:txBody>
+          <a:bodyPr/>
+          <a:lstStyle/>
+          <a:p>
+            <a:pPr>
+              <a:defRPr/>
+            </a:pPr>
+            <a:fld id="{D696A8AA-6ACE-4ADB-BE5C-DDEA34821D66}" type="slidenum">
+              <a:rPr lang="en-US" smtClean="0"/>
+              <a:pPr>
+                <a:defRPr/>
+              </a:pPr>
+              <a:t>4</a:t>
+            </a:fld>
+            <a:endParaRPr lang="en-US"/>
           </a:p>
         </p:txBody>
       </p:sp>
@@ -4360,9 +4591,10 @@
           <a:lstStyle/>
           <a:p>
             <a:r>
-              <a:rPr lang="en-US" sz="2800" smtClean="0"/>
-              <a:t>Design Patterns &amp; Techniques (Continued)</a:t>
-            </a:r>
+              <a:rPr lang="en-US" sz="2800" dirty="0" smtClean="0"/>
+              <a:t>Data Visualization Design Patterns</a:t>
+            </a:r>
+            <a:endParaRPr lang="en-US" sz="2800" dirty="0" smtClean="0"/>
           </a:p>
         </p:txBody>
       </p:sp>
@@ -4378,11 +4610,15 @@
         </p:nvSpPr>
         <p:spPr/>
         <p:txBody>
-          <a:bodyPr/>
+          <a:bodyPr>
+            <a:normAutofit fontScale="92500" lnSpcReduction="20000"/>
+          </a:bodyPr>
           <a:lstStyle/>
           <a:p>
-            <a:pPr algn="ctr">
-              <a:buFont typeface="Arial" charset="0"/>
+            <a:pPr marL="0" lvl="2" indent="0" algn="ctr">
+              <a:lnSpc>
+                <a:spcPct val="90000"/>
+              </a:lnSpc>
               <a:buNone/>
             </a:pPr>
             <a:r>
@@ -4391,7 +4627,31 @@
                   <a:srgbClr val="000066"/>
                 </a:solidFill>
               </a:rPr>
-              <a:t>Additional design patterns and techniques used:</a:t>
+              <a:t>Data visualization design </a:t>
+            </a:r>
+            <a:r>
+              <a:rPr lang="en-US" sz="2800" b="1" dirty="0" smtClean="0">
+                <a:solidFill>
+                  <a:srgbClr val="000066"/>
+                </a:solidFill>
+              </a:rPr>
+              <a:t>patterns </a:t>
+            </a:r>
+            <a:r>
+              <a:rPr lang="en-US" sz="2800" b="1" smtClean="0">
+                <a:solidFill>
+                  <a:srgbClr val="000066"/>
+                </a:solidFill>
+              </a:rPr>
+              <a:t>and techniques used</a:t>
+            </a:r>
+            <a:r>
+              <a:rPr lang="en-US" sz="2800" b="1" dirty="0" smtClean="0">
+                <a:solidFill>
+                  <a:srgbClr val="000066"/>
+                </a:solidFill>
+              </a:rPr>
+              <a:t>:</a:t>
             </a:r>
             <a:r>
               <a:rPr lang="en-US" sz="2800" dirty="0" smtClean="0"/>
@@ -4400,17 +4660,25 @@
             <a:br>
               <a:rPr lang="en-US" sz="2800" dirty="0" smtClean="0"/>
             </a:br>
-            <a:endParaRPr lang="en-US" sz="2800" dirty="0" smtClean="0"/>
+            <a:endParaRPr lang="en-US" b="1" dirty="0" smtClean="0"/>
           </a:p>
           <a:p>
             <a:pPr lvl="1"/>
+            <a:r>
+              <a:rPr lang="en-US" b="1" dirty="0" err="1" smtClean="0">
+                <a:solidFill>
+                  <a:srgbClr val="008000"/>
+                </a:solidFill>
+              </a:rPr>
+              <a:t>Schneiderman’s</a:t>
+            </a:r>
             <a:r>
               <a:rPr lang="en-US" b="1" dirty="0" smtClean="0">
                 <a:solidFill>
-                  <a:srgbClr val="003300"/>
+                  <a:srgbClr val="008000"/>
                 </a:solidFill>
               </a:rPr>
-              <a:t>Making Error Messages Easier to See</a:t>
+              <a:t> Mantra</a:t>
             </a:r>
           </a:p>
           <a:p>
@@ -4420,23 +4688,8 @@
               </a:lnSpc>
             </a:pPr>
             <a:r>
-              <a:rPr lang="en-US" sz="1800" dirty="0" smtClean="0">
-                <a:solidFill>
-                  <a:srgbClr val="003300"/>
-                </a:solidFill>
-              </a:rPr>
-              <a:t>Motion and coloring of errors</a:t>
-            </a:r>
-          </a:p>
-          <a:p>
-            <a:pPr lvl="1"/>
-            <a:r>
-              <a:rPr lang="en-US" b="1" dirty="0" smtClean="0">
-                <a:solidFill>
-                  <a:srgbClr val="003300"/>
-                </a:solidFill>
-              </a:rPr>
-              <a:t>“Toast” Modal Dialogs</a:t>
+              <a:rPr lang="en-US" sz="1800" dirty="0" smtClean="0"/>
+              <a:t>“Overview first, zoom and filter, then details-on-demand.”</a:t>
             </a:r>
           </a:p>
           <a:p>
@@ -4445,37 +4698,17 @@
                 <a:spcPct val="90000"/>
               </a:lnSpc>
             </a:pPr>
-            <a:r>
-              <a:rPr lang="en-US" sz="1800" dirty="0" smtClean="0">
-                <a:solidFill>
-                  <a:srgbClr val="003300"/>
-                </a:solidFill>
-              </a:rPr>
-              <a:t>Mobile </a:t>
-            </a:r>
-            <a:r>
-              <a:rPr lang="en-US" sz="1800" dirty="0" smtClean="0">
-                <a:solidFill>
-                  <a:srgbClr val="003300"/>
-                </a:solidFill>
-              </a:rPr>
-              <a:t>friendly, minimally intrusive, yet obviously apparent</a:t>
-            </a:r>
-            <a:endParaRPr lang="en-US" sz="1800" dirty="0" smtClean="0">
-              <a:solidFill>
-                <a:srgbClr val="003300"/>
-              </a:solidFill>
-            </a:endParaRPr>
+            <a:endParaRPr lang="en-US" sz="1800" dirty="0" smtClean="0"/>
           </a:p>
           <a:p>
             <a:pPr lvl="1"/>
             <a:r>
               <a:rPr lang="en-US" b="1" dirty="0" smtClean="0">
                 <a:solidFill>
-                  <a:srgbClr val="003300"/>
+                  <a:srgbClr val="008000"/>
                 </a:solidFill>
               </a:rPr>
-              <a:t>Pyramid Navigation</a:t>
+              <a:t>Dynamic Queries</a:t>
             </a:r>
           </a:p>
           <a:p>
@@ -4485,24 +4718,40 @@
               </a:lnSpc>
             </a:pPr>
             <a:r>
-              <a:rPr lang="en-US" sz="1800" dirty="0" smtClean="0">
-                <a:solidFill>
-                  <a:srgbClr val="003300"/>
-                </a:solidFill>
-              </a:rPr>
-              <a:t>Calendar navigation</a:t>
-            </a:r>
+              <a:rPr lang="en-US" sz="1800" dirty="0" smtClean="0"/>
+              <a:t>Give ‘</a:t>
+            </a:r>
+            <a:r>
+              <a:rPr lang="en-US" sz="1800" dirty="0" err="1" smtClean="0"/>
+              <a:t>em</a:t>
+            </a:r>
+            <a:r>
+              <a:rPr lang="en-US" sz="1800" dirty="0" smtClean="0"/>
+              <a:t> what they want</a:t>
+            </a:r>
+          </a:p>
+          <a:p>
+            <a:pPr algn="ctr">
+              <a:buFont typeface="Arial" charset="0"/>
+              <a:buNone/>
+            </a:pPr>
+            <a:endParaRPr lang="en-US" sz="1400" dirty="0" smtClean="0"/>
           </a:p>
           <a:p>
             <a:pPr lvl="1"/>
             <a:r>
               <a:rPr lang="en-US" b="1" dirty="0" smtClean="0">
                 <a:solidFill>
-                  <a:srgbClr val="003300"/>
+                  <a:srgbClr val="008000"/>
                 </a:solidFill>
               </a:rPr>
-              <a:t>Prompting Text Fields</a:t>
-            </a:r>
+              <a:t>Data Spotlighting</a:t>
+            </a:r>
+            <a:endParaRPr lang="en-US" b="1" dirty="0" smtClean="0">
+              <a:solidFill>
+                <a:srgbClr val="008000"/>
+              </a:solidFill>
+            </a:endParaRPr>
           </a:p>
           <a:p>
             <a:pPr lvl="2">
@@ -4511,29 +4760,145 @@
               </a:lnSpc>
             </a:pPr>
             <a:r>
-              <a:rPr lang="en-US" sz="1800" dirty="0" smtClean="0">
+              <a:rPr lang="en-US" sz="1800" dirty="0" smtClean="0"/>
+              <a:t>“Focus Plus Context”</a:t>
+            </a:r>
+          </a:p>
+          <a:p>
+            <a:pPr lvl="2">
+              <a:lnSpc>
+                <a:spcPct val="90000"/>
+              </a:lnSpc>
+              <a:buNone/>
+            </a:pPr>
+            <a:endParaRPr lang="en-US" sz="1800" dirty="0" smtClean="0"/>
+          </a:p>
+          <a:p>
+            <a:pPr lvl="1"/>
+            <a:r>
+              <a:rPr lang="en-US" b="1" dirty="0" smtClean="0">
                 <a:solidFill>
-                  <a:srgbClr val="003300"/>
+                  <a:srgbClr val="008000"/>
                 </a:solidFill>
               </a:rPr>
-              <a:t>Don’t make ‘</a:t>
-            </a:r>
-            <a:r>
-              <a:rPr lang="en-US" sz="1800" dirty="0" err="1" smtClean="0">
+              <a:t>Data Tips</a:t>
+            </a:r>
+            <a:endParaRPr lang="en-US" b="1" dirty="0" smtClean="0">
+              <a:solidFill>
+                <a:srgbClr val="008000"/>
+              </a:solidFill>
+            </a:endParaRPr>
+          </a:p>
+          <a:p>
+            <a:pPr lvl="2">
+              <a:lnSpc>
+                <a:spcPct val="90000"/>
+              </a:lnSpc>
+            </a:pPr>
+            <a:r>
+              <a:rPr lang="en-US" sz="1800" dirty="0" smtClean="0"/>
+              <a:t>Provide additional relevant context and data.</a:t>
+            </a:r>
+          </a:p>
+          <a:p>
+            <a:pPr lvl="2">
+              <a:lnSpc>
+                <a:spcPct val="90000"/>
+              </a:lnSpc>
+            </a:pPr>
+            <a:endParaRPr lang="en-US" sz="1800" dirty="0" smtClean="0"/>
+          </a:p>
+          <a:p>
+            <a:pPr lvl="1"/>
+            <a:r>
+              <a:rPr lang="en-US" b="1" dirty="0" smtClean="0">
                 <a:solidFill>
-                  <a:srgbClr val="003300"/>
+                  <a:srgbClr val="008000"/>
                 </a:solidFill>
               </a:rPr>
-              <a:t>em</a:t>
-            </a:r>
-            <a:r>
-              <a:rPr lang="en-US" sz="1800" dirty="0" smtClean="0">
+              <a:t>Multi-Y Graphs</a:t>
+            </a:r>
+            <a:endParaRPr lang="en-US" b="1" dirty="0" smtClean="0">
+              <a:solidFill>
+                <a:srgbClr val="008000"/>
+              </a:solidFill>
+            </a:endParaRPr>
+          </a:p>
+          <a:p>
+            <a:pPr lvl="1"/>
+            <a:endParaRPr lang="en-US" sz="1800" b="1" dirty="0" smtClean="0">
+              <a:solidFill>
+                <a:srgbClr val="008000"/>
+              </a:solidFill>
+            </a:endParaRPr>
+          </a:p>
+          <a:p>
+            <a:pPr lvl="1"/>
+            <a:r>
+              <a:rPr lang="en-US" b="1" dirty="0" err="1" smtClean="0">
                 <a:solidFill>
-                  <a:srgbClr val="003300"/>
+                  <a:srgbClr val="008000"/>
                 </a:solidFill>
               </a:rPr>
-              <a:t> think!</a:t>
-            </a:r>
+              <a:t>Sortable</a:t>
+            </a:r>
+            <a:r>
+              <a:rPr lang="en-US" b="1" dirty="0" smtClean="0">
+                <a:solidFill>
+                  <a:srgbClr val="008000"/>
+                </a:solidFill>
+              </a:rPr>
+              <a:t> Tables</a:t>
+            </a:r>
+            <a:endParaRPr lang="en-US" b="1" dirty="0" smtClean="0"/>
+          </a:p>
+          <a:p>
+            <a:pPr lvl="2">
+              <a:lnSpc>
+                <a:spcPct val="90000"/>
+              </a:lnSpc>
+            </a:pPr>
+            <a:r>
+              <a:rPr lang="en-US" sz="1800" dirty="0" smtClean="0"/>
+              <a:t>A partial misnomer but sorting is the key</a:t>
+            </a:r>
+          </a:p>
+          <a:p>
+            <a:pPr lvl="2">
+              <a:lnSpc>
+                <a:spcPct val="90000"/>
+              </a:lnSpc>
+            </a:pPr>
+            <a:endParaRPr lang="en-US" sz="1800" dirty="0" smtClean="0"/>
+          </a:p>
+        </p:txBody>
+      </p:sp>
+      <p:sp>
+        <p:nvSpPr>
+          <p:cNvPr id="4" name="Slide Number Placeholder 3"/>
+          <p:cNvSpPr>
+            <a:spLocks noGrp="1"/>
+          </p:cNvSpPr>
+          <p:nvPr>
+            <p:ph type="sldNum" sz="quarter" idx="11"/>
+          </p:nvPr>
+        </p:nvSpPr>
+        <p:spPr/>
+        <p:txBody>
+          <a:bodyPr/>
+          <a:lstStyle/>
+          <a:p>
+            <a:pPr>
+              <a:defRPr/>
+            </a:pPr>
+            <a:fld id="{D696A8AA-6ACE-4ADB-BE5C-DDEA34821D66}" type="slidenum">
+              <a:rPr lang="en-US" smtClean="0"/>
+              <a:pPr>
+                <a:defRPr/>
+              </a:pPr>
+              <a:t>5</a:t>
+            </a:fld>
+            <a:endParaRPr lang="en-US"/>
           </a:p>
         </p:txBody>
       </p:sp>

</xml_diff>

<commit_message>
Updating CS235 presentation slides and notes.
</commit_message>
<xml_diff>
--- a/Final_Project/Presentation/CS235 - Team Thundercats - Final Project Presentation.pptx
+++ b/Final_Project/Presentation/CS235 - Team Thundercats - Final Project Presentation.pptx
@@ -5,14 +5,16 @@
     <p:sldMasterId id="2147483650" r:id="rId1"/>
   </p:sldMasterIdLst>
   <p:notesMasterIdLst>
-    <p:notesMasterId r:id="rId7"/>
+    <p:notesMasterId r:id="rId9"/>
   </p:notesMasterIdLst>
   <p:sldIdLst>
     <p:sldId id="256" r:id="rId2"/>
     <p:sldId id="257" r:id="rId3"/>
-    <p:sldId id="258" r:id="rId4"/>
-    <p:sldId id="260" r:id="rId5"/>
-    <p:sldId id="261" r:id="rId6"/>
+    <p:sldId id="262" r:id="rId4"/>
+    <p:sldId id="263" r:id="rId5"/>
+    <p:sldId id="264" r:id="rId6"/>
+    <p:sldId id="260" r:id="rId7"/>
+    <p:sldId id="261" r:id="rId8"/>
   </p:sldIdLst>
   <p:sldSz cx="9144000" cy="6858000" type="screen4x3"/>
   <p:notesSz cx="6858000" cy="9144000"/>
@@ -2686,7 +2688,7 @@
                 </a:solidFill>
                 <a:latin typeface="Calibri" pitchFamily="34" charset="0"/>
               </a:rPr>
-              <a:t>Olympics History:</a:t>
+              <a:t>Olympics History</a:t>
             </a:r>
             <a:r>
               <a:rPr lang="en-US" sz="3800" dirty="0">
@@ -2875,6 +2877,102 @@
       </p:grpSpPr>
       <p:sp>
         <p:nvSpPr>
+          <p:cNvPr id="7" name="Content Placeholder 6"/>
+          <p:cNvSpPr>
+            <a:spLocks noGrp="1"/>
+          </p:cNvSpPr>
+          <p:nvPr>
+            <p:ph idx="1"/>
+          </p:nvPr>
+        </p:nvSpPr>
+        <p:spPr/>
+        <p:txBody>
+          <a:bodyPr>
+            <a:normAutofit/>
+          </a:bodyPr>
+          <a:lstStyle/>
+          <a:p>
+            <a:r>
+              <a:rPr lang="en-US" dirty="0" smtClean="0"/>
+              <a:t>The Olympics are held every two years as a </a:t>
+            </a:r>
+            <a:r>
+              <a:rPr lang="en-US" dirty="0" smtClean="0"/>
+              <a:t>global celebration </a:t>
+            </a:r>
+            <a:r>
+              <a:rPr lang="en-US" dirty="0" smtClean="0"/>
+              <a:t>of amateur sports.</a:t>
+            </a:r>
+          </a:p>
+          <a:p>
+            <a:endParaRPr lang="en-US" dirty="0" smtClean="0"/>
+          </a:p>
+          <a:p>
+            <a:r>
+              <a:rPr lang="en-US" dirty="0" smtClean="0"/>
+              <a:t>Over 219 million Americans watched </a:t>
+            </a:r>
+            <a:r>
+              <a:rPr lang="en-US" dirty="0" smtClean="0"/>
+              <a:t>the </a:t>
+            </a:r>
+            <a:r>
+              <a:rPr lang="en-US" dirty="0" smtClean="0"/>
+              <a:t>London 2012 games.</a:t>
+            </a:r>
+          </a:p>
+          <a:p>
+            <a:endParaRPr lang="en-US" dirty="0" smtClean="0"/>
+          </a:p>
+          <a:p>
+            <a:r>
+              <a:rPr lang="en-US" dirty="0" smtClean="0"/>
+              <a:t>The United States won more medals than any </a:t>
+            </a:r>
+            <a:r>
+              <a:rPr lang="en-US" dirty="0" smtClean="0"/>
+              <a:t>other country </a:t>
+            </a:r>
+            <a:r>
+              <a:rPr lang="en-US" dirty="0" smtClean="0"/>
+              <a:t>in 2012, and NBC gleefully spoke of American Olympic dominance.</a:t>
+            </a:r>
+          </a:p>
+          <a:p>
+            <a:endParaRPr lang="en-US" dirty="0" smtClean="0"/>
+          </a:p>
+          <a:p>
+            <a:r>
+              <a:rPr lang="en-US" b="1" dirty="0" smtClean="0">
+                <a:solidFill>
+                  <a:srgbClr val="0070C0"/>
+                </a:solidFill>
+              </a:rPr>
+              <a:t>Fundamental Question: </a:t>
+            </a:r>
+            <a:r>
+              <a:rPr lang="en-US" dirty="0" smtClean="0"/>
+              <a:t>How can one </a:t>
+            </a:r>
+            <a:r>
+              <a:rPr lang="en-US" dirty="0" smtClean="0"/>
+              <a:t>objectively determine </a:t>
+            </a:r>
+            <a:r>
+              <a:rPr lang="en-US" dirty="0" smtClean="0"/>
+              <a:t>which country performed the best at an Olympic games</a:t>
+            </a:r>
+            <a:r>
+              <a:rPr lang="en-US" dirty="0" smtClean="0"/>
+              <a:t>?</a:t>
+            </a:r>
+            <a:endParaRPr lang="en-US" dirty="0" smtClean="0"/>
+          </a:p>
+        </p:txBody>
+      </p:sp>
+      <p:sp>
+        <p:nvSpPr>
           <p:cNvPr id="4" name="Slide Number Placeholder 4"/>
           <p:cNvSpPr>
             <a:spLocks noGrp="1"/>
@@ -2915,290 +3013,14 @@
         <p:spPr/>
         <p:txBody>
           <a:bodyPr>
-            <a:normAutofit/>
+            <a:noAutofit/>
           </a:bodyPr>
           <a:lstStyle/>
           <a:p>
             <a:pPr eaLnBrk="1" hangingPunct="1"/>
             <a:r>
-              <a:rPr lang="en-US" sz="2800" dirty="0" smtClean="0"/>
-              <a:t> Calendar Manager &amp; To-Do List Application</a:t>
-            </a:r>
-          </a:p>
-        </p:txBody>
-      </p:sp>
-      <p:sp>
-        <p:nvSpPr>
-          <p:cNvPr id="9219" name="Rectangle 3"/>
-          <p:cNvSpPr>
-            <a:spLocks noGrp="1"/>
-          </p:cNvSpPr>
-          <p:nvPr>
-            <p:ph type="body" idx="1"/>
-          </p:nvPr>
-        </p:nvSpPr>
-        <p:spPr>
-          <a:xfrm>
-            <a:off x="403225" y="4341813"/>
-            <a:ext cx="8432800" cy="2135187"/>
-          </a:xfrm>
-        </p:spPr>
-        <p:txBody>
-          <a:bodyPr>
-            <a:normAutofit fontScale="92500" lnSpcReduction="10000"/>
-          </a:bodyPr>
-          <a:lstStyle/>
-          <a:p>
-            <a:pPr marL="571500" indent="-571500" eaLnBrk="1" hangingPunct="1">
-              <a:lnSpc>
-                <a:spcPct val="110000"/>
-              </a:lnSpc>
-              <a:spcBef>
-                <a:spcPts val="0"/>
-              </a:spcBef>
-              <a:buFont typeface="Arial" charset="0"/>
-              <a:buNone/>
-            </a:pPr>
-            <a:r>
-              <a:rPr lang="en-US" sz="2600" b="1" kern="1200" dirty="0" smtClean="0">
-                <a:solidFill>
-                  <a:srgbClr val="008000"/>
-                </a:solidFill>
-                <a:latin typeface="Calibri" pitchFamily="34" charset="0"/>
-                <a:cs typeface="Arial" charset="0"/>
-              </a:rPr>
-              <a:t>The History and Our Motivation:</a:t>
-            </a:r>
-          </a:p>
-          <a:p>
-            <a:pPr marL="571500" indent="-571500" eaLnBrk="1" hangingPunct="1">
-              <a:lnSpc>
-                <a:spcPct val="110000"/>
-              </a:lnSpc>
-              <a:spcBef>
-                <a:spcPts val="0"/>
-              </a:spcBef>
-              <a:buNone/>
-            </a:pPr>
-            <a:endParaRPr lang="en-US" sz="1200" b="1" dirty="0" smtClean="0"/>
-          </a:p>
-          <a:p>
-            <a:pPr marL="571500" indent="-571500" eaLnBrk="1" hangingPunct="1">
-              <a:lnSpc>
-                <a:spcPct val="110000"/>
-              </a:lnSpc>
-              <a:spcBef>
-                <a:spcPts val="0"/>
-              </a:spcBef>
-              <a:spcAft>
-                <a:spcPct val="40000"/>
-              </a:spcAft>
-              <a:buFontTx/>
-              <a:buChar char="•"/>
-            </a:pPr>
-            <a:r>
-              <a:rPr lang="en-US" sz="2200" dirty="0" smtClean="0"/>
-              <a:t>For our web application, Team Thundercats already developed a calendar manager and to-do list application.</a:t>
-            </a:r>
-          </a:p>
-          <a:p>
-            <a:pPr marL="571500" indent="-571500" eaLnBrk="1" hangingPunct="1">
-              <a:lnSpc>
-                <a:spcPct val="110000"/>
-              </a:lnSpc>
-              <a:spcBef>
-                <a:spcPts val="0"/>
-              </a:spcBef>
-              <a:spcAft>
-                <a:spcPct val="40000"/>
-              </a:spcAft>
-              <a:buFontTx/>
-              <a:buChar char="•"/>
-            </a:pPr>
-            <a:r>
-              <a:rPr lang="en-US" sz="2200" dirty="0" smtClean="0"/>
-              <a:t>The experience that can be gained converting an application from one platform to another was very attractive to us.</a:t>
-            </a:r>
-          </a:p>
-        </p:txBody>
-      </p:sp>
-      <p:sp>
-        <p:nvSpPr>
-          <p:cNvPr id="9222" name="Text Box 6"/>
-          <p:cNvSpPr txBox="1">
-            <a:spLocks noChangeArrowheads="1"/>
-          </p:cNvSpPr>
-          <p:nvPr/>
-        </p:nvSpPr>
-        <p:spPr bwMode="auto">
-          <a:xfrm>
-            <a:off x="290513" y="3187700"/>
-            <a:ext cx="8658224" cy="784830"/>
-          </a:xfrm>
-          <a:prstGeom prst="rect">
-            <a:avLst/>
-          </a:prstGeom>
-          <a:noFill/>
-          <a:ln w="9525">
-            <a:noFill/>
-            <a:miter lim="800000"/>
-            <a:headEnd/>
-            <a:tailEnd/>
-          </a:ln>
-        </p:spPr>
-        <p:txBody>
-          <a:bodyPr wrap="square">
-            <a:spAutoFit/>
-          </a:bodyPr>
-          <a:lstStyle/>
-          <a:p>
-            <a:r>
-              <a:rPr lang="en-US" sz="2400" dirty="0">
-                <a:solidFill>
-                  <a:srgbClr val="008000"/>
-                </a:solidFill>
-                <a:latin typeface="Calibri" pitchFamily="34" charset="0"/>
-              </a:rPr>
-              <a:t>Goal:</a:t>
-            </a:r>
-            <a:r>
-              <a:rPr lang="en-US" sz="2400" b="0" dirty="0">
-                <a:solidFill>
-                  <a:srgbClr val="008000"/>
-                </a:solidFill>
-                <a:latin typeface="Calibri" pitchFamily="34" charset="0"/>
-              </a:rPr>
-              <a:t> </a:t>
-            </a:r>
-            <a:r>
-              <a:rPr lang="en-US" sz="2100" b="0" dirty="0" smtClean="0">
-                <a:latin typeface="Calibri" pitchFamily="34" charset="0"/>
-              </a:rPr>
-              <a:t>Create a compelling user experience on a mobile device that allows </a:t>
-            </a:r>
-          </a:p>
-          <a:p>
-            <a:pPr algn="ctr"/>
-            <a:r>
-              <a:rPr lang="en-US" sz="2100" b="0" dirty="0" smtClean="0">
-                <a:latin typeface="Calibri" pitchFamily="34" charset="0"/>
-              </a:rPr>
-              <a:t>users to simplify </a:t>
-            </a:r>
-            <a:r>
-              <a:rPr lang="en-US" sz="2100" b="0" dirty="0">
-                <a:latin typeface="Calibri" pitchFamily="34" charset="0"/>
-              </a:rPr>
-              <a:t>the </a:t>
-            </a:r>
-            <a:r>
-              <a:rPr lang="en-US" sz="2100" b="0" dirty="0" smtClean="0">
-                <a:latin typeface="Calibri" pitchFamily="34" charset="0"/>
-              </a:rPr>
-              <a:t>management </a:t>
-            </a:r>
-            <a:r>
-              <a:rPr lang="en-US" sz="2100" b="0" dirty="0">
-                <a:latin typeface="Calibri" pitchFamily="34" charset="0"/>
-              </a:rPr>
-              <a:t>of </a:t>
-            </a:r>
-            <a:r>
-              <a:rPr lang="en-US" sz="2100" b="0" dirty="0" smtClean="0">
-                <a:latin typeface="Calibri" pitchFamily="34" charset="0"/>
-              </a:rPr>
-              <a:t>their </a:t>
-            </a:r>
-            <a:r>
-              <a:rPr lang="en-US" sz="2100" b="0" dirty="0">
-                <a:latin typeface="Calibri" pitchFamily="34" charset="0"/>
-              </a:rPr>
-              <a:t>daily calendars and to-do </a:t>
-            </a:r>
-            <a:r>
-              <a:rPr lang="en-US" sz="2100" b="0" dirty="0" smtClean="0">
-                <a:latin typeface="Calibri" pitchFamily="34" charset="0"/>
-              </a:rPr>
-              <a:t>lists</a:t>
-            </a:r>
-            <a:endParaRPr lang="en-US" sz="2100" b="0" dirty="0">
-              <a:latin typeface="Calibri" pitchFamily="34" charset="0"/>
-            </a:endParaRPr>
-          </a:p>
-        </p:txBody>
-      </p:sp>
-      <p:sp>
-        <p:nvSpPr>
-          <p:cNvPr id="6" name="Rectangle 5"/>
-          <p:cNvSpPr/>
-          <p:nvPr/>
-        </p:nvSpPr>
-        <p:spPr>
-          <a:xfrm>
-            <a:off x="403225" y="932060"/>
-            <a:ext cx="8432800" cy="1969770"/>
-          </a:xfrm>
-          <a:prstGeom prst="rect">
-            <a:avLst/>
-          </a:prstGeom>
-        </p:spPr>
-        <p:txBody>
-          <a:bodyPr wrap="square">
-            <a:spAutoFit/>
-          </a:bodyPr>
-          <a:lstStyle/>
-          <a:p>
-            <a:pPr marL="571500" indent="-571500" eaLnBrk="1" hangingPunct="1">
-              <a:buFont typeface="Arial" charset="0"/>
-              <a:buNone/>
-            </a:pPr>
-            <a:r>
-              <a:rPr lang="en-US" sz="2400" dirty="0" smtClean="0">
-                <a:solidFill>
-                  <a:srgbClr val="008000"/>
-                </a:solidFill>
-                <a:latin typeface="Calibri" pitchFamily="34" charset="0"/>
-              </a:rPr>
-              <a:t>The Problem:</a:t>
-            </a:r>
-          </a:p>
-          <a:p>
-            <a:pPr marL="571500" indent="-571500" eaLnBrk="1" hangingPunct="1">
-              <a:buFont typeface="Arial" charset="0"/>
-              <a:buNone/>
-            </a:pPr>
-            <a:endParaRPr lang="en-US" sz="1000" dirty="0" smtClean="0">
-              <a:latin typeface="+mn-lt"/>
-            </a:endParaRPr>
-          </a:p>
-          <a:p>
-            <a:pPr marL="571500" indent="-571500">
-              <a:spcAft>
-                <a:spcPct val="40000"/>
-              </a:spcAft>
-              <a:buFontTx/>
-              <a:buChar char="•"/>
-            </a:pPr>
-            <a:r>
-              <a:rPr lang="en-US" sz="2000" b="0" dirty="0" smtClean="0">
-                <a:latin typeface="+mn-lt"/>
-              </a:rPr>
-              <a:t>Individuals often have multiple different, disjoint calendars (professional, personal, education etc.) across several platforms.</a:t>
-            </a:r>
-          </a:p>
-          <a:p>
-            <a:pPr marL="571500" indent="-571500">
-              <a:spcAft>
-                <a:spcPct val="40000"/>
-              </a:spcAft>
-              <a:buFontTx/>
-              <a:buChar char="•"/>
-            </a:pPr>
-            <a:r>
-              <a:rPr lang="en-US" sz="2000" b="0" dirty="0" smtClean="0">
-                <a:latin typeface="+mn-lt"/>
-              </a:rPr>
-              <a:t>Almost all of us have routine chores and errands as well as larger tasks that make-up a formal or informal to-do list.</a:t>
+              <a:rPr lang="en-US" sz="3600" dirty="0" smtClean="0"/>
+              <a:t>The Olympic Games</a:t>
             </a:r>
           </a:p>
         </p:txBody>
@@ -3229,7 +3051,7 @@
                             </p:stCondLst>
                             <p:childTnLst>
                               <p:par>
-                                <p:cTn id="5" presetID="1" presetClass="entr" presetSubtype="0" fill="hold" grpId="0" nodeType="clickEffect">
+                                <p:cTn id="5" presetID="1" presetClass="entr" presetSubtype="0" fill="hold" nodeType="clickEffect">
                                   <p:stCondLst>
                                     <p:cond delay="0"/>
                                   </p:stCondLst>
@@ -3242,161 +3064,9 @@
                                           </p:stCondLst>
                                         </p:cTn>
                                         <p:tgtEl>
-                                          <p:spTgt spid="6"/>
-                                        </p:tgtEl>
-                                        <p:attrNameLst>
-                                          <p:attrName>style.visibility</p:attrName>
-                                        </p:attrNameLst>
-                                      </p:cBhvr>
-                                      <p:to>
-                                        <p:strVal val="visible"/>
-                                      </p:to>
-                                    </p:set>
-                                  </p:childTnLst>
-                                </p:cTn>
-                              </p:par>
-                            </p:childTnLst>
-                          </p:cTn>
-                        </p:par>
-                      </p:childTnLst>
-                    </p:cTn>
-                  </p:par>
-                  <p:par>
-                    <p:cTn id="7" fill="hold">
-                      <p:stCondLst>
-                        <p:cond delay="indefinite"/>
-                      </p:stCondLst>
-                      <p:childTnLst>
-                        <p:par>
-                          <p:cTn id="8" fill="hold">
-                            <p:stCondLst>
-                              <p:cond delay="0"/>
-                            </p:stCondLst>
-                            <p:childTnLst>
-                              <p:par>
-                                <p:cTn id="9" presetID="1" presetClass="entr" presetSubtype="0" fill="hold" grpId="0" nodeType="clickEffect">
-                                  <p:stCondLst>
-                                    <p:cond delay="0"/>
-                                  </p:stCondLst>
-                                  <p:childTnLst>
-                                    <p:set>
-                                      <p:cBhvr>
-                                        <p:cTn id="10" dur="1" fill="hold">
-                                          <p:stCondLst>
-                                            <p:cond delay="0"/>
-                                          </p:stCondLst>
-                                        </p:cTn>
-                                        <p:tgtEl>
-                                          <p:spTgt spid="9222"/>
-                                        </p:tgtEl>
-                                        <p:attrNameLst>
-                                          <p:attrName>style.visibility</p:attrName>
-                                        </p:attrNameLst>
-                                      </p:cBhvr>
-                                      <p:to>
-                                        <p:strVal val="visible"/>
-                                      </p:to>
-                                    </p:set>
-                                  </p:childTnLst>
-                                </p:cTn>
-                              </p:par>
-                            </p:childTnLst>
-                          </p:cTn>
-                        </p:par>
-                      </p:childTnLst>
-                    </p:cTn>
-                  </p:par>
-                  <p:par>
-                    <p:cTn id="11" fill="hold">
-                      <p:stCondLst>
-                        <p:cond delay="indefinite"/>
-                      </p:stCondLst>
-                      <p:childTnLst>
-                        <p:par>
-                          <p:cTn id="12" fill="hold">
-                            <p:stCondLst>
-                              <p:cond delay="0"/>
-                            </p:stCondLst>
-                            <p:childTnLst>
-                              <p:par>
-                                <p:cTn id="13" presetID="1" presetClass="entr" presetSubtype="0" fill="hold" grpId="0" nodeType="clickEffect">
-                                  <p:stCondLst>
-                                    <p:cond delay="0"/>
-                                  </p:stCondLst>
-                                  <p:childTnLst>
-                                    <p:set>
-                                      <p:cBhvr>
-                                        <p:cTn id="14" dur="1" fill="hold">
-                                          <p:stCondLst>
-                                            <p:cond delay="0"/>
-                                          </p:stCondLst>
-                                        </p:cTn>
-                                        <p:tgtEl>
-                                          <p:spTgt spid="9219">
+                                          <p:spTgt spid="7">
                                             <p:txEl>
-                                              <p:pRg st="0" end="0"/>
-                                            </p:txEl>
-                                          </p:spTgt>
-                                        </p:tgtEl>
-                                        <p:attrNameLst>
-                                          <p:attrName>style.visibility</p:attrName>
-                                        </p:attrNameLst>
-                                      </p:cBhvr>
-                                      <p:to>
-                                        <p:strVal val="visible"/>
-                                      </p:to>
-                                    </p:set>
-                                  </p:childTnLst>
-                                </p:cTn>
-                              </p:par>
-                              <p:par>
-                                <p:cTn id="15" presetID="1" presetClass="entr" presetSubtype="0" fill="hold" grpId="0" nodeType="withEffect">
-                                  <p:stCondLst>
-                                    <p:cond delay="0"/>
-                                  </p:stCondLst>
-                                  <p:childTnLst>
-                                    <p:set>
-                                      <p:cBhvr>
-                                        <p:cTn id="16" dur="1" fill="hold">
-                                          <p:stCondLst>
-                                            <p:cond delay="0"/>
-                                          </p:stCondLst>
-                                        </p:cTn>
-                                        <p:tgtEl>
-                                          <p:spTgt spid="9219">
-                                            <p:txEl>
-                                              <p:pRg st="2" end="2"/>
-                                            </p:txEl>
-                                          </p:spTgt>
-                                        </p:tgtEl>
-                                        <p:attrNameLst>
-                                          <p:attrName>style.visibility</p:attrName>
-                                        </p:attrNameLst>
-                                      </p:cBhvr>
-                                      <p:to>
-                                        <p:strVal val="visible"/>
-                                      </p:to>
-                                    </p:set>
-                                  </p:childTnLst>
-                                </p:cTn>
-                              </p:par>
-                              <p:par>
-                                <p:cTn id="17" presetID="1" presetClass="entr" presetSubtype="0" fill="hold" grpId="0" nodeType="withEffect">
-                                  <p:stCondLst>
-                                    <p:cond delay="0"/>
-                                  </p:stCondLst>
-                                  <p:childTnLst>
-                                    <p:set>
-                                      <p:cBhvr>
-                                        <p:cTn id="18" dur="1" fill="hold">
-                                          <p:stCondLst>
-                                            <p:cond delay="0"/>
-                                          </p:stCondLst>
-                                        </p:cTn>
-                                        <p:tgtEl>
-                                          <p:spTgt spid="9219">
-                                            <p:txEl>
-                                              <p:pRg st="3" end="3"/>
+                                              <p:pRg st="6" end="6"/>
                                             </p:txEl>
                                           </p:spTgt>
                                         </p:tgtEl>
@@ -3438,11 +3108,6 @@
         </p:cTn>
       </p:par>
     </p:tnLst>
-    <p:bldLst>
-      <p:bldP spid="9219" grpId="0" uiExpand="1" build="p"/>
-      <p:bldP spid="9222" grpId="0"/>
-      <p:bldP spid="6" grpId="0"/>
-    </p:bldLst>
   </p:timing>
 </p:sld>
 </file>
@@ -3466,7 +3131,7 @@
       </p:grpSpPr>
       <p:sp>
         <p:nvSpPr>
-          <p:cNvPr id="10241" name="Rectangle 2"/>
+          <p:cNvPr id="2" name="Title 1"/>
           <p:cNvSpPr>
             <a:spLocks noGrp="1"/>
           </p:cNvSpPr>
@@ -3477,171 +3142,142 @@
         <p:spPr/>
         <p:txBody>
           <a:bodyPr>
-            <a:noAutofit/>
+            <a:normAutofit fontScale="90000"/>
           </a:bodyPr>
           <a:lstStyle/>
           <a:p>
             <a:r>
-              <a:rPr lang="en-US" sz="4000" dirty="0" smtClean="0"/>
-              <a:t>Conversion Challenges</a:t>
-            </a:r>
-          </a:p>
-        </p:txBody>
-      </p:sp>
-      <p:sp>
-        <p:nvSpPr>
-          <p:cNvPr id="38918" name="Text Box 6"/>
-          <p:cNvSpPr txBox="1">
-            <a:spLocks noChangeArrowheads="1"/>
-          </p:cNvSpPr>
-          <p:nvPr/>
-        </p:nvSpPr>
-        <p:spPr bwMode="auto">
-          <a:xfrm>
-            <a:off x="279400" y="1095374"/>
-            <a:ext cx="8432800" cy="4431983"/>
-          </a:xfrm>
-          <a:prstGeom prst="rect">
-            <a:avLst/>
-          </a:prstGeom>
-          <a:noFill/>
-          <a:ln w="9525">
-            <a:noFill/>
-            <a:miter lim="800000"/>
-            <a:headEnd/>
-            <a:tailEnd/>
-          </a:ln>
-        </p:spPr>
-        <p:txBody>
-          <a:bodyPr wrap="square">
-            <a:spAutoFit/>
-          </a:bodyPr>
+              <a:rPr lang="en-US" dirty="0" smtClean="0"/>
+              <a:t>Medals Alone are not Enough</a:t>
+            </a:r>
+            <a:endParaRPr lang="en-US" dirty="0"/>
+          </a:p>
+        </p:txBody>
+      </p:sp>
+      <p:sp>
+        <p:nvSpPr>
+          <p:cNvPr id="3" name="Content Placeholder 2"/>
+          <p:cNvSpPr>
+            <a:spLocks noGrp="1"/>
+          </p:cNvSpPr>
+          <p:nvPr>
+            <p:ph idx="1"/>
+          </p:nvPr>
+        </p:nvSpPr>
+        <p:spPr/>
+        <p:txBody>
+          <a:bodyPr/>
           <a:lstStyle/>
           <a:p>
-            <a:pPr marL="457200" indent="-457200"/>
-            <a:r>
-              <a:rPr lang="en-US" sz="2600" dirty="0" smtClean="0">
-                <a:latin typeface="Calibri" pitchFamily="34" charset="0"/>
+            <a:r>
+              <a:rPr lang="en-US" dirty="0" smtClean="0"/>
+              <a:t>Most viewers are unaware of the </a:t>
+            </a:r>
+            <a:r>
+              <a:rPr lang="en-US" dirty="0" smtClean="0"/>
+              <a:t>various factors </a:t>
+            </a:r>
+            <a:r>
+              <a:rPr lang="en-US" dirty="0" smtClean="0"/>
+              <a:t>that affect country medal totals.  </a:t>
+            </a:r>
+          </a:p>
+          <a:p>
+            <a:endParaRPr lang="en-US" dirty="0" smtClean="0"/>
+          </a:p>
+          <a:p>
+            <a:r>
+              <a:rPr lang="en-US" b="1" dirty="0" smtClean="0">
+                <a:solidFill>
+                  <a:srgbClr val="0066FF"/>
+                </a:solidFill>
               </a:rPr>
-              <a:t>Challenges of Converting from Web to Mobile:</a:t>
-            </a:r>
-            <a:endParaRPr lang="en-US" sz="2600" dirty="0">
-              <a:latin typeface="Calibri" pitchFamily="34" charset="0"/>
-            </a:endParaRPr>
-          </a:p>
-          <a:p>
-            <a:pPr marL="457200" indent="-457200"/>
-            <a:endParaRPr lang="en-US" sz="2600" dirty="0" smtClean="0">
-              <a:latin typeface="Calibri" pitchFamily="34" charset="0"/>
-            </a:endParaRPr>
-          </a:p>
-          <a:p>
-            <a:pPr marL="457200" indent="-457200">
-              <a:buFontTx/>
-              <a:buChar char="•"/>
-            </a:pPr>
-            <a:r>
-              <a:rPr lang="en-US" sz="2200" dirty="0" smtClean="0">
+              <a:t>Goal:</a:t>
+            </a:r>
+            <a:r>
+              <a:rPr lang="en-US" dirty="0" smtClean="0">
                 <a:solidFill>
-                  <a:srgbClr val="008000"/>
+                  <a:srgbClr val="0066FF"/>
                 </a:solidFill>
-                <a:latin typeface="Calibri" pitchFamily="34" charset="0"/>
               </a:rPr>
-              <a:t>Translation of the User Experience</a:t>
-            </a:r>
-          </a:p>
-          <a:p>
-            <a:pPr marL="914400" lvl="1" indent="-457200">
-              <a:buFontTx/>
-              <a:buChar char="•"/>
-            </a:pPr>
-            <a:r>
-              <a:rPr lang="en-US" sz="2000" b="0" dirty="0" smtClean="0">
-                <a:latin typeface="Calibri" pitchFamily="34" charset="0"/>
-              </a:rPr>
-              <a:t>The user should enjoy the mobile experience at least as much as their online one.</a:t>
-            </a:r>
-          </a:p>
-          <a:p>
-            <a:pPr marL="914400" lvl="1" indent="-457200">
-              <a:buFontTx/>
-              <a:buChar char="•"/>
-            </a:pPr>
-            <a:r>
-              <a:rPr lang="en-US" sz="2000" b="0" dirty="0" smtClean="0">
-                <a:latin typeface="Calibri" pitchFamily="34" charset="0"/>
-              </a:rPr>
-              <a:t>Users hate to relearn.  Allow for the frequency of practice on one platform to map well to the other.</a:t>
-            </a:r>
-          </a:p>
-          <a:p>
-            <a:pPr marL="914400" lvl="1" indent="-457200">
-              <a:buFontTx/>
-              <a:buChar char="•"/>
-            </a:pPr>
-            <a:r>
-              <a:rPr lang="en-US" sz="2000" b="0" dirty="0" smtClean="0">
-                <a:latin typeface="Calibri" pitchFamily="34" charset="0"/>
-              </a:rPr>
-              <a:t>Design should leverage mobile specific capabilities (e.g. gestures)</a:t>
-            </a:r>
-          </a:p>
-          <a:p>
-            <a:pPr marL="914400" lvl="1" indent="-457200"/>
-            <a:endParaRPr lang="en-US" sz="2600" dirty="0" smtClean="0">
-              <a:latin typeface="Calibri" pitchFamily="34" charset="0"/>
-            </a:endParaRPr>
-          </a:p>
-          <a:p>
-            <a:pPr marL="457200" indent="-457200">
-              <a:buFontTx/>
-              <a:buChar char="•"/>
-            </a:pPr>
-            <a:r>
-              <a:rPr lang="en-US" sz="2200" dirty="0" smtClean="0">
-                <a:solidFill>
-                  <a:srgbClr val="008000"/>
-                </a:solidFill>
-                <a:latin typeface="Calibri" pitchFamily="34" charset="0"/>
-              </a:rPr>
-              <a:t>Maintain brand cohesion  </a:t>
-            </a:r>
-          </a:p>
-          <a:p>
-            <a:pPr marL="914400" lvl="1" indent="-457200">
-              <a:buFontTx/>
-              <a:buChar char="•"/>
-            </a:pPr>
-            <a:r>
-              <a:rPr lang="en-US" sz="2000" b="0" dirty="0" smtClean="0">
-                <a:latin typeface="Calibri" pitchFamily="34" charset="0"/>
-              </a:rPr>
-              <a:t>Users should be able to quickly link the two platforms in their minds.</a:t>
-            </a:r>
-          </a:p>
-          <a:p>
-            <a:pPr marL="914400" lvl="1" indent="-457200">
-              <a:buFontTx/>
-              <a:buChar char="•"/>
-            </a:pPr>
-            <a:r>
-              <a:rPr lang="en-US" sz="2000" b="0" dirty="0" smtClean="0">
-                <a:latin typeface="Calibri" pitchFamily="34" charset="0"/>
-              </a:rPr>
-              <a:t>“</a:t>
-            </a:r>
-            <a:r>
-              <a:rPr lang="en-US" sz="2000" b="0" i="1" dirty="0" smtClean="0">
-                <a:latin typeface="Calibri" pitchFamily="34" charset="0"/>
-              </a:rPr>
-              <a:t>The three key rules of marketing are: brand recognition, brand recognition, and brand recognition</a:t>
-            </a:r>
-            <a:r>
-              <a:rPr lang="en-US" sz="2000" b="0" dirty="0" smtClean="0">
-                <a:latin typeface="Calibri" pitchFamily="34" charset="0"/>
-              </a:rPr>
-              <a:t>.”</a:t>
-            </a:r>
+              <a:t> </a:t>
+            </a:r>
+            <a:r>
+              <a:rPr lang="en-US" dirty="0" smtClean="0"/>
+              <a:t>Design a web based, data visualization application that educates users regarding </a:t>
+            </a:r>
+            <a:r>
+              <a:rPr lang="en-US" dirty="0" smtClean="0"/>
+              <a:t>these </a:t>
+            </a:r>
+            <a:r>
+              <a:rPr lang="en-US" dirty="0" smtClean="0"/>
+              <a:t>key </a:t>
+            </a:r>
+            <a:r>
+              <a:rPr lang="en-US" dirty="0" smtClean="0"/>
+              <a:t>dynamics including</a:t>
+            </a:r>
+            <a:r>
+              <a:rPr lang="en-US" dirty="0" smtClean="0"/>
+              <a:t>:</a:t>
+            </a:r>
+          </a:p>
+          <a:p>
+            <a:pPr lvl="1"/>
+            <a:r>
+              <a:rPr lang="en-US" dirty="0" smtClean="0"/>
+              <a:t>Geopolitics</a:t>
+            </a:r>
+          </a:p>
+          <a:p>
+            <a:pPr lvl="1"/>
+            <a:r>
+              <a:rPr lang="en-US" dirty="0" smtClean="0"/>
+              <a:t>National Economic </a:t>
+            </a:r>
+            <a:r>
+              <a:rPr lang="en-US" dirty="0" smtClean="0"/>
+              <a:t>Power/Output</a:t>
+            </a:r>
+            <a:endParaRPr lang="en-US" dirty="0" smtClean="0"/>
+          </a:p>
+          <a:p>
+            <a:pPr lvl="1"/>
+            <a:r>
+              <a:rPr lang="en-US" dirty="0" smtClean="0"/>
+              <a:t>National Population</a:t>
+            </a:r>
+          </a:p>
+          <a:p>
+            <a:pPr lvl="1"/>
+            <a:r>
+              <a:rPr lang="en-US" dirty="0" smtClean="0"/>
+              <a:t>Host </a:t>
+            </a:r>
+            <a:r>
+              <a:rPr lang="en-US" dirty="0" smtClean="0"/>
+              <a:t>City Selection</a:t>
+            </a:r>
+            <a:endParaRPr lang="en-US" dirty="0" smtClean="0"/>
+          </a:p>
+          <a:p>
+            <a:pPr lvl="1"/>
+            <a:r>
+              <a:rPr lang="en-US" dirty="0" smtClean="0"/>
+              <a:t>Number of Participating Athletes</a:t>
+            </a:r>
+          </a:p>
+          <a:p>
+            <a:pPr lvl="1"/>
+            <a:r>
+              <a:rPr lang="en-US" dirty="0" smtClean="0"/>
+              <a:t>Event Bias</a:t>
+            </a:r>
+          </a:p>
+          <a:p>
+            <a:pPr lvl="1"/>
+            <a:endParaRPr lang="en-US" dirty="0"/>
           </a:p>
         </p:txBody>
       </p:sp>
@@ -3682,342 +3318,9 @@
   <p:timing>
     <p:tnLst>
       <p:par>
-        <p:cTn id="1" dur="indefinite" restart="never" nodeType="tmRoot">
-          <p:childTnLst>
-            <p:seq concurrent="1" nextAc="seek">
-              <p:cTn id="2" dur="indefinite" nodeType="mainSeq">
-                <p:childTnLst>
-                  <p:par>
-                    <p:cTn id="3" fill="hold">
-                      <p:stCondLst>
-                        <p:cond delay="indefinite"/>
-                      </p:stCondLst>
-                      <p:childTnLst>
-                        <p:par>
-                          <p:cTn id="4" fill="hold">
-                            <p:stCondLst>
-                              <p:cond delay="0"/>
-                            </p:stCondLst>
-                            <p:childTnLst>
-                              <p:par>
-                                <p:cTn id="5" presetID="1" presetClass="entr" presetSubtype="0" fill="hold" grpId="0" nodeType="clickEffect">
-                                  <p:stCondLst>
-                                    <p:cond delay="0"/>
-                                  </p:stCondLst>
-                                  <p:childTnLst>
-                                    <p:set>
-                                      <p:cBhvr>
-                                        <p:cTn id="6" dur="1" fill="hold">
-                                          <p:stCondLst>
-                                            <p:cond delay="0"/>
-                                          </p:stCondLst>
-                                        </p:cTn>
-                                        <p:tgtEl>
-                                          <p:spTgt spid="38918">
-                                            <p:txEl>
-                                              <p:pRg st="2" end="2"/>
-                                            </p:txEl>
-                                          </p:spTgt>
-                                        </p:tgtEl>
-                                        <p:attrNameLst>
-                                          <p:attrName>style.visibility</p:attrName>
-                                        </p:attrNameLst>
-                                      </p:cBhvr>
-                                      <p:to>
-                                        <p:strVal val="visible"/>
-                                      </p:to>
-                                    </p:set>
-                                  </p:childTnLst>
-                                </p:cTn>
-                              </p:par>
-                            </p:childTnLst>
-                          </p:cTn>
-                        </p:par>
-                      </p:childTnLst>
-                    </p:cTn>
-                  </p:par>
-                  <p:par>
-                    <p:cTn id="7" fill="hold">
-                      <p:stCondLst>
-                        <p:cond delay="indefinite"/>
-                      </p:stCondLst>
-                      <p:childTnLst>
-                        <p:par>
-                          <p:cTn id="8" fill="hold">
-                            <p:stCondLst>
-                              <p:cond delay="0"/>
-                            </p:stCondLst>
-                            <p:childTnLst>
-                              <p:par>
-                                <p:cTn id="9" presetID="1" presetClass="entr" presetSubtype="0" fill="hold" grpId="0" nodeType="clickEffect">
-                                  <p:stCondLst>
-                                    <p:cond delay="0"/>
-                                  </p:stCondLst>
-                                  <p:childTnLst>
-                                    <p:set>
-                                      <p:cBhvr>
-                                        <p:cTn id="10" dur="1" fill="hold">
-                                          <p:stCondLst>
-                                            <p:cond delay="0"/>
-                                          </p:stCondLst>
-                                        </p:cTn>
-                                        <p:tgtEl>
-                                          <p:spTgt spid="38918">
-                                            <p:txEl>
-                                              <p:pRg st="3" end="3"/>
-                                            </p:txEl>
-                                          </p:spTgt>
-                                        </p:tgtEl>
-                                        <p:attrNameLst>
-                                          <p:attrName>style.visibility</p:attrName>
-                                        </p:attrNameLst>
-                                      </p:cBhvr>
-                                      <p:to>
-                                        <p:strVal val="visible"/>
-                                      </p:to>
-                                    </p:set>
-                                  </p:childTnLst>
-                                </p:cTn>
-                              </p:par>
-                            </p:childTnLst>
-                          </p:cTn>
-                        </p:par>
-                      </p:childTnLst>
-                    </p:cTn>
-                  </p:par>
-                  <p:par>
-                    <p:cTn id="11" fill="hold">
-                      <p:stCondLst>
-                        <p:cond delay="indefinite"/>
-                      </p:stCondLst>
-                      <p:childTnLst>
-                        <p:par>
-                          <p:cTn id="12" fill="hold">
-                            <p:stCondLst>
-                              <p:cond delay="0"/>
-                            </p:stCondLst>
-                            <p:childTnLst>
-                              <p:par>
-                                <p:cTn id="13" presetID="1" presetClass="entr" presetSubtype="0" fill="hold" grpId="0" nodeType="clickEffect">
-                                  <p:stCondLst>
-                                    <p:cond delay="0"/>
-                                  </p:stCondLst>
-                                  <p:childTnLst>
-                                    <p:set>
-                                      <p:cBhvr>
-                                        <p:cTn id="14" dur="1" fill="hold">
-                                          <p:stCondLst>
-                                            <p:cond delay="0"/>
-                                          </p:stCondLst>
-                                        </p:cTn>
-                                        <p:tgtEl>
-                                          <p:spTgt spid="38918">
-                                            <p:txEl>
-                                              <p:pRg st="4" end="4"/>
-                                            </p:txEl>
-                                          </p:spTgt>
-                                        </p:tgtEl>
-                                        <p:attrNameLst>
-                                          <p:attrName>style.visibility</p:attrName>
-                                        </p:attrNameLst>
-                                      </p:cBhvr>
-                                      <p:to>
-                                        <p:strVal val="visible"/>
-                                      </p:to>
-                                    </p:set>
-                                  </p:childTnLst>
-                                </p:cTn>
-                              </p:par>
-                            </p:childTnLst>
-                          </p:cTn>
-                        </p:par>
-                      </p:childTnLst>
-                    </p:cTn>
-                  </p:par>
-                  <p:par>
-                    <p:cTn id="15" fill="hold">
-                      <p:stCondLst>
-                        <p:cond delay="indefinite"/>
-                      </p:stCondLst>
-                      <p:childTnLst>
-                        <p:par>
-                          <p:cTn id="16" fill="hold">
-                            <p:stCondLst>
-                              <p:cond delay="0"/>
-                            </p:stCondLst>
-                            <p:childTnLst>
-                              <p:par>
-                                <p:cTn id="17" presetID="1" presetClass="entr" presetSubtype="0" fill="hold" grpId="0" nodeType="clickEffect">
-                                  <p:stCondLst>
-                                    <p:cond delay="0"/>
-                                  </p:stCondLst>
-                                  <p:childTnLst>
-                                    <p:set>
-                                      <p:cBhvr>
-                                        <p:cTn id="18" dur="1" fill="hold">
-                                          <p:stCondLst>
-                                            <p:cond delay="0"/>
-                                          </p:stCondLst>
-                                        </p:cTn>
-                                        <p:tgtEl>
-                                          <p:spTgt spid="38918">
-                                            <p:txEl>
-                                              <p:pRg st="5" end="5"/>
-                                            </p:txEl>
-                                          </p:spTgt>
-                                        </p:tgtEl>
-                                        <p:attrNameLst>
-                                          <p:attrName>style.visibility</p:attrName>
-                                        </p:attrNameLst>
-                                      </p:cBhvr>
-                                      <p:to>
-                                        <p:strVal val="visible"/>
-                                      </p:to>
-                                    </p:set>
-                                  </p:childTnLst>
-                                </p:cTn>
-                              </p:par>
-                            </p:childTnLst>
-                          </p:cTn>
-                        </p:par>
-                      </p:childTnLst>
-                    </p:cTn>
-                  </p:par>
-                  <p:par>
-                    <p:cTn id="19" fill="hold">
-                      <p:stCondLst>
-                        <p:cond delay="indefinite"/>
-                      </p:stCondLst>
-                      <p:childTnLst>
-                        <p:par>
-                          <p:cTn id="20" fill="hold">
-                            <p:stCondLst>
-                              <p:cond delay="0"/>
-                            </p:stCondLst>
-                            <p:childTnLst>
-                              <p:par>
-                                <p:cTn id="21" presetID="1" presetClass="entr" presetSubtype="0" fill="hold" grpId="0" nodeType="clickEffect">
-                                  <p:stCondLst>
-                                    <p:cond delay="0"/>
-                                  </p:stCondLst>
-                                  <p:childTnLst>
-                                    <p:set>
-                                      <p:cBhvr>
-                                        <p:cTn id="22" dur="1" fill="hold">
-                                          <p:stCondLst>
-                                            <p:cond delay="0"/>
-                                          </p:stCondLst>
-                                        </p:cTn>
-                                        <p:tgtEl>
-                                          <p:spTgt spid="38918">
-                                            <p:txEl>
-                                              <p:pRg st="7" end="7"/>
-                                            </p:txEl>
-                                          </p:spTgt>
-                                        </p:tgtEl>
-                                        <p:attrNameLst>
-                                          <p:attrName>style.visibility</p:attrName>
-                                        </p:attrNameLst>
-                                      </p:cBhvr>
-                                      <p:to>
-                                        <p:strVal val="visible"/>
-                                      </p:to>
-                                    </p:set>
-                                  </p:childTnLst>
-                                </p:cTn>
-                              </p:par>
-                              <p:par>
-                                <p:cTn id="23" presetID="1" presetClass="entr" presetSubtype="0" fill="hold" grpId="0" nodeType="withEffect">
-                                  <p:stCondLst>
-                                    <p:cond delay="0"/>
-                                  </p:stCondLst>
-                                  <p:childTnLst>
-                                    <p:set>
-                                      <p:cBhvr>
-                                        <p:cTn id="24" dur="1" fill="hold">
-                                          <p:stCondLst>
-                                            <p:cond delay="0"/>
-                                          </p:stCondLst>
-                                        </p:cTn>
-                                        <p:tgtEl>
-                                          <p:spTgt spid="38918">
-                                            <p:txEl>
-                                              <p:pRg st="8" end="8"/>
-                                            </p:txEl>
-                                          </p:spTgt>
-                                        </p:tgtEl>
-                                        <p:attrNameLst>
-                                          <p:attrName>style.visibility</p:attrName>
-                                        </p:attrNameLst>
-                                      </p:cBhvr>
-                                      <p:to>
-                                        <p:strVal val="visible"/>
-                                      </p:to>
-                                    </p:set>
-                                  </p:childTnLst>
-                                </p:cTn>
-                              </p:par>
-                              <p:par>
-                                <p:cTn id="25" presetID="1" presetClass="entr" presetSubtype="0" fill="hold" grpId="0" nodeType="withEffect">
-                                  <p:stCondLst>
-                                    <p:cond delay="0"/>
-                                  </p:stCondLst>
-                                  <p:childTnLst>
-                                    <p:set>
-                                      <p:cBhvr>
-                                        <p:cTn id="26" dur="1" fill="hold">
-                                          <p:stCondLst>
-                                            <p:cond delay="0"/>
-                                          </p:stCondLst>
-                                        </p:cTn>
-                                        <p:tgtEl>
-                                          <p:spTgt spid="38918">
-                                            <p:txEl>
-                                              <p:pRg st="9" end="9"/>
-                                            </p:txEl>
-                                          </p:spTgt>
-                                        </p:tgtEl>
-                                        <p:attrNameLst>
-                                          <p:attrName>style.visibility</p:attrName>
-                                        </p:attrNameLst>
-                                      </p:cBhvr>
-                                      <p:to>
-                                        <p:strVal val="visible"/>
-                                      </p:to>
-                                    </p:set>
-                                  </p:childTnLst>
-                                </p:cTn>
-                              </p:par>
-                            </p:childTnLst>
-                          </p:cTn>
-                        </p:par>
-                      </p:childTnLst>
-                    </p:cTn>
-                  </p:par>
-                </p:childTnLst>
-              </p:cTn>
-              <p:prevCondLst>
-                <p:cond evt="onPrev" delay="0">
-                  <p:tgtEl>
-                    <p:sldTgt/>
-                  </p:tgtEl>
-                </p:cond>
-              </p:prevCondLst>
-              <p:nextCondLst>
-                <p:cond evt="onNext" delay="0">
-                  <p:tgtEl>
-                    <p:sldTgt/>
-                  </p:tgtEl>
-                </p:cond>
-              </p:nextCondLst>
-            </p:seq>
-          </p:childTnLst>
-        </p:cTn>
+        <p:cTn id="1" dur="indefinite" restart="never" nodeType="tmRoot"/>
       </p:par>
     </p:tnLst>
-    <p:bldLst>
-      <p:bldP spid="38918" grpId="0" uiExpand="1" build="allAtOnce"/>
-    </p:bldLst>
   </p:timing>
 </p:sld>
 </file>
@@ -4041,7 +3344,7 @@
       </p:grpSpPr>
       <p:sp>
         <p:nvSpPr>
-          <p:cNvPr id="11265" name="Rectangle 2"/>
+          <p:cNvPr id="2" name="Title 1"/>
           <p:cNvSpPr>
             <a:spLocks noGrp="1"/>
           </p:cNvSpPr>
@@ -4051,464 +3354,90 @@
         </p:nvSpPr>
         <p:spPr/>
         <p:txBody>
-          <a:bodyPr/>
-          <a:lstStyle/>
-          <a:p>
-            <a:r>
-              <a:rPr lang="en-US" sz="2800" dirty="0" smtClean="0"/>
-              <a:t>Web Design </a:t>
-            </a:r>
-            <a:r>
-              <a:rPr lang="en-US" sz="2800" dirty="0" smtClean="0"/>
-              <a:t>Patterns &amp; Techniques</a:t>
-            </a:r>
-          </a:p>
-        </p:txBody>
-      </p:sp>
-      <p:sp>
-        <p:nvSpPr>
-          <p:cNvPr id="11266" name="Rectangle 3"/>
-          <p:cNvSpPr>
-            <a:spLocks noGrp="1"/>
-          </p:cNvSpPr>
-          <p:nvPr>
-            <p:ph type="body" idx="1"/>
-          </p:nvPr>
-        </p:nvSpPr>
-        <p:spPr>
-          <a:xfrm>
-            <a:off x="457200" y="989012"/>
-            <a:ext cx="8229600" cy="5487987"/>
-          </a:xfrm>
-        </p:spPr>
-        <p:txBody>
           <a:bodyPr>
-            <a:normAutofit fontScale="85000" lnSpcReduction="20000"/>
+            <a:normAutofit fontScale="90000"/>
           </a:bodyPr>
           <a:lstStyle/>
           <a:p>
-            <a:pPr algn="ctr">
-              <a:lnSpc>
-                <a:spcPct val="90000"/>
-              </a:lnSpc>
-              <a:buFont typeface="Arial" charset="0"/>
-              <a:buNone/>
-            </a:pPr>
-            <a:r>
-              <a:rPr lang="en-US" sz="2200" b="1" dirty="0" smtClean="0">
-                <a:solidFill>
-                  <a:srgbClr val="000066"/>
-                </a:solidFill>
-              </a:rPr>
-              <a:t>Web design </a:t>
-            </a:r>
-            <a:r>
-              <a:rPr lang="en-US" sz="2200" b="1" dirty="0" smtClean="0">
-                <a:solidFill>
-                  <a:srgbClr val="000066"/>
-                </a:solidFill>
-              </a:rPr>
-              <a:t>p</a:t>
-            </a:r>
-            <a:r>
-              <a:rPr lang="en-US" sz="2200" b="1" dirty="0" smtClean="0">
-                <a:solidFill>
-                  <a:srgbClr val="000066"/>
-                </a:solidFill>
-              </a:rPr>
-              <a:t>atterns </a:t>
-            </a:r>
-            <a:r>
-              <a:rPr lang="en-US" sz="2200" b="1" dirty="0" smtClean="0">
-                <a:solidFill>
-                  <a:srgbClr val="000066"/>
-                </a:solidFill>
-              </a:rPr>
-              <a:t>and techniques used include:</a:t>
-            </a:r>
-            <a:r>
-              <a:rPr lang="en-US" sz="2200" dirty="0" smtClean="0"/>
-              <a:t/>
-            </a:r>
-            <a:br>
-              <a:rPr lang="en-US" sz="2200" dirty="0" smtClean="0"/>
-            </a:br>
-            <a:endParaRPr lang="en-US" sz="2200" dirty="0" smtClean="0"/>
+            <a:r>
+              <a:rPr lang="en-US" dirty="0" smtClean="0"/>
+              <a:t>Typical Application User</a:t>
+            </a:r>
+            <a:endParaRPr lang="en-US" dirty="0"/>
+          </a:p>
+        </p:txBody>
+      </p:sp>
+      <p:sp>
+        <p:nvSpPr>
+          <p:cNvPr id="3" name="Content Placeholder 2"/>
+          <p:cNvSpPr>
+            <a:spLocks noGrp="1"/>
+          </p:cNvSpPr>
+          <p:nvPr>
+            <p:ph idx="1"/>
+          </p:nvPr>
+        </p:nvSpPr>
+        <p:spPr/>
+        <p:txBody>
+          <a:bodyPr>
+            <a:normAutofit/>
+          </a:bodyPr>
+          <a:lstStyle/>
+          <a:p>
+            <a:r>
+              <a:rPr lang="en-US" dirty="0" smtClean="0"/>
+              <a:t>The application’s user base is broad.</a:t>
+            </a:r>
+          </a:p>
+          <a:p>
+            <a:endParaRPr lang="en-US" sz="1400" dirty="0" smtClean="0"/>
+          </a:p>
+          <a:p>
+            <a:r>
+              <a:rPr lang="en-US" dirty="0" smtClean="0"/>
+              <a:t>Geared primarily, but not exclusively, towards those that have an existing interest in the Olympics and want to learn about the games at a much greater depth.</a:t>
+            </a:r>
+          </a:p>
+          <a:p>
+            <a:endParaRPr lang="en-US" dirty="0" smtClean="0"/>
+          </a:p>
+          <a:p>
+            <a:r>
+              <a:rPr lang="en-US" dirty="0" smtClean="0"/>
+              <a:t>Much of the analysis in the application is United States focused.  The reasons we did this include:</a:t>
+            </a:r>
           </a:p>
           <a:p>
             <a:pPr lvl="1"/>
             <a:r>
-              <a:rPr lang="en-US" b="1" dirty="0" smtClean="0">
-                <a:solidFill>
-                  <a:srgbClr val="008000"/>
-                </a:solidFill>
-              </a:rPr>
-              <a:t>Feature Search Browse</a:t>
-            </a:r>
-          </a:p>
-          <a:p>
-            <a:pPr lvl="1">
-              <a:buNone/>
-            </a:pPr>
-            <a:endParaRPr lang="en-US" sz="900" b="1" dirty="0" smtClean="0">
-              <a:solidFill>
-                <a:srgbClr val="008000"/>
-              </a:solidFill>
-            </a:endParaRPr>
-          </a:p>
-          <a:p>
-            <a:pPr lvl="1">
-              <a:lnSpc>
-                <a:spcPct val="90000"/>
-              </a:lnSpc>
-            </a:pPr>
-            <a:r>
-              <a:rPr lang="en-US" sz="2000" b="1" dirty="0" smtClean="0">
-                <a:solidFill>
-                  <a:srgbClr val="008000"/>
-                </a:solidFill>
-              </a:rPr>
-              <a:t>Visual Framework with Persistent </a:t>
-            </a:r>
-            <a:r>
-              <a:rPr lang="en-US" sz="2000" b="1" dirty="0" smtClean="0">
-                <a:solidFill>
-                  <a:srgbClr val="008000"/>
-                </a:solidFill>
-              </a:rPr>
-              <a:t>Navigation</a:t>
-            </a:r>
-          </a:p>
-          <a:p>
-            <a:pPr lvl="2">
-              <a:lnSpc>
-                <a:spcPct val="90000"/>
-              </a:lnSpc>
-            </a:pPr>
-            <a:r>
-              <a:rPr lang="en-US" sz="1800" dirty="0" smtClean="0">
-                <a:solidFill>
-                  <a:srgbClr val="003300"/>
-                </a:solidFill>
-              </a:rPr>
-              <a:t>Bonus: Built-in images to enable </a:t>
-            </a:r>
-            <a:r>
-              <a:rPr lang="en-US" sz="1800" dirty="0" smtClean="0">
-                <a:solidFill>
-                  <a:srgbClr val="003300"/>
-                </a:solidFill>
-              </a:rPr>
-              <a:t>recognition rather than recall</a:t>
-            </a:r>
-            <a:r>
-              <a:rPr lang="en-US" sz="1800" dirty="0" smtClean="0">
-                <a:solidFill>
-                  <a:srgbClr val="003300"/>
-                </a:solidFill>
-              </a:rPr>
-              <a:t>.</a:t>
-            </a:r>
-          </a:p>
-          <a:p>
-            <a:pPr lvl="1">
-              <a:buNone/>
-            </a:pPr>
-            <a:endParaRPr lang="en-US" sz="900" b="1" dirty="0" smtClean="0">
-              <a:solidFill>
-                <a:srgbClr val="008000"/>
-              </a:solidFill>
-            </a:endParaRPr>
-          </a:p>
-          <a:p>
-            <a:pPr lvl="1">
-              <a:lnSpc>
-                <a:spcPct val="90000"/>
-              </a:lnSpc>
-            </a:pPr>
-            <a:r>
-              <a:rPr lang="en-US" sz="2000" b="1" dirty="0" smtClean="0">
-                <a:solidFill>
-                  <a:srgbClr val="008000"/>
-                </a:solidFill>
-              </a:rPr>
-              <a:t>Breadcrumbs</a:t>
-            </a:r>
-            <a:endParaRPr lang="en-US" sz="2000" b="1" dirty="0" smtClean="0">
-              <a:solidFill>
-                <a:srgbClr val="008000"/>
-              </a:solidFill>
-            </a:endParaRPr>
-          </a:p>
-          <a:p>
-            <a:pPr lvl="2">
-              <a:lnSpc>
-                <a:spcPct val="90000"/>
-              </a:lnSpc>
-            </a:pPr>
-            <a:r>
-              <a:rPr lang="en-US" sz="1800" dirty="0" smtClean="0"/>
-              <a:t>“You are Here”</a:t>
-            </a:r>
-          </a:p>
-          <a:p>
-            <a:pPr lvl="1">
-              <a:buNone/>
-            </a:pPr>
-            <a:endParaRPr lang="en-US" sz="900" b="1" dirty="0" smtClean="0">
-              <a:solidFill>
-                <a:srgbClr val="008000"/>
-              </a:solidFill>
-            </a:endParaRPr>
+              <a:rPr lang="en-US" dirty="0" smtClean="0"/>
+              <a:t>The US has one of the most extensive and compelling Olympic histories.</a:t>
+            </a:r>
           </a:p>
           <a:p>
             <a:pPr lvl="1"/>
             <a:r>
-              <a:rPr lang="en-US" b="1" dirty="0" smtClean="0">
-                <a:solidFill>
-                  <a:srgbClr val="008000"/>
-                </a:solidFill>
-              </a:rPr>
-              <a:t>Escape Hatch</a:t>
-            </a:r>
-          </a:p>
-          <a:p>
-            <a:pPr lvl="1">
-              <a:buNone/>
-            </a:pPr>
-            <a:endParaRPr lang="en-US" sz="900" b="1" dirty="0" smtClean="0">
-              <a:solidFill>
-                <a:srgbClr val="008000"/>
-              </a:solidFill>
-            </a:endParaRPr>
+              <a:rPr lang="en-US" dirty="0" smtClean="0"/>
+              <a:t>Increased relevance for class discussion and </a:t>
+            </a:r>
+            <a:r>
+              <a:rPr lang="en-US" dirty="0" smtClean="0"/>
+              <a:t>presentation</a:t>
+            </a:r>
           </a:p>
           <a:p>
             <a:pPr lvl="1"/>
             <a:r>
-              <a:rPr lang="en-US" b="1" dirty="0" smtClean="0">
-                <a:solidFill>
-                  <a:srgbClr val="008000"/>
-                </a:solidFill>
-              </a:rPr>
-              <a:t>Carousel</a:t>
-            </a:r>
-            <a:endParaRPr lang="en-US" b="1" dirty="0" smtClean="0">
-              <a:solidFill>
-                <a:srgbClr val="008000"/>
-              </a:solidFill>
-            </a:endParaRPr>
-          </a:p>
-          <a:p>
-            <a:pPr lvl="2"/>
-            <a:r>
-              <a:rPr lang="en-US" sz="1800" dirty="0" smtClean="0">
-                <a:solidFill>
-                  <a:srgbClr val="003300"/>
-                </a:solidFill>
-              </a:rPr>
-              <a:t>Iconic Olympic images on the home </a:t>
-            </a:r>
-            <a:r>
-              <a:rPr lang="en-US" sz="1800" dirty="0" smtClean="0">
-                <a:solidFill>
-                  <a:srgbClr val="003300"/>
-                </a:solidFill>
-              </a:rPr>
-              <a:t>page</a:t>
-            </a:r>
-          </a:p>
-          <a:p>
-            <a:pPr lvl="1">
-              <a:buNone/>
-            </a:pPr>
-            <a:endParaRPr lang="en-US" sz="900" b="1" dirty="0" smtClean="0">
-              <a:solidFill>
-                <a:srgbClr val="008000"/>
-              </a:solidFill>
-            </a:endParaRPr>
-          </a:p>
-          <a:p>
-            <a:pPr lvl="1">
-              <a:lnSpc>
-                <a:spcPct val="90000"/>
-              </a:lnSpc>
-            </a:pPr>
-            <a:r>
-              <a:rPr lang="en-US" b="1" dirty="0" smtClean="0">
-                <a:solidFill>
-                  <a:srgbClr val="008000"/>
-                </a:solidFill>
-              </a:rPr>
-              <a:t>Taglines</a:t>
-            </a:r>
-          </a:p>
-          <a:p>
-            <a:pPr lvl="1">
-              <a:buNone/>
-            </a:pPr>
-            <a:endParaRPr lang="en-US" sz="900" b="1" dirty="0" smtClean="0">
-              <a:solidFill>
-                <a:srgbClr val="008000"/>
-              </a:solidFill>
-            </a:endParaRPr>
-          </a:p>
-          <a:p>
-            <a:pPr lvl="1">
-              <a:lnSpc>
-                <a:spcPct val="90000"/>
-              </a:lnSpc>
-            </a:pPr>
-            <a:r>
-              <a:rPr lang="en-US" b="1" dirty="0" smtClean="0">
-                <a:solidFill>
-                  <a:srgbClr val="008000"/>
-                </a:solidFill>
-              </a:rPr>
-              <a:t>Hover Tools</a:t>
-            </a:r>
-          </a:p>
-          <a:p>
-            <a:pPr lvl="2">
-              <a:lnSpc>
-                <a:spcPct val="90000"/>
-              </a:lnSpc>
-            </a:pPr>
-            <a:r>
-              <a:rPr lang="en-US" dirty="0" smtClean="0">
-                <a:solidFill>
-                  <a:srgbClr val="003300"/>
-                </a:solidFill>
-              </a:rPr>
-              <a:t>Menu selection</a:t>
-            </a:r>
-          </a:p>
-          <a:p>
-            <a:pPr lvl="2">
-              <a:lnSpc>
-                <a:spcPct val="90000"/>
-              </a:lnSpc>
-            </a:pPr>
-            <a:r>
-              <a:rPr lang="en-US" dirty="0" smtClean="0">
-                <a:solidFill>
-                  <a:srgbClr val="003300"/>
-                </a:solidFill>
-              </a:rPr>
-              <a:t>Data visualization tools</a:t>
-            </a:r>
-          </a:p>
-          <a:p>
-            <a:pPr lvl="1">
-              <a:buNone/>
-            </a:pPr>
-            <a:endParaRPr lang="en-US" sz="900" b="1" dirty="0" smtClean="0">
-              <a:solidFill>
-                <a:srgbClr val="008000"/>
-              </a:solidFill>
-            </a:endParaRPr>
-          </a:p>
-          <a:p>
-            <a:pPr lvl="1">
-              <a:lnSpc>
-                <a:spcPct val="90000"/>
-              </a:lnSpc>
-            </a:pPr>
-            <a:r>
-              <a:rPr lang="en-US" b="1" dirty="0" smtClean="0">
-                <a:solidFill>
-                  <a:srgbClr val="008000"/>
-                </a:solidFill>
-              </a:rPr>
-              <a:t>Grid of Equals</a:t>
-            </a:r>
-          </a:p>
-          <a:p>
-            <a:pPr lvl="1">
-              <a:buNone/>
-            </a:pPr>
-            <a:endParaRPr lang="en-US" sz="900" b="1" dirty="0" smtClean="0">
-              <a:solidFill>
-                <a:srgbClr val="008000"/>
-              </a:solidFill>
-            </a:endParaRPr>
-          </a:p>
-          <a:p>
-            <a:pPr lvl="1">
-              <a:lnSpc>
-                <a:spcPct val="90000"/>
-              </a:lnSpc>
-            </a:pPr>
-            <a:r>
-              <a:rPr lang="en-US" sz="2000" b="1" dirty="0" smtClean="0">
-                <a:solidFill>
-                  <a:srgbClr val="008000"/>
-                </a:solidFill>
-              </a:rPr>
-              <a:t>Color Standardization</a:t>
-            </a:r>
-          </a:p>
-          <a:p>
-            <a:pPr lvl="2">
-              <a:lnSpc>
-                <a:spcPct val="90000"/>
-              </a:lnSpc>
-            </a:pPr>
-            <a:r>
-              <a:rPr lang="en-US" sz="1800" dirty="0" smtClean="0">
-                <a:solidFill>
-                  <a:srgbClr val="003300"/>
-                </a:solidFill>
-              </a:rPr>
-              <a:t>Concept presented by guest lecturer Robert Nicholson</a:t>
-            </a:r>
-          </a:p>
-          <a:p>
-            <a:pPr lvl="1">
-              <a:lnSpc>
-                <a:spcPct val="90000"/>
-              </a:lnSpc>
-            </a:pPr>
-            <a:endParaRPr lang="en-US" b="1" dirty="0" smtClean="0">
-              <a:solidFill>
-                <a:srgbClr val="008000"/>
-              </a:solidFill>
-            </a:endParaRPr>
-          </a:p>
-          <a:p>
-            <a:pPr lvl="2">
-              <a:lnSpc>
-                <a:spcPct val="90000"/>
-              </a:lnSpc>
-            </a:pPr>
-            <a:endParaRPr lang="en-US" dirty="0" smtClean="0">
-              <a:solidFill>
-                <a:srgbClr val="003300"/>
-              </a:solidFill>
-            </a:endParaRPr>
-          </a:p>
-          <a:p>
-            <a:pPr lvl="2">
-              <a:lnSpc>
-                <a:spcPct val="90000"/>
-              </a:lnSpc>
-            </a:pPr>
-            <a:endParaRPr lang="en-US" b="1" dirty="0" smtClean="0">
-              <a:solidFill>
-                <a:srgbClr val="008000"/>
-              </a:solidFill>
-            </a:endParaRPr>
-          </a:p>
-          <a:p>
-            <a:pPr lvl="2">
-              <a:lnSpc>
-                <a:spcPct val="90000"/>
-              </a:lnSpc>
-            </a:pPr>
-            <a:endParaRPr lang="en-US" sz="1800" dirty="0" smtClean="0">
-              <a:solidFill>
-                <a:srgbClr val="003300"/>
-              </a:solidFill>
-            </a:endParaRPr>
+              <a:rPr lang="en-US" dirty="0" smtClean="0"/>
+              <a:t>Desire to enlighten ourselves regarding the biases in American Olympic television coverage.</a:t>
+            </a:r>
+            <a:endParaRPr lang="en-US" dirty="0" smtClean="0"/>
+          </a:p>
+          <a:p>
+            <a:endParaRPr lang="en-US" dirty="0" smtClean="0"/>
+          </a:p>
+          <a:p>
+            <a:endParaRPr lang="en-US" dirty="0" smtClean="0"/>
           </a:p>
         </p:txBody>
       </p:sp>
@@ -4575,6 +3504,614 @@
       </p:grpSpPr>
       <p:sp>
         <p:nvSpPr>
+          <p:cNvPr id="2" name="Title 1"/>
+          <p:cNvSpPr>
+            <a:spLocks noGrp="1"/>
+          </p:cNvSpPr>
+          <p:nvPr>
+            <p:ph type="title"/>
+          </p:nvPr>
+        </p:nvSpPr>
+        <p:spPr/>
+        <p:txBody>
+          <a:bodyPr>
+            <a:normAutofit fontScale="90000"/>
+          </a:bodyPr>
+          <a:lstStyle/>
+          <a:p>
+            <a:r>
+              <a:rPr lang="en-US" dirty="0" smtClean="0"/>
+              <a:t>Scope Disclosure</a:t>
+            </a:r>
+            <a:endParaRPr lang="en-US" dirty="0"/>
+          </a:p>
+        </p:txBody>
+      </p:sp>
+      <p:sp>
+        <p:nvSpPr>
+          <p:cNvPr id="3" name="Content Placeholder 2"/>
+          <p:cNvSpPr>
+            <a:spLocks noGrp="1"/>
+          </p:cNvSpPr>
+          <p:nvPr>
+            <p:ph idx="1"/>
+          </p:nvPr>
+        </p:nvSpPr>
+        <p:spPr/>
+        <p:txBody>
+          <a:bodyPr/>
+          <a:lstStyle/>
+          <a:p>
+            <a:r>
+              <a:rPr lang="en-US" dirty="0" smtClean="0"/>
+              <a:t>For clarity of data presentation, this project focused </a:t>
+            </a:r>
+            <a:r>
+              <a:rPr lang="en-US" b="1" dirty="0" smtClean="0">
+                <a:solidFill>
+                  <a:srgbClr val="0070C0"/>
+                </a:solidFill>
+              </a:rPr>
+              <a:t>solely</a:t>
+            </a:r>
+            <a:r>
+              <a:rPr lang="en-US" dirty="0" smtClean="0"/>
+              <a:t> on the summer Olympics. </a:t>
+            </a:r>
+          </a:p>
+          <a:p>
+            <a:endParaRPr lang="en-US" dirty="0" smtClean="0"/>
+          </a:p>
+          <a:p>
+            <a:r>
+              <a:rPr lang="en-US" dirty="0" smtClean="0"/>
+              <a:t>Since the winter Olympics are generally smaller with fewer participating nations and athletes, some of the nuances of the analysis would not have been possible. </a:t>
+            </a:r>
+          </a:p>
+          <a:p>
+            <a:pPr lvl="1">
+              <a:buNone/>
+            </a:pPr>
+            <a:endParaRPr lang="en-US" dirty="0" smtClean="0"/>
+          </a:p>
+          <a:p>
+            <a:r>
+              <a:rPr lang="en-US" dirty="0" smtClean="0"/>
+              <a:t>Any general references to the “Olympics” in the subsequent discussion applies to the summer games only.</a:t>
+            </a:r>
+          </a:p>
+          <a:p>
+            <a:endParaRPr lang="en-US" dirty="0"/>
+          </a:p>
+        </p:txBody>
+      </p:sp>
+      <p:sp>
+        <p:nvSpPr>
+          <p:cNvPr id="4" name="Slide Number Placeholder 3"/>
+          <p:cNvSpPr>
+            <a:spLocks noGrp="1"/>
+          </p:cNvSpPr>
+          <p:nvPr>
+            <p:ph type="sldNum" sz="quarter" idx="11"/>
+          </p:nvPr>
+        </p:nvSpPr>
+        <p:spPr/>
+        <p:txBody>
+          <a:bodyPr/>
+          <a:lstStyle/>
+          <a:p>
+            <a:pPr>
+              <a:defRPr/>
+            </a:pPr>
+            <a:fld id="{D696A8AA-6ACE-4ADB-BE5C-DDEA34821D66}" type="slidenum">
+              <a:rPr lang="en-US" smtClean="0"/>
+              <a:pPr>
+                <a:defRPr/>
+              </a:pPr>
+              <a:t>5</a:t>
+            </a:fld>
+            <a:endParaRPr lang="en-US"/>
+          </a:p>
+        </p:txBody>
+      </p:sp>
+    </p:spTree>
+  </p:cSld>
+  <p:clrMapOvr>
+    <a:masterClrMapping/>
+  </p:clrMapOvr>
+  <p:timing>
+    <p:tnLst>
+      <p:par>
+        <p:cTn id="1" dur="indefinite" restart="never" nodeType="tmRoot"/>
+      </p:par>
+    </p:tnLst>
+  </p:timing>
+</p:sld>
+</file>
+
+<file path=ppt/slides/slide6.xml><?xml version="1.0" encoding="utf-8"?>
+<p:sld xmlns:a="http://schemas.openxmlformats.org/drawingml/2006/main" xmlns:r="http://schemas.openxmlformats.org/officeDocument/2006/relationships" xmlns:p="http://schemas.openxmlformats.org/presentationml/2006/main">
+  <p:cSld>
+    <p:spTree>
+      <p:nvGrpSpPr>
+        <p:cNvPr id="1" name=""/>
+        <p:cNvGrpSpPr/>
+        <p:nvPr/>
+      </p:nvGrpSpPr>
+      <p:grpSpPr>
+        <a:xfrm>
+          <a:off x="0" y="0"/>
+          <a:ext cx="0" cy="0"/>
+          <a:chOff x="0" y="0"/>
+          <a:chExt cx="0" cy="0"/>
+        </a:xfrm>
+      </p:grpSpPr>
+      <p:sp>
+        <p:nvSpPr>
+          <p:cNvPr id="11265" name="Rectangle 2"/>
+          <p:cNvSpPr>
+            <a:spLocks noGrp="1"/>
+          </p:cNvSpPr>
+          <p:nvPr>
+            <p:ph type="title"/>
+          </p:nvPr>
+        </p:nvSpPr>
+        <p:spPr/>
+        <p:txBody>
+          <a:bodyPr/>
+          <a:lstStyle/>
+          <a:p>
+            <a:r>
+              <a:rPr lang="en-US" sz="2800" dirty="0" smtClean="0"/>
+              <a:t>Web Design Patterns &amp; Techniques</a:t>
+            </a:r>
+          </a:p>
+        </p:txBody>
+      </p:sp>
+      <p:sp>
+        <p:nvSpPr>
+          <p:cNvPr id="11266" name="Rectangle 3"/>
+          <p:cNvSpPr>
+            <a:spLocks noGrp="1"/>
+          </p:cNvSpPr>
+          <p:nvPr>
+            <p:ph type="body" idx="1"/>
+          </p:nvPr>
+        </p:nvSpPr>
+        <p:spPr>
+          <a:xfrm>
+            <a:off x="457200" y="989012"/>
+            <a:ext cx="8229600" cy="5487987"/>
+          </a:xfrm>
+        </p:spPr>
+        <p:txBody>
+          <a:bodyPr>
+            <a:normAutofit fontScale="85000" lnSpcReduction="20000"/>
+          </a:bodyPr>
+          <a:lstStyle/>
+          <a:p>
+            <a:pPr algn="ctr">
+              <a:lnSpc>
+                <a:spcPct val="90000"/>
+              </a:lnSpc>
+              <a:buFont typeface="Arial" charset="0"/>
+              <a:buNone/>
+            </a:pPr>
+            <a:r>
+              <a:rPr lang="en-US" sz="2200" b="1" dirty="0" smtClean="0">
+                <a:solidFill>
+                  <a:srgbClr val="000066"/>
+                </a:solidFill>
+              </a:rPr>
+              <a:t>Web design patterns and techniques used include:</a:t>
+            </a:r>
+            <a:r>
+              <a:rPr lang="en-US" sz="2200" dirty="0" smtClean="0"/>
+              <a:t/>
+            </a:r>
+            <a:br>
+              <a:rPr lang="en-US" sz="2200" dirty="0" smtClean="0"/>
+            </a:br>
+            <a:endParaRPr lang="en-US" sz="2200" dirty="0" smtClean="0"/>
+          </a:p>
+          <a:p>
+            <a:pPr lvl="1"/>
+            <a:r>
+              <a:rPr lang="en-US" b="1" dirty="0" smtClean="0">
+                <a:solidFill>
+                  <a:srgbClr val="008000"/>
+                </a:solidFill>
+              </a:rPr>
+              <a:t>Feature Search Browse</a:t>
+            </a:r>
+          </a:p>
+          <a:p>
+            <a:pPr lvl="1">
+              <a:buNone/>
+            </a:pPr>
+            <a:endParaRPr lang="en-US" sz="900" b="1" dirty="0" smtClean="0">
+              <a:solidFill>
+                <a:srgbClr val="008000"/>
+              </a:solidFill>
+            </a:endParaRPr>
+          </a:p>
+          <a:p>
+            <a:pPr lvl="1">
+              <a:lnSpc>
+                <a:spcPct val="90000"/>
+              </a:lnSpc>
+            </a:pPr>
+            <a:r>
+              <a:rPr lang="en-US" sz="2000" b="1" dirty="0" smtClean="0">
+                <a:solidFill>
+                  <a:srgbClr val="008000"/>
+                </a:solidFill>
+              </a:rPr>
+              <a:t>Visual Framework with Persistent Navigation</a:t>
+            </a:r>
+          </a:p>
+          <a:p>
+            <a:pPr lvl="2">
+              <a:lnSpc>
+                <a:spcPct val="90000"/>
+              </a:lnSpc>
+            </a:pPr>
+            <a:r>
+              <a:rPr lang="en-US" sz="1800" dirty="0" smtClean="0">
+                <a:solidFill>
+                  <a:srgbClr val="003300"/>
+                </a:solidFill>
+              </a:rPr>
+              <a:t>Bonus: Built-in images to enable recognition rather than recall.</a:t>
+            </a:r>
+          </a:p>
+          <a:p>
+            <a:pPr lvl="1">
+              <a:buNone/>
+            </a:pPr>
+            <a:endParaRPr lang="en-US" sz="900" b="1" dirty="0" smtClean="0">
+              <a:solidFill>
+                <a:srgbClr val="008000"/>
+              </a:solidFill>
+            </a:endParaRPr>
+          </a:p>
+          <a:p>
+            <a:pPr lvl="1">
+              <a:lnSpc>
+                <a:spcPct val="90000"/>
+              </a:lnSpc>
+            </a:pPr>
+            <a:r>
+              <a:rPr lang="en-US" sz="2000" b="1" dirty="0" smtClean="0">
+                <a:solidFill>
+                  <a:srgbClr val="008000"/>
+                </a:solidFill>
+              </a:rPr>
+              <a:t>Breadcrumbs</a:t>
+            </a:r>
+          </a:p>
+          <a:p>
+            <a:pPr lvl="2">
+              <a:lnSpc>
+                <a:spcPct val="90000"/>
+              </a:lnSpc>
+            </a:pPr>
+            <a:r>
+              <a:rPr lang="en-US" sz="1800" dirty="0" smtClean="0"/>
+              <a:t>“You are Here”</a:t>
+            </a:r>
+          </a:p>
+          <a:p>
+            <a:pPr lvl="1">
+              <a:buNone/>
+            </a:pPr>
+            <a:endParaRPr lang="en-US" sz="900" b="1" dirty="0" smtClean="0">
+              <a:solidFill>
+                <a:srgbClr val="008000"/>
+              </a:solidFill>
+            </a:endParaRPr>
+          </a:p>
+          <a:p>
+            <a:pPr lvl="1"/>
+            <a:r>
+              <a:rPr lang="en-US" b="1" dirty="0" smtClean="0">
+                <a:solidFill>
+                  <a:srgbClr val="008000"/>
+                </a:solidFill>
+              </a:rPr>
+              <a:t>Escape Hatch</a:t>
+            </a:r>
+          </a:p>
+          <a:p>
+            <a:pPr lvl="1">
+              <a:buNone/>
+            </a:pPr>
+            <a:endParaRPr lang="en-US" sz="900" b="1" dirty="0" smtClean="0">
+              <a:solidFill>
+                <a:srgbClr val="008000"/>
+              </a:solidFill>
+            </a:endParaRPr>
+          </a:p>
+          <a:p>
+            <a:pPr lvl="1"/>
+            <a:r>
+              <a:rPr lang="en-US" b="1" dirty="0" smtClean="0">
+                <a:solidFill>
+                  <a:srgbClr val="008000"/>
+                </a:solidFill>
+              </a:rPr>
+              <a:t>Carousel</a:t>
+            </a:r>
+          </a:p>
+          <a:p>
+            <a:pPr lvl="2"/>
+            <a:r>
+              <a:rPr lang="en-US" sz="1800" dirty="0" smtClean="0">
+                <a:solidFill>
+                  <a:srgbClr val="003300"/>
+                </a:solidFill>
+              </a:rPr>
+              <a:t>Iconic Olympic images on the home page</a:t>
+            </a:r>
+          </a:p>
+          <a:p>
+            <a:pPr lvl="1">
+              <a:buNone/>
+            </a:pPr>
+            <a:endParaRPr lang="en-US" sz="900" b="1" dirty="0" smtClean="0">
+              <a:solidFill>
+                <a:srgbClr val="008000"/>
+              </a:solidFill>
+            </a:endParaRPr>
+          </a:p>
+          <a:p>
+            <a:pPr lvl="1">
+              <a:lnSpc>
+                <a:spcPct val="90000"/>
+              </a:lnSpc>
+            </a:pPr>
+            <a:r>
+              <a:rPr lang="en-US" b="1" dirty="0" smtClean="0">
+                <a:solidFill>
+                  <a:srgbClr val="008000"/>
+                </a:solidFill>
+              </a:rPr>
+              <a:t>Taglines</a:t>
+            </a:r>
+          </a:p>
+          <a:p>
+            <a:pPr lvl="1">
+              <a:buNone/>
+            </a:pPr>
+            <a:endParaRPr lang="en-US" sz="900" b="1" dirty="0" smtClean="0">
+              <a:solidFill>
+                <a:srgbClr val="008000"/>
+              </a:solidFill>
+            </a:endParaRPr>
+          </a:p>
+          <a:p>
+            <a:pPr lvl="1">
+              <a:lnSpc>
+                <a:spcPct val="90000"/>
+              </a:lnSpc>
+            </a:pPr>
+            <a:r>
+              <a:rPr lang="en-US" b="1" dirty="0" smtClean="0">
+                <a:solidFill>
+                  <a:srgbClr val="008000"/>
+                </a:solidFill>
+              </a:rPr>
+              <a:t>Hover Tools</a:t>
+            </a:r>
+          </a:p>
+          <a:p>
+            <a:pPr lvl="2">
+              <a:lnSpc>
+                <a:spcPct val="90000"/>
+              </a:lnSpc>
+            </a:pPr>
+            <a:r>
+              <a:rPr lang="en-US" dirty="0" smtClean="0">
+                <a:solidFill>
+                  <a:srgbClr val="003300"/>
+                </a:solidFill>
+              </a:rPr>
+              <a:t>Menu selection</a:t>
+            </a:r>
+          </a:p>
+          <a:p>
+            <a:pPr lvl="2">
+              <a:lnSpc>
+                <a:spcPct val="90000"/>
+              </a:lnSpc>
+            </a:pPr>
+            <a:r>
+              <a:rPr lang="en-US" dirty="0" smtClean="0">
+                <a:solidFill>
+                  <a:srgbClr val="003300"/>
+                </a:solidFill>
+              </a:rPr>
+              <a:t>Data visualization tools</a:t>
+            </a:r>
+          </a:p>
+          <a:p>
+            <a:pPr lvl="1">
+              <a:buNone/>
+            </a:pPr>
+            <a:endParaRPr lang="en-US" sz="900" b="1" dirty="0" smtClean="0">
+              <a:solidFill>
+                <a:srgbClr val="008000"/>
+              </a:solidFill>
+            </a:endParaRPr>
+          </a:p>
+          <a:p>
+            <a:pPr lvl="1">
+              <a:lnSpc>
+                <a:spcPct val="90000"/>
+              </a:lnSpc>
+            </a:pPr>
+            <a:r>
+              <a:rPr lang="en-US" b="1" dirty="0" smtClean="0">
+                <a:solidFill>
+                  <a:srgbClr val="008000"/>
+                </a:solidFill>
+              </a:rPr>
+              <a:t>Grid of Equals</a:t>
+            </a:r>
+          </a:p>
+          <a:p>
+            <a:pPr lvl="1">
+              <a:buNone/>
+            </a:pPr>
+            <a:endParaRPr lang="en-US" sz="900" b="1" dirty="0" smtClean="0">
+              <a:solidFill>
+                <a:srgbClr val="008000"/>
+              </a:solidFill>
+            </a:endParaRPr>
+          </a:p>
+          <a:p>
+            <a:pPr lvl="1">
+              <a:lnSpc>
+                <a:spcPct val="90000"/>
+              </a:lnSpc>
+            </a:pPr>
+            <a:r>
+              <a:rPr lang="en-US" sz="2000" b="1" dirty="0" smtClean="0">
+                <a:solidFill>
+                  <a:srgbClr val="008000"/>
+                </a:solidFill>
+              </a:rPr>
+              <a:t>Color Standardization</a:t>
+            </a:r>
+          </a:p>
+          <a:p>
+            <a:pPr lvl="2">
+              <a:lnSpc>
+                <a:spcPct val="90000"/>
+              </a:lnSpc>
+            </a:pPr>
+            <a:r>
+              <a:rPr lang="en-US" sz="1800" dirty="0" smtClean="0">
+                <a:solidFill>
+                  <a:srgbClr val="003300"/>
+                </a:solidFill>
+              </a:rPr>
+              <a:t>Concept presented by guest lecturer Robert Nicholson</a:t>
+            </a:r>
+          </a:p>
+          <a:p>
+            <a:pPr lvl="1">
+              <a:lnSpc>
+                <a:spcPct val="90000"/>
+              </a:lnSpc>
+            </a:pPr>
+            <a:endParaRPr lang="en-US" b="1" dirty="0" smtClean="0">
+              <a:solidFill>
+                <a:srgbClr val="008000"/>
+              </a:solidFill>
+            </a:endParaRPr>
+          </a:p>
+          <a:p>
+            <a:pPr lvl="2">
+              <a:lnSpc>
+                <a:spcPct val="90000"/>
+              </a:lnSpc>
+            </a:pPr>
+            <a:endParaRPr lang="en-US" dirty="0" smtClean="0">
+              <a:solidFill>
+                <a:srgbClr val="003300"/>
+              </a:solidFill>
+            </a:endParaRPr>
+          </a:p>
+          <a:p>
+            <a:pPr lvl="2">
+              <a:lnSpc>
+                <a:spcPct val="90000"/>
+              </a:lnSpc>
+            </a:pPr>
+            <a:endParaRPr lang="en-US" b="1" dirty="0" smtClean="0">
+              <a:solidFill>
+                <a:srgbClr val="008000"/>
+              </a:solidFill>
+            </a:endParaRPr>
+          </a:p>
+          <a:p>
+            <a:pPr lvl="2">
+              <a:lnSpc>
+                <a:spcPct val="90000"/>
+              </a:lnSpc>
+            </a:pPr>
+            <a:endParaRPr lang="en-US" sz="1800" dirty="0" smtClean="0">
+              <a:solidFill>
+                <a:srgbClr val="003300"/>
+              </a:solidFill>
+            </a:endParaRPr>
+          </a:p>
+        </p:txBody>
+      </p:sp>
+      <p:sp>
+        <p:nvSpPr>
+          <p:cNvPr id="4" name="Slide Number Placeholder 3"/>
+          <p:cNvSpPr>
+            <a:spLocks noGrp="1"/>
+          </p:cNvSpPr>
+          <p:nvPr>
+            <p:ph type="sldNum" sz="quarter" idx="11"/>
+          </p:nvPr>
+        </p:nvSpPr>
+        <p:spPr/>
+        <p:txBody>
+          <a:bodyPr/>
+          <a:lstStyle/>
+          <a:p>
+            <a:pPr>
+              <a:defRPr/>
+            </a:pPr>
+            <a:fld id="{D696A8AA-6ACE-4ADB-BE5C-DDEA34821D66}" type="slidenum">
+              <a:rPr lang="en-US" smtClean="0"/>
+              <a:pPr>
+                <a:defRPr/>
+              </a:pPr>
+              <a:t>6</a:t>
+            </a:fld>
+            <a:endParaRPr lang="en-US"/>
+          </a:p>
+        </p:txBody>
+      </p:sp>
+    </p:spTree>
+  </p:cSld>
+  <p:clrMapOvr>
+    <a:masterClrMapping/>
+  </p:clrMapOvr>
+  <p:timing>
+    <p:tnLst>
+      <p:par>
+        <p:cTn id="1" dur="indefinite" restart="never" nodeType="tmRoot"/>
+      </p:par>
+    </p:tnLst>
+  </p:timing>
+</p:sld>
+</file>
+
+<file path=ppt/slides/slide7.xml><?xml version="1.0" encoding="utf-8"?>
+<p:sld xmlns:a="http://schemas.openxmlformats.org/drawingml/2006/main" xmlns:r="http://schemas.openxmlformats.org/officeDocument/2006/relationships" xmlns:p="http://schemas.openxmlformats.org/presentationml/2006/main">
+  <p:cSld>
+    <p:spTree>
+      <p:nvGrpSpPr>
+        <p:cNvPr id="1" name=""/>
+        <p:cNvGrpSpPr/>
+        <p:nvPr/>
+      </p:nvGrpSpPr>
+      <p:grpSpPr>
+        <a:xfrm>
+          <a:off x="0" y="0"/>
+          <a:ext cx="0" cy="0"/>
+          <a:chOff x="0" y="0"/>
+          <a:chExt cx="0" cy="0"/>
+        </a:xfrm>
+      </p:grpSpPr>
+      <p:sp>
+        <p:nvSpPr>
           <p:cNvPr id="12289" name="Rectangle 2"/>
           <p:cNvSpPr>
             <a:spLocks noGrp="1"/>
@@ -4594,7 +4131,6 @@
               <a:rPr lang="en-US" sz="2800" dirty="0" smtClean="0"/>
               <a:t>Data Visualization Design Patterns</a:t>
             </a:r>
-            <a:endParaRPr lang="en-US" sz="2800" dirty="0" smtClean="0"/>
           </a:p>
         </p:txBody>
       </p:sp>
@@ -4627,31 +4163,7 @@
                   <a:srgbClr val="000066"/>
                 </a:solidFill>
               </a:rPr>
-              <a:t>Data visualization design </a:t>
-            </a:r>
-            <a:r>
-              <a:rPr lang="en-US" sz="2800" b="1" dirty="0" smtClean="0">
-                <a:solidFill>
-                  <a:srgbClr val="000066"/>
-                </a:solidFill>
-              </a:rPr>
-              <a:t>patterns </a:t>
-            </a:r>
-            <a:r>
-              <a:rPr lang="en-US" sz="2800" b="1" smtClean="0">
-                <a:solidFill>
-                  <a:srgbClr val="000066"/>
-                </a:solidFill>
-              </a:rPr>
-              <a:t>and techniques used</a:t>
-            </a:r>
-            <a:r>
-              <a:rPr lang="en-US" sz="2800" b="1" dirty="0" smtClean="0">
-                <a:solidFill>
-                  <a:srgbClr val="000066"/>
-                </a:solidFill>
-              </a:rPr>
-              <a:t>:</a:t>
+              <a:t>Data visualization design patterns and techniques used:</a:t>
             </a:r>
             <a:r>
               <a:rPr lang="en-US" sz="2800" dirty="0" smtClean="0"/>
@@ -4747,11 +4259,6 @@
               </a:rPr>
               <a:t>Data Spotlighting</a:t>
             </a:r>
-            <a:endParaRPr lang="en-US" b="1" dirty="0" smtClean="0">
-              <a:solidFill>
-                <a:srgbClr val="008000"/>
-              </a:solidFill>
-            </a:endParaRPr>
           </a:p>
           <a:p>
             <a:pPr lvl="2">
@@ -4783,11 +4290,6 @@
               </a:rPr>
               <a:t>Data Tips</a:t>
             </a:r>
-            <a:endParaRPr lang="en-US" b="1" dirty="0" smtClean="0">
-              <a:solidFill>
-                <a:srgbClr val="008000"/>
-              </a:solidFill>
-            </a:endParaRPr>
           </a:p>
           <a:p>
             <a:pPr lvl="2">
@@ -4818,11 +4320,6 @@
               </a:rPr>
               <a:t>Multi-Y Graphs</a:t>
             </a:r>
-            <a:endParaRPr lang="en-US" b="1" dirty="0" smtClean="0">
-              <a:solidFill>
-                <a:srgbClr val="008000"/>
-              </a:solidFill>
-            </a:endParaRPr>
           </a:p>
           <a:p>
             <a:pPr lvl="1"/>
@@ -4896,7 +4393,7 @@
               <a:pPr>
                 <a:defRPr/>
               </a:pPr>
-              <a:t>5</a:t>
+              <a:t>7</a:t>
             </a:fld>
             <a:endParaRPr lang="en-US"/>
           </a:p>

</xml_diff>

<commit_message>
Small modification to Olympics presentation.
</commit_message>
<xml_diff>
--- a/Final_Project/Presentation/CS235 - Team Thundercats - Final Project Presentation.pptx
+++ b/Final_Project/Presentation/CS235 - Team Thundercats - Final Project Presentation.pptx
@@ -17,7 +17,7 @@
     <p:sldId id="261" r:id="rId8"/>
   </p:sldIdLst>
   <p:sldSz cx="9144000" cy="6858000" type="screen4x3"/>
-  <p:notesSz cx="6858000" cy="9144000"/>
+  <p:notesSz cx="6985000" cy="9283700"/>
   <p:defaultTextStyle>
     <a:defPPr>
       <a:defRPr lang="en-US"/>
@@ -184,7 +184,7 @@
         <p:spPr bwMode="auto">
           <a:xfrm>
             <a:off x="0" y="0"/>
-            <a:ext cx="2971800" cy="457200"/>
+            <a:ext cx="3027363" cy="463550"/>
           </a:xfrm>
           <a:prstGeom prst="rect">
             <a:avLst/>
@@ -196,23 +196,19 @@
             <a:headEnd/>
             <a:tailEnd/>
           </a:ln>
-          <a:effectLst/>
         </p:spPr>
         <p:txBody>
-          <a:bodyPr vert="horz" wrap="square" lIns="91440" tIns="45720" rIns="91440" bIns="45720" numCol="1" anchor="t" anchorCtr="0" compatLnSpc="1">
+          <a:bodyPr vert="horz" wrap="square" lIns="92958" tIns="46479" rIns="92958" bIns="46479" numCol="1" anchor="t" anchorCtr="0" compatLnSpc="1">
             <a:prstTxWarp prst="textNoShape">
               <a:avLst/>
             </a:prstTxWarp>
           </a:bodyPr>
           <a:lstStyle>
-            <a:lvl1pPr>
+            <a:lvl1pPr defTabSz="930275">
               <a:defRPr sz="1200" b="0"/>
             </a:lvl1pPr>
           </a:lstStyle>
           <a:p>
-            <a:pPr>
-              <a:defRPr/>
-            </a:pPr>
             <a:endParaRPr lang="en-US"/>
           </a:p>
         </p:txBody>
@@ -229,8 +225,8 @@
         </p:nvSpPr>
         <p:spPr bwMode="auto">
           <a:xfrm>
-            <a:off x="3884613" y="0"/>
-            <a:ext cx="2971800" cy="457200"/>
+            <a:off x="3956050" y="0"/>
+            <a:ext cx="3027363" cy="463550"/>
           </a:xfrm>
           <a:prstGeom prst="rect">
             <a:avLst/>
@@ -242,23 +238,19 @@
             <a:headEnd/>
             <a:tailEnd/>
           </a:ln>
-          <a:effectLst/>
         </p:spPr>
         <p:txBody>
-          <a:bodyPr vert="horz" wrap="square" lIns="91440" tIns="45720" rIns="91440" bIns="45720" numCol="1" anchor="t" anchorCtr="0" compatLnSpc="1">
+          <a:bodyPr vert="horz" wrap="square" lIns="92958" tIns="46479" rIns="92958" bIns="46479" numCol="1" anchor="t" anchorCtr="0" compatLnSpc="1">
             <a:prstTxWarp prst="textNoShape">
               <a:avLst/>
             </a:prstTxWarp>
           </a:bodyPr>
           <a:lstStyle>
-            <a:lvl1pPr algn="r">
+            <a:lvl1pPr algn="r" defTabSz="930275">
               <a:defRPr sz="1200" b="0"/>
             </a:lvl1pPr>
           </a:lstStyle>
           <a:p>
-            <a:pPr>
-              <a:defRPr/>
-            </a:pPr>
             <a:endParaRPr lang="en-US"/>
           </a:p>
         </p:txBody>
@@ -275,8 +267,8 @@
         </p:nvSpPr>
         <p:spPr bwMode="auto">
           <a:xfrm>
-            <a:off x="1143000" y="685800"/>
-            <a:ext cx="4572000" cy="3429000"/>
+            <a:off x="1171575" y="696913"/>
+            <a:ext cx="4641850" cy="3481387"/>
           </a:xfrm>
           <a:prstGeom prst="rect">
             <a:avLst/>
@@ -304,8 +296,8 @@
         </p:nvSpPr>
         <p:spPr bwMode="auto">
           <a:xfrm>
-            <a:off x="685800" y="4343400"/>
-            <a:ext cx="5486400" cy="4114800"/>
+            <a:off x="698500" y="4410075"/>
+            <a:ext cx="5588000" cy="4176713"/>
           </a:xfrm>
           <a:prstGeom prst="rect">
             <a:avLst/>
@@ -317,10 +309,9 @@
             <a:headEnd/>
             <a:tailEnd/>
           </a:ln>
-          <a:effectLst/>
         </p:spPr>
         <p:txBody>
-          <a:bodyPr vert="horz" wrap="square" lIns="91440" tIns="45720" rIns="91440" bIns="45720" numCol="1" anchor="t" anchorCtr="0" compatLnSpc="1">
+          <a:bodyPr vert="horz" wrap="square" lIns="92958" tIns="46479" rIns="92958" bIns="46479" numCol="1" anchor="t" anchorCtr="0" compatLnSpc="1">
             <a:prstTxWarp prst="textNoShape">
               <a:avLst/>
             </a:prstTxWarp>
@@ -375,8 +366,8 @@
         </p:nvSpPr>
         <p:spPr bwMode="auto">
           <a:xfrm>
-            <a:off x="0" y="8685213"/>
-            <a:ext cx="2971800" cy="457200"/>
+            <a:off x="0" y="8818563"/>
+            <a:ext cx="3027363" cy="463550"/>
           </a:xfrm>
           <a:prstGeom prst="rect">
             <a:avLst/>
@@ -388,23 +379,19 @@
             <a:headEnd/>
             <a:tailEnd/>
           </a:ln>
-          <a:effectLst/>
         </p:spPr>
         <p:txBody>
-          <a:bodyPr vert="horz" wrap="square" lIns="91440" tIns="45720" rIns="91440" bIns="45720" numCol="1" anchor="b" anchorCtr="0" compatLnSpc="1">
+          <a:bodyPr vert="horz" wrap="square" lIns="92958" tIns="46479" rIns="92958" bIns="46479" numCol="1" anchor="b" anchorCtr="0" compatLnSpc="1">
             <a:prstTxWarp prst="textNoShape">
               <a:avLst/>
             </a:prstTxWarp>
           </a:bodyPr>
           <a:lstStyle>
-            <a:lvl1pPr>
+            <a:lvl1pPr defTabSz="930275">
               <a:defRPr sz="1200" b="0"/>
             </a:lvl1pPr>
           </a:lstStyle>
           <a:p>
-            <a:pPr>
-              <a:defRPr/>
-            </a:pPr>
             <a:endParaRPr lang="en-US"/>
           </a:p>
         </p:txBody>
@@ -421,8 +408,8 @@
         </p:nvSpPr>
         <p:spPr bwMode="auto">
           <a:xfrm>
-            <a:off x="3884613" y="8685213"/>
-            <a:ext cx="2971800" cy="457200"/>
+            <a:off x="3956050" y="8818563"/>
+            <a:ext cx="3027363" cy="463550"/>
           </a:xfrm>
           <a:prstGeom prst="rect">
             <a:avLst/>
@@ -434,28 +421,22 @@
             <a:headEnd/>
             <a:tailEnd/>
           </a:ln>
-          <a:effectLst/>
         </p:spPr>
         <p:txBody>
-          <a:bodyPr vert="horz" wrap="square" lIns="91440" tIns="45720" rIns="91440" bIns="45720" numCol="1" anchor="b" anchorCtr="0" compatLnSpc="1">
+          <a:bodyPr vert="horz" wrap="square" lIns="92958" tIns="46479" rIns="92958" bIns="46479" numCol="1" anchor="b" anchorCtr="0" compatLnSpc="1">
             <a:prstTxWarp prst="textNoShape">
               <a:avLst/>
             </a:prstTxWarp>
           </a:bodyPr>
           <a:lstStyle>
-            <a:lvl1pPr algn="r">
+            <a:lvl1pPr algn="r" defTabSz="930275">
               <a:defRPr sz="1200" b="0"/>
             </a:lvl1pPr>
           </a:lstStyle>
           <a:p>
-            <a:pPr>
-              <a:defRPr/>
-            </a:pPr>
-            <a:fld id="{D37CC2A5-4DD0-44C0-962B-3671F17DD6E5}" type="slidenum">
+            <a:fld id="{CB339D3A-409C-4946-8830-A9B19C564776}" type="slidenum">
               <a:rPr lang="en-US"/>
-              <a:pPr>
-                <a:defRPr/>
-              </a:pPr>
+              <a:pPr/>
               <a:t>‹#›</a:t>
             </a:fld>
             <a:endParaRPr lang="en-US"/>
@@ -616,7 +597,7 @@
           <p:nvPr/>
         </p:nvPicPr>
         <p:blipFill>
-          <a:blip r:embed="rId2" cstate="print"/>
+          <a:blip r:embed="rId2"/>
           <a:srcRect/>
           <a:stretch>
             <a:fillRect/>
@@ -822,8 +803,8 @@
             <a:pPr>
               <a:defRPr/>
             </a:pPr>
-            <a:fld id="{D5A23C53-705A-491F-A9B6-108B336645CC}" type="slidenum">
-              <a:rPr lang="en-US" smtClean="0"/>
+            <a:fld id="{1FD65B21-4E70-42A8-88B0-F4CA8CE3274E}" type="slidenum">
+              <a:rPr lang="en-US"/>
               <a:pPr>
                 <a:defRPr/>
               </a:pPr>
@@ -985,7 +966,7 @@
             <a:pPr>
               <a:defRPr/>
             </a:pPr>
-            <a:fld id="{D696A8AA-6ACE-4ADB-BE5C-DDEA34821D66}" type="slidenum">
+            <a:fld id="{555310BA-BF72-4667-84E6-FED5DCFB4BBC}" type="slidenum">
               <a:rPr lang="en-US"/>
               <a:pPr>
                 <a:defRPr/>
@@ -1262,7 +1243,7 @@
             <a:pPr>
               <a:defRPr/>
             </a:pPr>
-            <a:fld id="{58075621-BF53-4438-9C8A-AF4CF31A5B41}" type="slidenum">
+            <a:fld id="{4680B1FC-CF5E-40E2-926E-781D7CE23144}" type="slidenum">
               <a:rPr lang="en-US"/>
               <a:pPr>
                 <a:defRPr/>
@@ -1678,7 +1659,7 @@
             <a:pPr>
               <a:defRPr/>
             </a:pPr>
-            <a:fld id="{393C07FB-2AD4-417A-BED9-9A264C103ECE}" type="slidenum">
+            <a:fld id="{3D26F997-0023-48D3-A131-26313CF2FCD5}" type="slidenum">
               <a:rPr lang="en-US"/>
               <a:pPr>
                 <a:defRPr/>
@@ -1929,9 +1910,7 @@
           <a:bodyPr/>
           <a:lstStyle>
             <a:lvl1pPr>
-              <a:defRPr>
-                <a:latin typeface="+mn-lt"/>
-              </a:defRPr>
+              <a:defRPr/>
             </a:lvl1pPr>
           </a:lstStyle>
           <a:p>
@@ -1957,17 +1936,15 @@
           <a:bodyPr/>
           <a:lstStyle>
             <a:lvl1pPr>
-              <a:defRPr>
-                <a:latin typeface="+mn-lt"/>
-              </a:defRPr>
+              <a:defRPr/>
             </a:lvl1pPr>
           </a:lstStyle>
           <a:p>
             <a:pPr>
               <a:defRPr/>
             </a:pPr>
-            <a:fld id="{BD11CE9F-2AF3-4F59-A6D7-3D3804C76BF1}" type="slidenum">
-              <a:rPr lang="en-US" smtClean="0"/>
+            <a:fld id="{29618690-DE13-4DB9-ABD6-402CA20B375F}" type="slidenum">
+              <a:rPr lang="en-US"/>
               <a:pPr>
                 <a:defRPr/>
               </a:pPr>
@@ -2019,8 +1996,8 @@
           <p:nvPr/>
         </p:nvPicPr>
         <p:blipFill>
-          <a:blip r:embed="rId7" cstate="print"/>
-          <a:srcRect b="32963"/>
+          <a:blip r:embed="rId7"/>
+          <a:srcRect b="32964"/>
           <a:stretch>
             <a:fillRect/>
           </a:stretch>
@@ -2235,8 +2212,8 @@
             <a:pPr>
               <a:defRPr/>
             </a:pPr>
-            <a:fld id="{A3A3B9AC-2D9B-4AE3-828B-D89195528FAC}" type="slidenum">
-              <a:rPr lang="en-US" smtClean="0"/>
+            <a:fld id="{859C549A-28F6-4720-981D-FC5781AF6FA3}" type="slidenum">
+              <a:rPr lang="en-US"/>
               <a:pPr>
                 <a:defRPr/>
               </a:pPr>
@@ -2251,10 +2228,10 @@
   <p:clrMap bg1="lt1" tx1="dk1" bg2="lt2" tx2="dk2" accent1="accent1" accent2="accent2" accent3="accent3" accent4="accent4" accent5="accent5" accent6="accent6" hlink="hlink" folHlink="folHlink"/>
   <p:sldLayoutIdLst>
     <p:sldLayoutId id="2147483656" r:id="rId1"/>
-    <p:sldLayoutId id="2147483652" r:id="rId2"/>
-    <p:sldLayoutId id="2147483653" r:id="rId3"/>
-    <p:sldLayoutId id="2147483654" r:id="rId4"/>
-    <p:sldLayoutId id="2147483655" r:id="rId5"/>
+    <p:sldLayoutId id="2147483655" r:id="rId2"/>
+    <p:sldLayoutId id="2147483654" r:id="rId3"/>
+    <p:sldLayoutId id="2147483653" r:id="rId4"/>
+    <p:sldLayoutId id="2147483652" r:id="rId5"/>
   </p:sldLayoutIdLst>
   <p:hf hdr="0" ftr="0" dt="0"/>
   <p:txStyles>
@@ -2654,7 +2631,7 @@
       </p:grpSpPr>
       <p:sp>
         <p:nvSpPr>
-          <p:cNvPr id="8194" name="Rectangle 4"/>
+          <p:cNvPr id="8193" name="Rectangle 4"/>
           <p:cNvSpPr>
             <a:spLocks/>
           </p:cNvSpPr>
@@ -2682,7 +2659,7 @@
           <a:p>
             <a:pPr algn="ctr" defTabSz="457200"/>
             <a:r>
-              <a:rPr lang="en-US" sz="3800" dirty="0" smtClean="0">
+              <a:rPr lang="en-US" sz="3800">
                 <a:solidFill>
                   <a:srgbClr val="0070C0"/>
                 </a:solidFill>
@@ -2691,31 +2668,28 @@
               <a:t>Olympics History</a:t>
             </a:r>
             <a:r>
-              <a:rPr lang="en-US" sz="3800" dirty="0">
+              <a:rPr lang="en-US" sz="3800">
                 <a:latin typeface="Calibri" pitchFamily="34" charset="0"/>
               </a:rPr>
               <a:t/>
             </a:r>
             <a:br>
-              <a:rPr lang="en-US" sz="3800" dirty="0">
+              <a:rPr lang="en-US" sz="3800">
                 <a:latin typeface="Calibri" pitchFamily="34" charset="0"/>
               </a:rPr>
             </a:br>
             <a:r>
-              <a:rPr lang="en-US" sz="3800" dirty="0" smtClean="0">
+              <a:rPr lang="en-US" sz="3800">
                 <a:latin typeface="Calibri" pitchFamily="34" charset="0"/>
               </a:rPr>
               <a:t>A Data Visualization Application</a:t>
             </a:r>
-            <a:endParaRPr lang="en-US" sz="3800" dirty="0">
-              <a:latin typeface="Calibri" pitchFamily="34" charset="0"/>
-            </a:endParaRPr>
-          </a:p>
-        </p:txBody>
-      </p:sp>
-      <p:sp>
-        <p:nvSpPr>
-          <p:cNvPr id="8195" name="Rectangle 5"/>
+          </a:p>
+        </p:txBody>
+      </p:sp>
+      <p:sp>
+        <p:nvSpPr>
+          <p:cNvPr id="8194" name="Rectangle 5"/>
           <p:cNvSpPr>
             <a:spLocks/>
           </p:cNvSpPr>
@@ -2752,7 +2726,7 @@
               <a:buNone/>
             </a:pPr>
             <a:r>
-              <a:rPr lang="en-US" sz="2800" dirty="0">
+              <a:rPr lang="en-US" sz="2800">
                 <a:solidFill>
                   <a:srgbClr val="1C1C1C"/>
                 </a:solidFill>
@@ -2773,7 +2747,7 @@
               <a:buNone/>
             </a:pPr>
             <a:r>
-              <a:rPr lang="en-US" sz="2000" dirty="0">
+              <a:rPr lang="en-US" sz="2000">
                 <a:solidFill>
                   <a:srgbClr val="1C1C1C"/>
                 </a:solidFill>
@@ -2794,22 +2768,13 @@
               <a:buNone/>
             </a:pPr>
             <a:r>
-              <a:rPr lang="en-US" sz="2000" dirty="0" smtClean="0">
+              <a:rPr lang="en-US" sz="2000">
                 <a:solidFill>
                   <a:srgbClr val="1C1C1C"/>
                 </a:solidFill>
                 <a:latin typeface="Calibri" pitchFamily="34" charset="0"/>
               </a:rPr>
-              <a:t>&amp; Zayd </a:t>
-            </a:r>
-            <a:r>
-              <a:rPr lang="en-US" sz="2000" dirty="0">
-                <a:solidFill>
-                  <a:srgbClr val="1C1C1C"/>
-                </a:solidFill>
-                <a:latin typeface="Calibri" pitchFamily="34" charset="0"/>
-              </a:rPr>
-              <a:t>Hammoudeh</a:t>
+              <a:t>&amp; Zayd Hammoudeh</a:t>
             </a:r>
           </a:p>
         </p:txBody>
@@ -2832,8 +2797,8 @@
             <a:pPr>
               <a:defRPr/>
             </a:pPr>
-            <a:fld id="{D5A23C53-705A-491F-A9B6-108B336645CC}" type="slidenum">
-              <a:rPr lang="en-US" smtClean="0"/>
+            <a:fld id="{85CFF596-3C0B-4584-82E7-5DFBCEA6059C}" type="slidenum">
+              <a:rPr lang="en-US"/>
               <a:pPr>
                 <a:defRPr/>
               </a:pPr>
@@ -2887,64 +2852,38 @@
         </p:nvSpPr>
         <p:spPr/>
         <p:txBody>
-          <a:bodyPr>
-            <a:normAutofit/>
-          </a:bodyPr>
+          <a:bodyPr/>
           <a:lstStyle/>
           <a:p>
             <a:r>
-              <a:rPr lang="en-US" dirty="0" smtClean="0"/>
-              <a:t>The Olympics are held every two years as a </a:t>
-            </a:r>
-            <a:r>
-              <a:rPr lang="en-US" dirty="0" smtClean="0"/>
-              <a:t>global celebration </a:t>
-            </a:r>
-            <a:r>
-              <a:rPr lang="en-US" dirty="0" smtClean="0"/>
-              <a:t>of amateur sports.</a:t>
-            </a:r>
-          </a:p>
-          <a:p>
-            <a:endParaRPr lang="en-US" dirty="0" smtClean="0"/>
-          </a:p>
-          <a:p>
-            <a:r>
-              <a:rPr lang="en-US" dirty="0" smtClean="0"/>
-              <a:t>Over 219 million Americans watched </a:t>
-            </a:r>
-            <a:r>
-              <a:rPr lang="en-US" dirty="0" smtClean="0"/>
-              <a:t>the </a:t>
-            </a:r>
-            <a:r>
-              <a:rPr lang="en-US" dirty="0" smtClean="0"/>
-              <a:t>London 2012 games.</a:t>
-            </a:r>
-          </a:p>
-          <a:p>
-            <a:endParaRPr lang="en-US" dirty="0" smtClean="0"/>
-          </a:p>
-          <a:p>
-            <a:r>
-              <a:rPr lang="en-US" dirty="0" smtClean="0"/>
-              <a:t>The United States won more medals than any </a:t>
-            </a:r>
-            <a:r>
-              <a:rPr lang="en-US" dirty="0" smtClean="0"/>
-              <a:t>other country </a:t>
-            </a:r>
-            <a:r>
-              <a:rPr lang="en-US" dirty="0" smtClean="0"/>
-              <a:t>in 2012, and NBC gleefully spoke of American Olympic dominance.</a:t>
-            </a:r>
-          </a:p>
-          <a:p>
-            <a:endParaRPr lang="en-US" dirty="0" smtClean="0"/>
-          </a:p>
-          <a:p>
-            <a:r>
-              <a:rPr lang="en-US" b="1" dirty="0" smtClean="0">
+              <a:rPr lang="en-US" smtClean="0"/>
+              <a:t>The Olympics are held every two years as a global celebration of amateur sports.</a:t>
+            </a:r>
+          </a:p>
+          <a:p>
+            <a:endParaRPr lang="en-US" smtClean="0"/>
+          </a:p>
+          <a:p>
+            <a:r>
+              <a:rPr lang="en-US" smtClean="0"/>
+              <a:t>Over 219 million Americans watched the London 2012 games.</a:t>
+            </a:r>
+          </a:p>
+          <a:p>
+            <a:endParaRPr lang="en-US" smtClean="0"/>
+          </a:p>
+          <a:p>
+            <a:r>
+              <a:rPr lang="en-US" smtClean="0"/>
+              <a:t>The United States won more medals than any other country in 2012, and NBC gleefully spoke of American Olympic dominance.</a:t>
+            </a:r>
+          </a:p>
+          <a:p>
+            <a:endParaRPr lang="en-US" smtClean="0"/>
+          </a:p>
+          <a:p>
+            <a:r>
+              <a:rPr lang="en-US" b="1" smtClean="0">
                 <a:solidFill>
                   <a:srgbClr val="0070C0"/>
                 </a:solidFill>
@@ -2952,22 +2891,9 @@
               <a:t>Fundamental Question: </a:t>
             </a:r>
             <a:r>
-              <a:rPr lang="en-US" dirty="0" smtClean="0"/>
-              <a:t>How can one </a:t>
-            </a:r>
-            <a:r>
-              <a:rPr lang="en-US" dirty="0" smtClean="0"/>
-              <a:t>objectively determine </a:t>
-            </a:r>
-            <a:r>
-              <a:rPr lang="en-US" dirty="0" smtClean="0"/>
-              <a:t>which country performed the best at an Olympic games</a:t>
-            </a:r>
-            <a:r>
-              <a:rPr lang="en-US" dirty="0" smtClean="0"/>
-              <a:t>?</a:t>
-            </a:r>
-            <a:endParaRPr lang="en-US" dirty="0" smtClean="0"/>
+              <a:rPr lang="en-US" smtClean="0"/>
+              <a:t>How can one objectively determine which country performed the best at an Olympic games?</a:t>
+            </a:r>
           </a:p>
         </p:txBody>
       </p:sp>
@@ -2989,7 +2915,7 @@
             <a:pPr>
               <a:defRPr/>
             </a:pPr>
-            <a:fld id="{9E67A228-8947-4185-8E6D-584B76A7C1A5}" type="slidenum">
+            <a:fld id="{DFCBB9EC-D21C-4301-AD0D-85EE1148019A}" type="slidenum">
               <a:rPr lang="en-US"/>
               <a:pPr>
                 <a:defRPr/>
@@ -3002,7 +2928,7 @@
       </p:sp>
       <p:sp>
         <p:nvSpPr>
-          <p:cNvPr id="9218" name="Rectangle 2"/>
+          <p:cNvPr id="9219" name="Rectangle 2"/>
           <p:cNvSpPr>
             <a:spLocks noGrp="1"/>
           </p:cNvSpPr>
@@ -3012,14 +2938,12 @@
         </p:nvSpPr>
         <p:spPr/>
         <p:txBody>
-          <a:bodyPr>
-            <a:noAutofit/>
-          </a:bodyPr>
+          <a:bodyPr/>
           <a:lstStyle/>
           <a:p>
             <a:pPr eaLnBrk="1" hangingPunct="1"/>
             <a:r>
-              <a:rPr lang="en-US" sz="3600" dirty="0" smtClean="0"/>
+              <a:rPr lang="en-US" sz="3600" smtClean="0"/>
               <a:t>The Olympic Games</a:t>
             </a:r>
           </a:p>
@@ -3146,6 +3070,9 @@
           </a:bodyPr>
           <a:lstStyle/>
           <a:p>
+            <a:pPr>
+              <a:defRPr/>
+            </a:pPr>
             <a:r>
               <a:rPr lang="en-US" dirty="0" smtClean="0"/>
               <a:t>Medals Alone are not Enough</a:t>
@@ -3156,7 +3083,7 @@
       </p:sp>
       <p:sp>
         <p:nvSpPr>
-          <p:cNvPr id="3" name="Content Placeholder 2"/>
+          <p:cNvPr id="10242" name="Content Placeholder 2"/>
           <p:cNvSpPr>
             <a:spLocks noGrp="1"/>
           </p:cNvSpPr>
@@ -3170,24 +3097,16 @@
           <a:lstStyle/>
           <a:p>
             <a:r>
-              <a:rPr lang="en-US" dirty="0" smtClean="0"/>
-              <a:t>Most viewers are unaware of the </a:t>
-            </a:r>
-            <a:r>
-              <a:rPr lang="en-US" dirty="0" smtClean="0"/>
-              <a:t>various factors </a:t>
-            </a:r>
-            <a:r>
-              <a:rPr lang="en-US" dirty="0" smtClean="0"/>
-              <a:t>that affect country medal totals.  </a:t>
-            </a:r>
-          </a:p>
-          <a:p>
-            <a:endParaRPr lang="en-US" dirty="0" smtClean="0"/>
-          </a:p>
-          <a:p>
-            <a:r>
-              <a:rPr lang="en-US" b="1" dirty="0" smtClean="0">
+              <a:rPr lang="en-US" smtClean="0"/>
+              <a:t>Most viewers are unaware of the various factors that affect country medal totals.  </a:t>
+            </a:r>
+          </a:p>
+          <a:p>
+            <a:endParaRPr lang="en-US" smtClean="0"/>
+          </a:p>
+          <a:p>
+            <a:r>
+              <a:rPr lang="en-US" b="1" smtClean="0">
                 <a:solidFill>
                   <a:srgbClr val="0066FF"/>
                 </a:solidFill>
@@ -3195,7 +3114,7 @@
               <a:t>Goal:</a:t>
             </a:r>
             <a:r>
-              <a:rPr lang="en-US" dirty="0" smtClean="0">
+              <a:rPr lang="en-US" smtClean="0">
                 <a:solidFill>
                   <a:srgbClr val="0066FF"/>
                 </a:solidFill>
@@ -3203,81 +3122,51 @@
               <a:t> </a:t>
             </a:r>
             <a:r>
-              <a:rPr lang="en-US" dirty="0" smtClean="0"/>
-              <a:t>Design a web based, data visualization application that educates users regarding </a:t>
-            </a:r>
-            <a:r>
-              <a:rPr lang="en-US" dirty="0" smtClean="0"/>
-              <a:t>these </a:t>
-            </a:r>
-            <a:r>
-              <a:rPr lang="en-US" dirty="0" smtClean="0"/>
-              <a:t>key </a:t>
-            </a:r>
-            <a:r>
-              <a:rPr lang="en-US" dirty="0" smtClean="0"/>
-              <a:t>dynamics including</a:t>
-            </a:r>
-            <a:r>
-              <a:rPr lang="en-US" dirty="0" smtClean="0"/>
-              <a:t>:</a:t>
+              <a:rPr lang="en-US" smtClean="0"/>
+              <a:t>Design a web based, data visualization application that educates users regarding these key Olympic medal dynamics including:</a:t>
             </a:r>
           </a:p>
           <a:p>
             <a:pPr lvl="1"/>
             <a:r>
-              <a:rPr lang="en-US" dirty="0" smtClean="0"/>
+              <a:rPr lang="en-US" smtClean="0"/>
               <a:t>Geopolitics</a:t>
             </a:r>
           </a:p>
           <a:p>
             <a:pPr lvl="1"/>
             <a:r>
-              <a:rPr lang="en-US" dirty="0" smtClean="0"/>
-              <a:t>National Economic </a:t>
-            </a:r>
-            <a:r>
-              <a:rPr lang="en-US" dirty="0" smtClean="0"/>
-              <a:t>Power/Output</a:t>
-            </a:r>
-            <a:endParaRPr lang="en-US" dirty="0" smtClean="0"/>
+              <a:rPr lang="en-US" smtClean="0"/>
+              <a:t>National Economic Output</a:t>
+            </a:r>
           </a:p>
           <a:p>
             <a:pPr lvl="1"/>
             <a:r>
-              <a:rPr lang="en-US" dirty="0" smtClean="0"/>
+              <a:rPr lang="en-US" smtClean="0"/>
               <a:t>National Population</a:t>
             </a:r>
           </a:p>
           <a:p>
             <a:pPr lvl="1"/>
             <a:r>
-              <a:rPr lang="en-US" dirty="0" smtClean="0"/>
-              <a:t>Host </a:t>
-            </a:r>
-            <a:r>
-              <a:rPr lang="en-US" dirty="0" smtClean="0"/>
-              <a:t>City Selection</a:t>
-            </a:r>
-            <a:endParaRPr lang="en-US" dirty="0" smtClean="0"/>
+              <a:rPr lang="en-US" smtClean="0"/>
+              <a:t>Host City Selection</a:t>
+            </a:r>
           </a:p>
           <a:p>
             <a:pPr lvl="1"/>
             <a:r>
-              <a:rPr lang="en-US" dirty="0" smtClean="0"/>
+              <a:rPr lang="en-US" smtClean="0"/>
               <a:t>Number of Participating Athletes</a:t>
             </a:r>
           </a:p>
           <a:p>
             <a:pPr lvl="1"/>
             <a:r>
-              <a:rPr lang="en-US" dirty="0" smtClean="0"/>
+              <a:rPr lang="en-US" smtClean="0"/>
               <a:t>Event Bias</a:t>
             </a:r>
-          </a:p>
-          <a:p>
-            <a:pPr lvl="1"/>
-            <a:endParaRPr lang="en-US" dirty="0"/>
           </a:p>
         </p:txBody>
       </p:sp>
@@ -3299,8 +3188,8 @@
             <a:pPr>
               <a:defRPr/>
             </a:pPr>
-            <a:fld id="{D696A8AA-6ACE-4ADB-BE5C-DDEA34821D66}" type="slidenum">
-              <a:rPr lang="en-US" smtClean="0"/>
+            <a:fld id="{1D3B2650-B441-446F-BAE1-A15E966F56CF}" type="slidenum">
+              <a:rPr lang="en-US"/>
               <a:pPr>
                 <a:defRPr/>
               </a:pPr>
@@ -3359,6 +3248,9 @@
           </a:bodyPr>
           <a:lstStyle/>
           <a:p>
+            <a:pPr>
+              <a:defRPr/>
+            </a:pPr>
             <a:r>
               <a:rPr lang="en-US" dirty="0" smtClean="0"/>
               <a:t>Typical Application User</a:t>
@@ -3369,86 +3261,12 @@
       </p:sp>
       <p:sp>
         <p:nvSpPr>
-          <p:cNvPr id="3" name="Content Placeholder 2"/>
+          <p:cNvPr id="11266" name="Content Placeholder 2"/>
           <p:cNvSpPr>
             <a:spLocks noGrp="1"/>
           </p:cNvSpPr>
           <p:nvPr>
             <p:ph idx="1"/>
-          </p:nvPr>
-        </p:nvSpPr>
-        <p:spPr/>
-        <p:txBody>
-          <a:bodyPr>
-            <a:normAutofit/>
-          </a:bodyPr>
-          <a:lstStyle/>
-          <a:p>
-            <a:r>
-              <a:rPr lang="en-US" dirty="0" smtClean="0"/>
-              <a:t>The application’s user base is broad.</a:t>
-            </a:r>
-          </a:p>
-          <a:p>
-            <a:endParaRPr lang="en-US" sz="1400" dirty="0" smtClean="0"/>
-          </a:p>
-          <a:p>
-            <a:r>
-              <a:rPr lang="en-US" dirty="0" smtClean="0"/>
-              <a:t>Geared primarily, but not exclusively, towards those that have an existing interest in the Olympics and want to learn about the games at a much greater depth.</a:t>
-            </a:r>
-          </a:p>
-          <a:p>
-            <a:endParaRPr lang="en-US" dirty="0" smtClean="0"/>
-          </a:p>
-          <a:p>
-            <a:r>
-              <a:rPr lang="en-US" dirty="0" smtClean="0"/>
-              <a:t>Much of the analysis in the application is United States focused.  The reasons we did this include:</a:t>
-            </a:r>
-          </a:p>
-          <a:p>
-            <a:pPr lvl="1"/>
-            <a:r>
-              <a:rPr lang="en-US" dirty="0" smtClean="0"/>
-              <a:t>The US has one of the most extensive and compelling Olympic histories.</a:t>
-            </a:r>
-          </a:p>
-          <a:p>
-            <a:pPr lvl="1"/>
-            <a:r>
-              <a:rPr lang="en-US" dirty="0" smtClean="0"/>
-              <a:t>Increased relevance for class discussion and </a:t>
-            </a:r>
-            <a:r>
-              <a:rPr lang="en-US" dirty="0" smtClean="0"/>
-              <a:t>presentation</a:t>
-            </a:r>
-          </a:p>
-          <a:p>
-            <a:pPr lvl="1"/>
-            <a:r>
-              <a:rPr lang="en-US" dirty="0" smtClean="0"/>
-              <a:t>Desire to enlighten ourselves regarding the biases in American Olympic television coverage.</a:t>
-            </a:r>
-            <a:endParaRPr lang="en-US" dirty="0" smtClean="0"/>
-          </a:p>
-          <a:p>
-            <a:endParaRPr lang="en-US" dirty="0" smtClean="0"/>
-          </a:p>
-          <a:p>
-            <a:endParaRPr lang="en-US" dirty="0" smtClean="0"/>
-          </a:p>
-        </p:txBody>
-      </p:sp>
-      <p:sp>
-        <p:nvSpPr>
-          <p:cNvPr id="4" name="Slide Number Placeholder 3"/>
-          <p:cNvSpPr>
-            <a:spLocks noGrp="1"/>
-          </p:cNvSpPr>
-          <p:nvPr>
-            <p:ph type="sldNum" sz="quarter" idx="11"/>
           </p:nvPr>
         </p:nvSpPr>
         <p:spPr/>
@@ -3456,11 +3274,78 @@
           <a:bodyPr/>
           <a:lstStyle/>
           <a:p>
+            <a:r>
+              <a:rPr lang="en-US" smtClean="0"/>
+              <a:t>The application’s user base is broad.</a:t>
+            </a:r>
+          </a:p>
+          <a:p>
+            <a:endParaRPr lang="en-US" sz="1400" smtClean="0"/>
+          </a:p>
+          <a:p>
+            <a:r>
+              <a:rPr lang="en-US" smtClean="0"/>
+              <a:t>Geared primarily, but not exclusively, towards those that have an existing interest in the Olympics and want to learn about the games at a much greater depth.</a:t>
+            </a:r>
+          </a:p>
+          <a:p>
+            <a:endParaRPr lang="en-US" smtClean="0"/>
+          </a:p>
+          <a:p>
+            <a:r>
+              <a:rPr lang="en-US" smtClean="0"/>
+              <a:t>Much of the analysis in the application is United States focused.  The reasons we did this include:</a:t>
+            </a:r>
+          </a:p>
+          <a:p>
+            <a:pPr lvl="1"/>
+            <a:r>
+              <a:rPr lang="en-US" smtClean="0"/>
+              <a:t>The US has one of the most extensive and compelling Olympic histories.</a:t>
+            </a:r>
+          </a:p>
+          <a:p>
+            <a:pPr lvl="1"/>
+            <a:r>
+              <a:rPr lang="en-US" smtClean="0"/>
+              <a:t>Increased relevance for class discussion and presentation</a:t>
+            </a:r>
+          </a:p>
+          <a:p>
+            <a:pPr lvl="1"/>
+            <a:r>
+              <a:rPr lang="en-US" smtClean="0"/>
+              <a:t>Desire to enlighten ourselves regarding the biases in American Olympic television coverage.</a:t>
+            </a:r>
+          </a:p>
+          <a:p>
+            <a:endParaRPr lang="en-US" smtClean="0"/>
+          </a:p>
+          <a:p>
+            <a:endParaRPr lang="en-US" smtClean="0"/>
+          </a:p>
+        </p:txBody>
+      </p:sp>
+      <p:sp>
+        <p:nvSpPr>
+          <p:cNvPr id="4" name="Slide Number Placeholder 3"/>
+          <p:cNvSpPr>
+            <a:spLocks noGrp="1"/>
+          </p:cNvSpPr>
+          <p:nvPr>
+            <p:ph type="sldNum" sz="quarter" idx="11"/>
+          </p:nvPr>
+        </p:nvSpPr>
+        <p:spPr/>
+        <p:txBody>
+          <a:bodyPr/>
+          <a:lstStyle/>
+          <a:p>
             <a:pPr>
               <a:defRPr/>
             </a:pPr>
-            <a:fld id="{D696A8AA-6ACE-4ADB-BE5C-DDEA34821D66}" type="slidenum">
-              <a:rPr lang="en-US" smtClean="0"/>
+            <a:fld id="{CF1F0EDC-C836-41AC-9D03-C2971AE8E219}" type="slidenum">
+              <a:rPr lang="en-US"/>
               <a:pPr>
                 <a:defRPr/>
               </a:pPr>
@@ -3519,6 +3404,9 @@
           </a:bodyPr>
           <a:lstStyle/>
           <a:p>
+            <a:pPr>
+              <a:defRPr/>
+            </a:pPr>
             <a:r>
               <a:rPr lang="en-US" dirty="0" smtClean="0"/>
               <a:t>Scope Disclosure</a:t>
@@ -3529,7 +3417,7 @@
       </p:sp>
       <p:sp>
         <p:nvSpPr>
-          <p:cNvPr id="3" name="Content Placeholder 2"/>
+          <p:cNvPr id="12290" name="Content Placeholder 2"/>
           <p:cNvSpPr>
             <a:spLocks noGrp="1"/>
           </p:cNvSpPr>
@@ -3543,11 +3431,11 @@
           <a:lstStyle/>
           <a:p>
             <a:r>
-              <a:rPr lang="en-US" dirty="0" smtClean="0"/>
+              <a:rPr lang="en-US" smtClean="0"/>
               <a:t>For clarity of data presentation, this project focused </a:t>
             </a:r>
             <a:r>
-              <a:rPr lang="en-US" b="1" dirty="0" smtClean="0">
+              <a:rPr lang="en-US" b="1" smtClean="0">
                 <a:solidFill>
                   <a:srgbClr val="0070C0"/>
                 </a:solidFill>
@@ -3555,33 +3443,34 @@
               <a:t>solely</a:t>
             </a:r>
             <a:r>
-              <a:rPr lang="en-US" dirty="0" smtClean="0"/>
+              <a:rPr lang="en-US" smtClean="0"/>
               <a:t> on the summer Olympics. </a:t>
             </a:r>
           </a:p>
           <a:p>
-            <a:endParaRPr lang="en-US" dirty="0" smtClean="0"/>
-          </a:p>
-          <a:p>
-            <a:r>
-              <a:rPr lang="en-US" dirty="0" smtClean="0"/>
+            <a:endParaRPr lang="en-US" smtClean="0"/>
+          </a:p>
+          <a:p>
+            <a:r>
+              <a:rPr lang="en-US" smtClean="0"/>
               <a:t>Since the winter Olympics are generally smaller with fewer participating nations and athletes, some of the nuances of the analysis would not have been possible. </a:t>
             </a:r>
           </a:p>
           <a:p>
             <a:pPr lvl="1">
+              <a:buFont typeface="Arial" charset="0"/>
               <a:buNone/>
             </a:pPr>
-            <a:endParaRPr lang="en-US" dirty="0" smtClean="0"/>
-          </a:p>
-          <a:p>
-            <a:r>
-              <a:rPr lang="en-US" dirty="0" smtClean="0"/>
+            <a:endParaRPr lang="en-US" smtClean="0"/>
+          </a:p>
+          <a:p>
+            <a:r>
+              <a:rPr lang="en-US" smtClean="0"/>
               <a:t>Any general references to the “Olympics” in the subsequent discussion applies to the summer games only.</a:t>
             </a:r>
           </a:p>
           <a:p>
-            <a:endParaRPr lang="en-US" dirty="0"/>
+            <a:endParaRPr lang="en-US" smtClean="0"/>
           </a:p>
         </p:txBody>
       </p:sp>
@@ -3603,8 +3492,8 @@
             <a:pPr>
               <a:defRPr/>
             </a:pPr>
-            <a:fld id="{D696A8AA-6ACE-4ADB-BE5C-DDEA34821D66}" type="slidenum">
-              <a:rPr lang="en-US" smtClean="0"/>
+            <a:fld id="{C24DD43C-551E-4761-B2E3-760C4CF9F9BA}" type="slidenum">
+              <a:rPr lang="en-US"/>
               <a:pPr>
                 <a:defRPr/>
               </a:pPr>
@@ -3648,7 +3537,7 @@
       </p:grpSpPr>
       <p:sp>
         <p:nvSpPr>
-          <p:cNvPr id="11265" name="Rectangle 2"/>
+          <p:cNvPr id="13313" name="Rectangle 2"/>
           <p:cNvSpPr>
             <a:spLocks noGrp="1"/>
           </p:cNvSpPr>
@@ -3662,7 +3551,7 @@
           <a:lstStyle/>
           <a:p>
             <a:r>
-              <a:rPr lang="en-US" sz="2800" dirty="0" smtClean="0"/>
+              <a:rPr lang="en-US" sz="2800" smtClean="0"/>
               <a:t>Web Design Patterns &amp; Techniques</a:t>
             </a:r>
           </a:p>
@@ -3680,7 +3569,7 @@
         </p:nvSpPr>
         <p:spPr>
           <a:xfrm>
-            <a:off x="457200" y="989012"/>
+            <a:off x="457200" y="989013"/>
             <a:ext cx="8229600" cy="5487987"/>
           </a:xfrm>
         </p:spPr>
@@ -3696,6 +3585,7 @@
               </a:lnSpc>
               <a:buFont typeface="Arial" charset="0"/>
               <a:buNone/>
+              <a:defRPr/>
             </a:pPr>
             <a:r>
               <a:rPr lang="en-US" sz="2200" b="1" dirty="0" smtClean="0">
@@ -3715,7 +3605,9 @@
             <a:endParaRPr lang="en-US" sz="2200" dirty="0" smtClean="0"/>
           </a:p>
           <a:p>
-            <a:pPr lvl="1"/>
+            <a:pPr lvl="1">
+              <a:defRPr/>
+            </a:pPr>
             <a:r>
               <a:rPr lang="en-US" b="1" dirty="0" smtClean="0">
                 <a:solidFill>
@@ -3727,7 +3619,9 @@
           </a:p>
           <a:p>
             <a:pPr lvl="1">
+              <a:buFont typeface="Arial" charset="0"/>
               <a:buNone/>
+              <a:defRPr/>
             </a:pPr>
             <a:endParaRPr lang="en-US" sz="900" b="1" dirty="0" smtClean="0">
               <a:solidFill>
@@ -3740,6 +3634,7 @@
               <a:lnSpc>
                 <a:spcPct val="90000"/>
               </a:lnSpc>
+              <a:defRPr/>
             </a:pPr>
             <a:r>
               <a:rPr lang="en-US" sz="2000" b="1" dirty="0" smtClean="0">
@@ -3755,6 +3650,7 @@
               <a:lnSpc>
                 <a:spcPct val="90000"/>
               </a:lnSpc>
+              <a:defRPr/>
             </a:pPr>
             <a:r>
               <a:rPr lang="en-US" sz="1800" dirty="0" smtClean="0">
@@ -3767,7 +3663,9 @@
           </a:p>
           <a:p>
             <a:pPr lvl="1">
+              <a:buFont typeface="Arial" charset="0"/>
               <a:buNone/>
+              <a:defRPr/>
             </a:pPr>
             <a:endParaRPr lang="en-US" sz="900" b="1" dirty="0" smtClean="0">
               <a:solidFill>
@@ -3780,6 +3678,7 @@
               <a:lnSpc>
                 <a:spcPct val="90000"/>
               </a:lnSpc>
+              <a:defRPr/>
             </a:pPr>
             <a:r>
               <a:rPr lang="en-US" sz="2000" b="1" dirty="0" smtClean="0">
@@ -3795,6 +3694,7 @@
               <a:lnSpc>
                 <a:spcPct val="90000"/>
               </a:lnSpc>
+              <a:defRPr/>
             </a:pPr>
             <a:r>
               <a:rPr lang="en-US" sz="1800" dirty="0" smtClean="0"/>
@@ -3803,7 +3703,9 @@
           </a:p>
           <a:p>
             <a:pPr lvl="1">
+              <a:buFont typeface="Arial" charset="0"/>
               <a:buNone/>
+              <a:defRPr/>
             </a:pPr>
             <a:endParaRPr lang="en-US" sz="900" b="1" dirty="0" smtClean="0">
               <a:solidFill>
@@ -3812,7 +3714,9 @@
             </a:endParaRPr>
           </a:p>
           <a:p>
-            <a:pPr lvl="1"/>
+            <a:pPr lvl="1">
+              <a:defRPr/>
+            </a:pPr>
             <a:r>
               <a:rPr lang="en-US" b="1" dirty="0" smtClean="0">
                 <a:solidFill>
@@ -3824,7 +3728,9 @@
           </a:p>
           <a:p>
             <a:pPr lvl="1">
+              <a:buFont typeface="Arial" charset="0"/>
               <a:buNone/>
+              <a:defRPr/>
             </a:pPr>
             <a:endParaRPr lang="en-US" sz="900" b="1" dirty="0" smtClean="0">
               <a:solidFill>
@@ -3833,7 +3739,9 @@
             </a:endParaRPr>
           </a:p>
           <a:p>
-            <a:pPr lvl="1"/>
+            <a:pPr lvl="1">
+              <a:defRPr/>
+            </a:pPr>
             <a:r>
               <a:rPr lang="en-US" b="1" dirty="0" smtClean="0">
                 <a:solidFill>
@@ -3844,7 +3752,9 @@
             </a:r>
           </a:p>
           <a:p>
-            <a:pPr lvl="2"/>
+            <a:pPr lvl="2">
+              <a:defRPr/>
+            </a:pPr>
             <a:r>
               <a:rPr lang="en-US" sz="1800" dirty="0" smtClean="0">
                 <a:solidFill>
@@ -3856,7 +3766,9 @@
           </a:p>
           <a:p>
             <a:pPr lvl="1">
+              <a:buFont typeface="Arial" charset="0"/>
               <a:buNone/>
+              <a:defRPr/>
             </a:pPr>
             <a:endParaRPr lang="en-US" sz="900" b="1" dirty="0" smtClean="0">
               <a:solidFill>
@@ -3869,6 +3781,7 @@
               <a:lnSpc>
                 <a:spcPct val="90000"/>
               </a:lnSpc>
+              <a:defRPr/>
             </a:pPr>
             <a:r>
               <a:rPr lang="en-US" b="1" dirty="0" smtClean="0">
@@ -3881,7 +3794,9 @@
           </a:p>
           <a:p>
             <a:pPr lvl="1">
+              <a:buFont typeface="Arial" charset="0"/>
               <a:buNone/>
+              <a:defRPr/>
             </a:pPr>
             <a:endParaRPr lang="en-US" sz="900" b="1" dirty="0" smtClean="0">
               <a:solidFill>
@@ -3894,6 +3809,7 @@
               <a:lnSpc>
                 <a:spcPct val="90000"/>
               </a:lnSpc>
+              <a:defRPr/>
             </a:pPr>
             <a:r>
               <a:rPr lang="en-US" b="1" dirty="0" smtClean="0">
@@ -3909,6 +3825,7 @@
               <a:lnSpc>
                 <a:spcPct val="90000"/>
               </a:lnSpc>
+              <a:defRPr/>
             </a:pPr>
             <a:r>
               <a:rPr lang="en-US" dirty="0" smtClean="0">
@@ -3924,6 +3841,7 @@
               <a:lnSpc>
                 <a:spcPct val="90000"/>
               </a:lnSpc>
+              <a:defRPr/>
             </a:pPr>
             <a:r>
               <a:rPr lang="en-US" dirty="0" smtClean="0">
@@ -3936,7 +3854,9 @@
           </a:p>
           <a:p>
             <a:pPr lvl="1">
+              <a:buFont typeface="Arial" charset="0"/>
               <a:buNone/>
+              <a:defRPr/>
             </a:pPr>
             <a:endParaRPr lang="en-US" sz="900" b="1" dirty="0" smtClean="0">
               <a:solidFill>
@@ -3949,6 +3869,7 @@
               <a:lnSpc>
                 <a:spcPct val="90000"/>
               </a:lnSpc>
+              <a:defRPr/>
             </a:pPr>
             <a:r>
               <a:rPr lang="en-US" b="1" dirty="0" smtClean="0">
@@ -3961,7 +3882,9 @@
           </a:p>
           <a:p>
             <a:pPr lvl="1">
+              <a:buFont typeface="Arial" charset="0"/>
               <a:buNone/>
+              <a:defRPr/>
             </a:pPr>
             <a:endParaRPr lang="en-US" sz="900" b="1" dirty="0" smtClean="0">
               <a:solidFill>
@@ -3974,6 +3897,7 @@
               <a:lnSpc>
                 <a:spcPct val="90000"/>
               </a:lnSpc>
+              <a:defRPr/>
             </a:pPr>
             <a:r>
               <a:rPr lang="en-US" sz="2000" b="1" dirty="0" smtClean="0">
@@ -3989,6 +3913,7 @@
               <a:lnSpc>
                 <a:spcPct val="90000"/>
               </a:lnSpc>
+              <a:defRPr/>
             </a:pPr>
             <a:r>
               <a:rPr lang="en-US" sz="1800" dirty="0" smtClean="0">
@@ -4004,6 +3929,7 @@
               <a:lnSpc>
                 <a:spcPct val="90000"/>
               </a:lnSpc>
+              <a:defRPr/>
             </a:pPr>
             <a:endParaRPr lang="en-US" b="1" dirty="0" smtClean="0">
               <a:solidFill>
@@ -4016,6 +3942,7 @@
               <a:lnSpc>
                 <a:spcPct val="90000"/>
               </a:lnSpc>
+              <a:defRPr/>
             </a:pPr>
             <a:endParaRPr lang="en-US" dirty="0" smtClean="0">
               <a:solidFill>
@@ -4028,6 +3955,7 @@
               <a:lnSpc>
                 <a:spcPct val="90000"/>
               </a:lnSpc>
+              <a:defRPr/>
             </a:pPr>
             <a:endParaRPr lang="en-US" b="1" dirty="0" smtClean="0">
               <a:solidFill>
@@ -4040,6 +3968,7 @@
               <a:lnSpc>
                 <a:spcPct val="90000"/>
               </a:lnSpc>
+              <a:defRPr/>
             </a:pPr>
             <a:endParaRPr lang="en-US" sz="1800" dirty="0" smtClean="0">
               <a:solidFill>
@@ -4067,8 +3996,8 @@
             <a:pPr>
               <a:defRPr/>
             </a:pPr>
-            <a:fld id="{D696A8AA-6ACE-4ADB-BE5C-DDEA34821D66}" type="slidenum">
-              <a:rPr lang="en-US" smtClean="0"/>
+            <a:fld id="{A12BB92D-BB12-4F8F-979C-F9CC2371B2FF}" type="slidenum">
+              <a:rPr lang="en-US"/>
               <a:pPr>
                 <a:defRPr/>
               </a:pPr>
@@ -4112,7 +4041,7 @@
       </p:grpSpPr>
       <p:sp>
         <p:nvSpPr>
-          <p:cNvPr id="12289" name="Rectangle 2"/>
+          <p:cNvPr id="14337" name="Rectangle 2"/>
           <p:cNvSpPr>
             <a:spLocks noGrp="1"/>
           </p:cNvSpPr>
@@ -4122,13 +4051,11 @@
         </p:nvSpPr>
         <p:spPr/>
         <p:txBody>
-          <a:bodyPr>
-            <a:normAutofit/>
-          </a:bodyPr>
+          <a:bodyPr/>
           <a:lstStyle/>
           <a:p>
             <a:r>
-              <a:rPr lang="en-US" sz="2800" dirty="0" smtClean="0"/>
+              <a:rPr lang="en-US" sz="2800" smtClean="0"/>
               <a:t>Data Visualization Design Patterns</a:t>
             </a:r>
           </a:p>
@@ -4136,7 +4063,7 @@
       </p:sp>
       <p:sp>
         <p:nvSpPr>
-          <p:cNvPr id="12290" name="Rectangle 3"/>
+          <p:cNvPr id="14338" name="Rectangle 3"/>
           <p:cNvSpPr>
             <a:spLocks noGrp="1"/>
           </p:cNvSpPr>
@@ -4146,19 +4073,18 @@
         </p:nvSpPr>
         <p:spPr/>
         <p:txBody>
-          <a:bodyPr>
-            <a:normAutofit fontScale="92500" lnSpcReduction="20000"/>
-          </a:bodyPr>
+          <a:bodyPr/>
           <a:lstStyle/>
           <a:p>
-            <a:pPr marL="0" lvl="2" indent="0" algn="ctr">
+            <a:pPr marL="685800" lvl="2" algn="ctr">
               <a:lnSpc>
-                <a:spcPct val="90000"/>
+                <a:spcPct val="70000"/>
               </a:lnSpc>
+              <a:buFont typeface="Arial" charset="0"/>
               <a:buNone/>
             </a:pPr>
             <a:r>
-              <a:rPr lang="en-US" sz="2800" b="1" dirty="0" smtClean="0">
+              <a:rPr lang="en-US" sz="2400" b="1" smtClean="0">
                 <a:solidFill>
                   <a:srgbClr val="000066"/>
                 </a:solidFill>
@@ -4166,56 +4092,56 @@
               <a:t>Data visualization design patterns and techniques used:</a:t>
             </a:r>
             <a:r>
-              <a:rPr lang="en-US" sz="2800" dirty="0" smtClean="0"/>
+              <a:rPr lang="en-US" sz="2400" smtClean="0"/>
               <a:t/>
             </a:r>
             <a:br>
-              <a:rPr lang="en-US" sz="2800" dirty="0" smtClean="0"/>
+              <a:rPr lang="en-US" sz="2400" smtClean="0"/>
             </a:br>
-            <a:endParaRPr lang="en-US" b="1" dirty="0" smtClean="0"/>
-          </a:p>
-          <a:p>
-            <a:pPr lvl="1"/>
-            <a:r>
-              <a:rPr lang="en-US" b="1" dirty="0" err="1" smtClean="0">
+            <a:endParaRPr lang="en-US" sz="2400" b="1" smtClean="0"/>
+          </a:p>
+          <a:p>
+            <a:pPr marL="342900" lvl="1" indent="-228600">
+              <a:lnSpc>
+                <a:spcPct val="80000"/>
+              </a:lnSpc>
+            </a:pPr>
+            <a:r>
+              <a:rPr lang="en-US" sz="2000" b="1" smtClean="0">
                 <a:solidFill>
                   <a:srgbClr val="008000"/>
                 </a:solidFill>
               </a:rPr>
-              <a:t>Schneiderman’s</a:t>
-            </a:r>
-            <a:r>
-              <a:rPr lang="en-US" b="1" dirty="0" smtClean="0">
-                <a:solidFill>
-                  <a:srgbClr val="008000"/>
-                </a:solidFill>
-              </a:rPr>
-              <a:t> Mantra</a:t>
-            </a:r>
-          </a:p>
-          <a:p>
-            <a:pPr lvl="2">
+              <a:t>Schneiderman’s Mantra</a:t>
+            </a:r>
+          </a:p>
+          <a:p>
+            <a:pPr marL="685800" lvl="2">
               <a:lnSpc>
-                <a:spcPct val="90000"/>
+                <a:spcPct val="70000"/>
               </a:lnSpc>
             </a:pPr>
             <a:r>
-              <a:rPr lang="en-US" sz="1800" dirty="0" smtClean="0"/>
+              <a:rPr lang="en-US" sz="1700" smtClean="0"/>
               <a:t>“Overview first, zoom and filter, then details-on-demand.”</a:t>
             </a:r>
           </a:p>
           <a:p>
-            <a:pPr lvl="2">
+            <a:pPr marL="685800" lvl="2">
               <a:lnSpc>
-                <a:spcPct val="90000"/>
+                <a:spcPct val="70000"/>
               </a:lnSpc>
             </a:pPr>
-            <a:endParaRPr lang="en-US" sz="1800" dirty="0" smtClean="0"/>
-          </a:p>
-          <a:p>
-            <a:pPr lvl="1"/>
-            <a:r>
-              <a:rPr lang="en-US" b="1" dirty="0" smtClean="0">
+            <a:endParaRPr lang="en-US" sz="1700" smtClean="0"/>
+          </a:p>
+          <a:p>
+            <a:pPr marL="342900" lvl="1" indent="-228600">
+              <a:lnSpc>
+                <a:spcPct val="80000"/>
+              </a:lnSpc>
+            </a:pPr>
+            <a:r>
+              <a:rPr lang="en-US" sz="2000" b="1" smtClean="0">
                 <a:solidFill>
                   <a:srgbClr val="008000"/>
                 </a:solidFill>
@@ -4224,35 +4150,34 @@
             </a:r>
           </a:p>
           <a:p>
-            <a:pPr lvl="2">
+            <a:pPr marL="685800" lvl="2">
               <a:lnSpc>
-                <a:spcPct val="90000"/>
+                <a:spcPct val="70000"/>
               </a:lnSpc>
             </a:pPr>
             <a:r>
-              <a:rPr lang="en-US" sz="1800" dirty="0" smtClean="0"/>
-              <a:t>Give ‘</a:t>
-            </a:r>
-            <a:r>
-              <a:rPr lang="en-US" sz="1800" dirty="0" err="1" smtClean="0"/>
-              <a:t>em</a:t>
-            </a:r>
-            <a:r>
-              <a:rPr lang="en-US" sz="1800" dirty="0" smtClean="0"/>
-              <a:t> what they want</a:t>
-            </a:r>
-          </a:p>
-          <a:p>
-            <a:pPr algn="ctr">
+              <a:rPr lang="en-US" sz="1700" smtClean="0"/>
+              <a:t>Give ‘em what they want</a:t>
+            </a:r>
+          </a:p>
+          <a:p>
+            <a:pPr marL="0" indent="0" algn="ctr">
+              <a:lnSpc>
+                <a:spcPct val="80000"/>
+              </a:lnSpc>
               <a:buFont typeface="Arial" charset="0"/>
               <a:buNone/>
             </a:pPr>
-            <a:endParaRPr lang="en-US" sz="1400" dirty="0" smtClean="0"/>
-          </a:p>
-          <a:p>
-            <a:pPr lvl="1"/>
-            <a:r>
-              <a:rPr lang="en-US" b="1" dirty="0" smtClean="0">
+            <a:endParaRPr lang="en-US" sz="1300" smtClean="0"/>
+          </a:p>
+          <a:p>
+            <a:pPr marL="342900" lvl="1" indent="-228600">
+              <a:lnSpc>
+                <a:spcPct val="80000"/>
+              </a:lnSpc>
+            </a:pPr>
+            <a:r>
+              <a:rPr lang="en-US" sz="2000" b="1" smtClean="0">
                 <a:solidFill>
                   <a:srgbClr val="008000"/>
                 </a:solidFill>
@@ -4261,29 +4186,34 @@
             </a:r>
           </a:p>
           <a:p>
-            <a:pPr lvl="2">
+            <a:pPr marL="685800" lvl="2">
               <a:lnSpc>
-                <a:spcPct val="90000"/>
+                <a:spcPct val="70000"/>
               </a:lnSpc>
             </a:pPr>
             <a:r>
-              <a:rPr lang="en-US" sz="1800" dirty="0" smtClean="0"/>
+              <a:rPr lang="en-US" sz="1700" smtClean="0"/>
               <a:t>“Focus Plus Context”</a:t>
             </a:r>
           </a:p>
           <a:p>
-            <a:pPr lvl="2">
+            <a:pPr marL="685800" lvl="2">
               <a:lnSpc>
-                <a:spcPct val="90000"/>
+                <a:spcPct val="70000"/>
               </a:lnSpc>
+              <a:buFont typeface="Arial" charset="0"/>
               <a:buNone/>
             </a:pPr>
-            <a:endParaRPr lang="en-US" sz="1800" dirty="0" smtClean="0"/>
-          </a:p>
-          <a:p>
-            <a:pPr lvl="1"/>
-            <a:r>
-              <a:rPr lang="en-US" b="1" dirty="0" smtClean="0">
+            <a:endParaRPr lang="en-US" sz="1700" smtClean="0"/>
+          </a:p>
+          <a:p>
+            <a:pPr marL="342900" lvl="1" indent="-228600">
+              <a:lnSpc>
+                <a:spcPct val="80000"/>
+              </a:lnSpc>
+            </a:pPr>
+            <a:r>
+              <a:rPr lang="en-US" sz="2000" b="1" smtClean="0">
                 <a:solidFill>
                   <a:srgbClr val="008000"/>
                 </a:solidFill>
@@ -4292,28 +4222,32 @@
             </a:r>
           </a:p>
           <a:p>
-            <a:pPr lvl="2">
+            <a:pPr marL="685800" lvl="2">
               <a:lnSpc>
-                <a:spcPct val="90000"/>
+                <a:spcPct val="70000"/>
               </a:lnSpc>
             </a:pPr>
             <a:r>
-              <a:rPr lang="en-US" sz="1800" dirty="0" smtClean="0"/>
+              <a:rPr lang="en-US" sz="1700" smtClean="0"/>
               <a:t>Provide additional relevant context and data.</a:t>
             </a:r>
           </a:p>
           <a:p>
-            <a:pPr lvl="2">
+            <a:pPr marL="685800" lvl="2">
               <a:lnSpc>
-                <a:spcPct val="90000"/>
+                <a:spcPct val="70000"/>
               </a:lnSpc>
             </a:pPr>
-            <a:endParaRPr lang="en-US" sz="1800" dirty="0" smtClean="0"/>
-          </a:p>
-          <a:p>
-            <a:pPr lvl="1"/>
-            <a:r>
-              <a:rPr lang="en-US" b="1" dirty="0" smtClean="0">
+            <a:endParaRPr lang="en-US" sz="1700" smtClean="0"/>
+          </a:p>
+          <a:p>
+            <a:pPr marL="342900" lvl="1" indent="-228600">
+              <a:lnSpc>
+                <a:spcPct val="80000"/>
+              </a:lnSpc>
+            </a:pPr>
+            <a:r>
+              <a:rPr lang="en-US" sz="2000" b="1" smtClean="0">
                 <a:solidFill>
                   <a:srgbClr val="008000"/>
                 </a:solidFill>
@@ -4322,51 +4256,43 @@
             </a:r>
           </a:p>
           <a:p>
-            <a:pPr lvl="1"/>
-            <a:endParaRPr lang="en-US" sz="1800" b="1" dirty="0" smtClean="0">
+            <a:pPr marL="342900" lvl="1" indent="-228600">
+              <a:lnSpc>
+                <a:spcPct val="80000"/>
+              </a:lnSpc>
+            </a:pPr>
+            <a:endParaRPr lang="en-US" sz="1700" b="1" smtClean="0">
               <a:solidFill>
                 <a:srgbClr val="008000"/>
               </a:solidFill>
             </a:endParaRPr>
           </a:p>
           <a:p>
-            <a:pPr lvl="1"/>
-            <a:r>
-              <a:rPr lang="en-US" b="1" dirty="0" err="1" smtClean="0">
+            <a:pPr marL="342900" lvl="1" indent="-228600">
+              <a:lnSpc>
+                <a:spcPct val="80000"/>
+              </a:lnSpc>
+            </a:pPr>
+            <a:r>
+              <a:rPr lang="en-US" sz="2000" b="1" smtClean="0">
                 <a:solidFill>
                   <a:srgbClr val="008000"/>
                 </a:solidFill>
               </a:rPr>
-              <a:t>Sortable</a:t>
-            </a:r>
-            <a:r>
-              <a:rPr lang="en-US" b="1" dirty="0" smtClean="0">
-                <a:solidFill>
-                  <a:srgbClr val="008000"/>
-                </a:solidFill>
-              </a:rPr>
-              <a:t> Tables</a:t>
-            </a:r>
-            <a:endParaRPr lang="en-US" b="1" dirty="0" smtClean="0"/>
-          </a:p>
-          <a:p>
-            <a:pPr lvl="2">
+              <a:t>Sortable Tables</a:t>
+            </a:r>
+            <a:endParaRPr lang="en-US" sz="2000" b="1" smtClean="0"/>
+          </a:p>
+          <a:p>
+            <a:pPr marL="685800" lvl="2">
               <a:lnSpc>
-                <a:spcPct val="90000"/>
+                <a:spcPct val="70000"/>
               </a:lnSpc>
             </a:pPr>
             <a:r>
-              <a:rPr lang="en-US" sz="1800" dirty="0" smtClean="0"/>
+              <a:rPr lang="en-US" sz="1700" smtClean="0"/>
               <a:t>A partial misnomer but sorting is the key</a:t>
             </a:r>
-          </a:p>
-          <a:p>
-            <a:pPr lvl="2">
-              <a:lnSpc>
-                <a:spcPct val="90000"/>
-              </a:lnSpc>
-            </a:pPr>
-            <a:endParaRPr lang="en-US" sz="1800" dirty="0" smtClean="0"/>
           </a:p>
         </p:txBody>
       </p:sp>
@@ -4388,8 +4314,8 @@
             <a:pPr>
               <a:defRPr/>
             </a:pPr>
-            <a:fld id="{D696A8AA-6ACE-4ADB-BE5C-DDEA34821D66}" type="slidenum">
-              <a:rPr lang="en-US" smtClean="0"/>
+            <a:fld id="{AB34B97B-2CF5-4454-988C-F2727FA8E86A}" type="slidenum">
+              <a:rPr lang="en-US"/>
               <a:pPr>
                 <a:defRPr/>
               </a:pPr>

</xml_diff>